<commit_message>
Added material to relations
</commit_message>
<xml_diff>
--- a/src/13_Relations/Relations.pptx
+++ b/src/13_Relations/Relations.pptx
@@ -5,7 +5,7 @@
     <p:sldMasterId id="2147483648" r:id="rId1"/>
   </p:sldMasterIdLst>
   <p:notesMasterIdLst>
-    <p:notesMasterId r:id="rId11"/>
+    <p:notesMasterId r:id="rId14"/>
   </p:notesMasterIdLst>
   <p:sldIdLst>
     <p:sldId id="258" r:id="rId2"/>
@@ -16,7 +16,10 @@
     <p:sldId id="360" r:id="rId7"/>
     <p:sldId id="361" r:id="rId8"/>
     <p:sldId id="362" r:id="rId9"/>
-    <p:sldId id="261" r:id="rId10"/>
+    <p:sldId id="363" r:id="rId10"/>
+    <p:sldId id="365" r:id="rId11"/>
+    <p:sldId id="364" r:id="rId12"/>
+    <p:sldId id="261" r:id="rId13"/>
   </p:sldIdLst>
   <p:sldSz cx="12192000" cy="6858000"/>
   <p:notesSz cx="6858000" cy="9144000"/>
@@ -205,7 +208,7 @@
           <a:p>
             <a:fld id="{A5C20BB3-3CCB-4FE5-991B-82F6BCB48AF3}" type="datetimeFigureOut">
               <a:rPr lang="en-US" smtClean="0"/>
-              <a:t>11/14/18</a:t>
+              <a:t>11/15/18</a:t>
             </a:fld>
             <a:endParaRPr lang="en-US"/>
           </a:p>
@@ -601,7 +604,7 @@
           <a:p>
             <a:fld id="{B6C1A396-ADAF-C049-ABC6-C32D7D1CCAD8}" type="datetime1">
               <a:rPr lang="en-US" smtClean="0"/>
-              <a:t>11/14/18</a:t>
+              <a:t>11/15/18</a:t>
             </a:fld>
             <a:endParaRPr lang="en-US"/>
           </a:p>
@@ -769,7 +772,7 @@
           <a:p>
             <a:fld id="{1E275737-3B4B-C743-819D-3D7767301481}" type="datetime1">
               <a:rPr lang="en-US" smtClean="0"/>
-              <a:t>11/14/18</a:t>
+              <a:t>11/15/18</a:t>
             </a:fld>
             <a:endParaRPr lang="en-US"/>
           </a:p>
@@ -947,7 +950,7 @@
           <a:p>
             <a:fld id="{23E60EA0-28A6-2A4C-A0DF-F463B4716CF4}" type="datetime1">
               <a:rPr lang="en-US" smtClean="0"/>
-              <a:t>11/14/18</a:t>
+              <a:t>11/15/18</a:t>
             </a:fld>
             <a:endParaRPr lang="en-US"/>
           </a:p>
@@ -1115,7 +1118,7 @@
           <a:p>
             <a:fld id="{7F4ADCAF-FE79-6D4A-8F0C-FF6B2DC49B87}" type="datetime1">
               <a:rPr lang="en-US" smtClean="0"/>
-              <a:t>11/14/18</a:t>
+              <a:t>11/15/18</a:t>
             </a:fld>
             <a:endParaRPr lang="en-US"/>
           </a:p>
@@ -1360,7 +1363,7 @@
           <a:p>
             <a:fld id="{BB4170EC-B8E8-F84E-B40B-4CA40E87F0F1}" type="datetime1">
               <a:rPr lang="en-US" smtClean="0"/>
-              <a:t>11/14/18</a:t>
+              <a:t>11/15/18</a:t>
             </a:fld>
             <a:endParaRPr lang="en-US"/>
           </a:p>
@@ -1589,7 +1592,7 @@
           <a:p>
             <a:fld id="{3549A180-BBB6-AB44-9EC6-613957D9BC21}" type="datetime1">
               <a:rPr lang="en-US" smtClean="0"/>
-              <a:t>11/14/18</a:t>
+              <a:t>11/15/18</a:t>
             </a:fld>
             <a:endParaRPr lang="en-US"/>
           </a:p>
@@ -1953,7 +1956,7 @@
           <a:p>
             <a:fld id="{A29669B0-2692-6042-A028-87F920E9CE7A}" type="datetime1">
               <a:rPr lang="en-US" smtClean="0"/>
-              <a:t>11/14/18</a:t>
+              <a:t>11/15/18</a:t>
             </a:fld>
             <a:endParaRPr lang="en-US"/>
           </a:p>
@@ -2070,7 +2073,7 @@
           <a:p>
             <a:fld id="{26B5280F-B487-C54A-8A7A-C35A806AF023}" type="datetime1">
               <a:rPr lang="en-US" smtClean="0"/>
-              <a:t>11/14/18</a:t>
+              <a:t>11/15/18</a:t>
             </a:fld>
             <a:endParaRPr lang="en-US"/>
           </a:p>
@@ -2165,7 +2168,7 @@
           <a:p>
             <a:fld id="{FAAE216B-9CF3-A14B-9A92-B9DABF79BFCE}" type="datetime1">
               <a:rPr lang="en-US" smtClean="0"/>
-              <a:t>11/14/18</a:t>
+              <a:t>11/15/18</a:t>
             </a:fld>
             <a:endParaRPr lang="en-US"/>
           </a:p>
@@ -2440,7 +2443,7 @@
           <a:p>
             <a:fld id="{5B8013A5-7B70-2548-B20A-4534B630AB6C}" type="datetime1">
               <a:rPr lang="en-US" smtClean="0"/>
-              <a:t>11/14/18</a:t>
+              <a:t>11/15/18</a:t>
             </a:fld>
             <a:endParaRPr lang="en-US"/>
           </a:p>
@@ -2695,7 +2698,7 @@
           <a:p>
             <a:fld id="{E9928226-EDE2-0A4C-81FC-AFBDD145D237}" type="datetime1">
               <a:rPr lang="en-US" smtClean="0"/>
-              <a:t>11/14/18</a:t>
+              <a:t>11/15/18</a:t>
             </a:fld>
             <a:endParaRPr lang="en-US"/>
           </a:p>
@@ -2906,7 +2909,7 @@
           <a:p>
             <a:fld id="{7D3EA1F3-586E-4B46-9B9A-D49AC241EEC9}" type="datetime1">
               <a:rPr lang="en-US" smtClean="0"/>
-              <a:t>11/14/18</a:t>
+              <a:t>11/15/18</a:t>
             </a:fld>
             <a:endParaRPr lang="en-US"/>
           </a:p>
@@ -3525,6 +3528,958 @@
 </p:sld>
 </file>
 
+<file path=ppt/slides/slide10.xml><?xml version="1.0" encoding="utf-8"?>
+<p:sld xmlns:a="http://schemas.openxmlformats.org/drawingml/2006/main" xmlns:r="http://schemas.openxmlformats.org/officeDocument/2006/relationships" xmlns:p="http://schemas.openxmlformats.org/presentationml/2006/main">
+  <p:cSld>
+    <p:spTree>
+      <p:nvGrpSpPr>
+        <p:cNvPr id="1" name=""/>
+        <p:cNvGrpSpPr/>
+        <p:nvPr/>
+      </p:nvGrpSpPr>
+      <p:grpSpPr>
+        <a:xfrm>
+          <a:off x="0" y="0"/>
+          <a:ext cx="0" cy="0"/>
+          <a:chOff x="0" y="0"/>
+          <a:chExt cx="0" cy="0"/>
+        </a:xfrm>
+      </p:grpSpPr>
+      <p:sp>
+        <p:nvSpPr>
+          <p:cNvPr id="2" name="Title 1">
+            <a:extLst>
+              <a:ext uri="{FF2B5EF4-FFF2-40B4-BE49-F238E27FC236}">
+                <a16:creationId xmlns:a16="http://schemas.microsoft.com/office/drawing/2014/main" id="{97457FC6-297F-2043-BC3F-E400592E448A}"/>
+              </a:ext>
+            </a:extLst>
+          </p:cNvPr>
+          <p:cNvSpPr>
+            <a:spLocks noGrp="1"/>
+          </p:cNvSpPr>
+          <p:nvPr>
+            <p:ph type="title"/>
+          </p:nvPr>
+        </p:nvSpPr>
+        <p:spPr/>
+        <p:txBody>
+          <a:bodyPr/>
+          <a:lstStyle/>
+          <a:p>
+            <a:r>
+              <a:rPr lang="en-US" dirty="0"/>
+              <a:t>Successor Relation in Lean</a:t>
+            </a:r>
+          </a:p>
+        </p:txBody>
+      </p:sp>
+      <p:sp>
+        <p:nvSpPr>
+          <p:cNvPr id="3" name="Content Placeholder 2">
+            <a:extLst>
+              <a:ext uri="{FF2B5EF4-FFF2-40B4-BE49-F238E27FC236}">
+                <a16:creationId xmlns:a16="http://schemas.microsoft.com/office/drawing/2014/main" id="{ECE7E586-8B4B-9348-9966-6E0690A5DC66}"/>
+              </a:ext>
+            </a:extLst>
+          </p:cNvPr>
+          <p:cNvSpPr>
+            <a:spLocks noGrp="1"/>
+          </p:cNvSpPr>
+          <p:nvPr>
+            <p:ph idx="1"/>
+          </p:nvPr>
+        </p:nvSpPr>
+        <p:spPr/>
+        <p:txBody>
+          <a:bodyPr>
+            <a:normAutofit/>
+          </a:bodyPr>
+          <a:lstStyle/>
+          <a:p>
+            <a:pPr marL="0" indent="0">
+              <a:buNone/>
+            </a:pPr>
+            <a:r>
+              <a:rPr lang="en-US" sz="2400" dirty="0">
+                <a:latin typeface="Courier New" panose="02070309020205020404" pitchFamily="49" charset="0"/>
+                <a:cs typeface="Courier New" panose="02070309020205020404" pitchFamily="49" charset="0"/>
+              </a:rPr>
+              <a:t>def successor: (</a:t>
+            </a:r>
+            <a:r>
+              <a:rPr lang="el-GR" sz="2400" dirty="0">
+                <a:latin typeface="Courier New" panose="02070309020205020404" pitchFamily="49" charset="0"/>
+                <a:cs typeface="Courier New" panose="02070309020205020404" pitchFamily="49" charset="0"/>
+              </a:rPr>
+              <a:t>β → β → </a:t>
+            </a:r>
+            <a:r>
+              <a:rPr lang="en-US" sz="2400" dirty="0">
+                <a:latin typeface="Courier New" panose="02070309020205020404" pitchFamily="49" charset="0"/>
+                <a:cs typeface="Courier New" panose="02070309020205020404" pitchFamily="49" charset="0"/>
+              </a:rPr>
+              <a:t>Prop) → (</a:t>
+            </a:r>
+            <a:r>
+              <a:rPr lang="el-GR" sz="2400" dirty="0">
+                <a:latin typeface="Courier New" panose="02070309020205020404" pitchFamily="49" charset="0"/>
+                <a:cs typeface="Courier New" panose="02070309020205020404" pitchFamily="49" charset="0"/>
+              </a:rPr>
+              <a:t>β → β → </a:t>
+            </a:r>
+            <a:r>
+              <a:rPr lang="en-US" sz="2400" dirty="0">
+                <a:latin typeface="Courier New" panose="02070309020205020404" pitchFamily="49" charset="0"/>
+                <a:cs typeface="Courier New" panose="02070309020205020404" pitchFamily="49" charset="0"/>
+              </a:rPr>
+              <a:t>Prop) :=</a:t>
+            </a:r>
+          </a:p>
+          <a:p>
+            <a:pPr marL="0" indent="0">
+              <a:buNone/>
+            </a:pPr>
+            <a:r>
+              <a:rPr lang="en-US" sz="2400" dirty="0">
+                <a:latin typeface="Courier New" panose="02070309020205020404" pitchFamily="49" charset="0"/>
+                <a:cs typeface="Courier New" panose="02070309020205020404" pitchFamily="49" charset="0"/>
+              </a:rPr>
+              <a:t>begin</a:t>
+            </a:r>
+          </a:p>
+          <a:p>
+            <a:pPr marL="0" indent="0">
+              <a:buNone/>
+            </a:pPr>
+            <a:r>
+              <a:rPr lang="en-US" sz="2400" dirty="0">
+                <a:latin typeface="Courier New" panose="02070309020205020404" pitchFamily="49" charset="0"/>
+                <a:cs typeface="Courier New" panose="02070309020205020404" pitchFamily="49" charset="0"/>
+              </a:rPr>
+              <a:t>  assume r,</a:t>
+            </a:r>
+          </a:p>
+          <a:p>
+            <a:pPr marL="0" indent="0">
+              <a:buNone/>
+            </a:pPr>
+            <a:r>
+              <a:rPr lang="en-US" sz="2400" dirty="0">
+                <a:latin typeface="Courier New" panose="02070309020205020404" pitchFamily="49" charset="0"/>
+                <a:cs typeface="Courier New" panose="02070309020205020404" pitchFamily="49" charset="0"/>
+              </a:rPr>
+              <a:t>  exact </a:t>
+            </a:r>
+            <a:r>
+              <a:rPr lang="el-GR" sz="2400" dirty="0">
+                <a:latin typeface="Courier New" panose="02070309020205020404" pitchFamily="49" charset="0"/>
+                <a:cs typeface="Courier New" panose="02070309020205020404" pitchFamily="49" charset="0"/>
+              </a:rPr>
+              <a:t>λ(</a:t>
+            </a:r>
+            <a:r>
+              <a:rPr lang="en-US" sz="2400" dirty="0">
+                <a:latin typeface="Courier New" panose="02070309020205020404" pitchFamily="49" charset="0"/>
+                <a:cs typeface="Courier New" panose="02070309020205020404" pitchFamily="49" charset="0"/>
+              </a:rPr>
+              <a:t>x y: </a:t>
+            </a:r>
+            <a:r>
+              <a:rPr lang="el-GR" sz="2400" dirty="0">
+                <a:latin typeface="Courier New" panose="02070309020205020404" pitchFamily="49" charset="0"/>
+                <a:cs typeface="Courier New" panose="02070309020205020404" pitchFamily="49" charset="0"/>
+              </a:rPr>
+              <a:t>β), ∃(</a:t>
+            </a:r>
+            <a:r>
+              <a:rPr lang="en-US" sz="2400" dirty="0">
+                <a:latin typeface="Courier New" panose="02070309020205020404" pitchFamily="49" charset="0"/>
+                <a:cs typeface="Courier New" panose="02070309020205020404" pitchFamily="49" charset="0"/>
+              </a:rPr>
+              <a:t>b: </a:t>
+            </a:r>
+            <a:r>
+              <a:rPr lang="el-GR" sz="2400" dirty="0">
+                <a:latin typeface="Courier New" panose="02070309020205020404" pitchFamily="49" charset="0"/>
+                <a:cs typeface="Courier New" panose="02070309020205020404" pitchFamily="49" charset="0"/>
+              </a:rPr>
+              <a:t>β), (</a:t>
+            </a:r>
+            <a:r>
+              <a:rPr lang="en-US" sz="2400" dirty="0">
+                <a:latin typeface="Courier New" panose="02070309020205020404" pitchFamily="49" charset="0"/>
+                <a:cs typeface="Courier New" panose="02070309020205020404" pitchFamily="49" charset="0"/>
+              </a:rPr>
+              <a:t>r x b) ∧ (r b y)</a:t>
+            </a:r>
+          </a:p>
+          <a:p>
+            <a:pPr marL="0" indent="0">
+              <a:buNone/>
+            </a:pPr>
+            <a:r>
+              <a:rPr lang="en-US" sz="2400" dirty="0">
+                <a:latin typeface="Courier New" panose="02070309020205020404" pitchFamily="49" charset="0"/>
+                <a:cs typeface="Courier New" panose="02070309020205020404" pitchFamily="49" charset="0"/>
+              </a:rPr>
+              <a:t>end</a:t>
+            </a:r>
+          </a:p>
+        </p:txBody>
+      </p:sp>
+      <p:sp>
+        <p:nvSpPr>
+          <p:cNvPr id="4" name="Slide Number Placeholder 3">
+            <a:extLst>
+              <a:ext uri="{FF2B5EF4-FFF2-40B4-BE49-F238E27FC236}">
+                <a16:creationId xmlns:a16="http://schemas.microsoft.com/office/drawing/2014/main" id="{886F7B50-6C69-1A48-B617-2408CA5FE67A}"/>
+              </a:ext>
+            </a:extLst>
+          </p:cNvPr>
+          <p:cNvSpPr>
+            <a:spLocks noGrp="1"/>
+          </p:cNvSpPr>
+          <p:nvPr>
+            <p:ph type="sldNum" sz="quarter" idx="12"/>
+          </p:nvPr>
+        </p:nvSpPr>
+        <p:spPr/>
+        <p:txBody>
+          <a:bodyPr/>
+          <a:lstStyle/>
+          <a:p>
+            <a:fld id="{3352CBF5-17B8-4387-88A6-ABF9F8C64D5A}" type="slidenum">
+              <a:rPr lang="en-US" smtClean="0"/>
+              <a:t>10</a:t>
+            </a:fld>
+            <a:endParaRPr lang="en-US"/>
+          </a:p>
+        </p:txBody>
+      </p:sp>
+    </p:spTree>
+    <p:extLst>
+      <p:ext uri="{BB962C8B-B14F-4D97-AF65-F5344CB8AC3E}">
+        <p14:creationId xmlns:p14="http://schemas.microsoft.com/office/powerpoint/2010/main" val="3238652549"/>
+      </p:ext>
+    </p:extLst>
+  </p:cSld>
+  <p:clrMapOvr>
+    <a:masterClrMapping/>
+  </p:clrMapOvr>
+</p:sld>
+</file>
+
+<file path=ppt/slides/slide11.xml><?xml version="1.0" encoding="utf-8"?>
+<p:sld xmlns:a="http://schemas.openxmlformats.org/drawingml/2006/main" xmlns:r="http://schemas.openxmlformats.org/officeDocument/2006/relationships" xmlns:p="http://schemas.openxmlformats.org/presentationml/2006/main">
+  <p:cSld>
+    <p:spTree>
+      <p:nvGrpSpPr>
+        <p:cNvPr id="1" name=""/>
+        <p:cNvGrpSpPr/>
+        <p:nvPr/>
+      </p:nvGrpSpPr>
+      <p:grpSpPr>
+        <a:xfrm>
+          <a:off x="0" y="0"/>
+          <a:ext cx="0" cy="0"/>
+          <a:chOff x="0" y="0"/>
+          <a:chExt cx="0" cy="0"/>
+        </a:xfrm>
+      </p:grpSpPr>
+      <p:sp>
+        <p:nvSpPr>
+          <p:cNvPr id="2" name="Title 1">
+            <a:extLst>
+              <a:ext uri="{FF2B5EF4-FFF2-40B4-BE49-F238E27FC236}">
+                <a16:creationId xmlns:a16="http://schemas.microsoft.com/office/drawing/2014/main" id="{1E6A053C-1A6A-C145-B186-F24B16F523FD}"/>
+              </a:ext>
+            </a:extLst>
+          </p:cNvPr>
+          <p:cNvSpPr>
+            <a:spLocks noGrp="1"/>
+          </p:cNvSpPr>
+          <p:nvPr>
+            <p:ph type="title"/>
+          </p:nvPr>
+        </p:nvSpPr>
+        <p:spPr/>
+        <p:txBody>
+          <a:bodyPr/>
+          <a:lstStyle/>
+          <a:p>
+            <a:r>
+              <a:rPr lang="en-US" dirty="0"/>
+              <a:t>Transitive Closure</a:t>
+            </a:r>
+          </a:p>
+        </p:txBody>
+      </p:sp>
+      <mc:AlternateContent xmlns:mc="http://schemas.openxmlformats.org/markup-compatibility/2006">
+        <mc:Choice xmlns:a14="http://schemas.microsoft.com/office/drawing/2010/main" Requires="a14">
+          <p:sp>
+            <p:nvSpPr>
+              <p:cNvPr id="3" name="Content Placeholder 2">
+                <a:extLst>
+                  <a:ext uri="{FF2B5EF4-FFF2-40B4-BE49-F238E27FC236}">
+                    <a16:creationId xmlns:a16="http://schemas.microsoft.com/office/drawing/2014/main" id="{26AC91F6-4CFC-4C44-BA0D-DCF693AFD11A}"/>
+                  </a:ext>
+                </a:extLst>
+              </p:cNvPr>
+              <p:cNvSpPr>
+                <a:spLocks noGrp="1"/>
+              </p:cNvSpPr>
+              <p:nvPr>
+                <p:ph idx="1"/>
+              </p:nvPr>
+            </p:nvSpPr>
+            <p:spPr/>
+            <p:txBody>
+              <a:bodyPr>
+                <a:normAutofit/>
+              </a:bodyPr>
+              <a:lstStyle/>
+              <a:p>
+                <a:r>
+                  <a:rPr lang="en-US" dirty="0"/>
+                  <a:t>Transitive closure is the union of R and all of its successor relations</a:t>
+                </a:r>
+              </a:p>
+              <a:p>
+                <a:pPr lvl="1"/>
+                <a:r>
+                  <a:rPr lang="en-US" dirty="0"/>
+                  <a:t>I.e., </a:t>
+                </a:r>
+                <a14:m>
+                  <m:oMath xmlns:m="http://schemas.openxmlformats.org/officeDocument/2006/math">
+                    <m:nary>
+                      <m:naryPr>
+                        <m:chr m:val="⋃"/>
+                        <m:ctrlPr>
+                          <a:rPr lang="en-US" i="1" smtClean="0">
+                            <a:latin typeface="Cambria Math" panose="02040503050406030204" pitchFamily="18" charset="0"/>
+                          </a:rPr>
+                        </m:ctrlPr>
+                      </m:naryPr>
+                      <m:sub>
+                        <m:r>
+                          <m:rPr>
+                            <m:brk m:alnAt="23"/>
+                          </m:rPr>
+                          <a:rPr lang="en-US" b="0" i="1" smtClean="0">
+                            <a:latin typeface="Cambria Math" panose="02040503050406030204" pitchFamily="18" charset="0"/>
+                          </a:rPr>
+                          <m:t>𝑖</m:t>
+                        </m:r>
+                        <m:r>
+                          <a:rPr lang="en-US" b="0" i="1" smtClean="0">
+                            <a:latin typeface="Cambria Math" panose="02040503050406030204" pitchFamily="18" charset="0"/>
+                          </a:rPr>
+                          <m:t>=1</m:t>
+                        </m:r>
+                      </m:sub>
+                      <m:sup>
+                        <m:r>
+                          <a:rPr lang="en-US" b="0" i="1" smtClean="0">
+                            <a:latin typeface="Cambria Math" panose="02040503050406030204" pitchFamily="18" charset="0"/>
+                          </a:rPr>
+                          <m:t>∞</m:t>
+                        </m:r>
+                      </m:sup>
+                      <m:e>
+                        <m:sSup>
+                          <m:sSupPr>
+                            <m:ctrlPr>
+                              <a:rPr lang="en-US" i="1" smtClean="0">
+                                <a:latin typeface="Cambria Math" panose="02040503050406030204" pitchFamily="18" charset="0"/>
+                              </a:rPr>
+                            </m:ctrlPr>
+                          </m:sSupPr>
+                          <m:e>
+                            <m:r>
+                              <a:rPr lang="en-US" b="0" i="1" smtClean="0">
+                                <a:latin typeface="Cambria Math" panose="02040503050406030204" pitchFamily="18" charset="0"/>
+                              </a:rPr>
+                              <m:t>𝑅</m:t>
+                            </m:r>
+                          </m:e>
+                          <m:sup>
+                            <m:r>
+                              <a:rPr lang="en-US" b="0" i="1" smtClean="0">
+                                <a:latin typeface="Cambria Math" panose="02040503050406030204" pitchFamily="18" charset="0"/>
+                              </a:rPr>
+                              <m:t>𝑖</m:t>
+                            </m:r>
+                          </m:sup>
+                        </m:sSup>
+                      </m:e>
+                    </m:nary>
+                  </m:oMath>
+                </a14:m>
+                <a:endParaRPr lang="en-US" dirty="0"/>
+              </a:p>
+              <a:p>
+                <a:pPr lvl="1"/>
+                <a:r>
+                  <a:rPr lang="en-US" dirty="0"/>
+                  <a:t>The transitive closure of “is one or two less than” is the relation “&lt;”</a:t>
+                </a:r>
+              </a:p>
+              <a:p>
+                <a:r>
+                  <a:rPr lang="en-US" dirty="0"/>
+                  <a:t>The transitive closure of a transitive closure is itself</a:t>
+                </a:r>
+              </a:p>
+              <a:p>
+                <a:pPr lvl="1"/>
+                <a:r>
+                  <a:rPr lang="en-US" dirty="0"/>
+                  <a:t>E.g., the transitive closure of “&lt;“ is “&lt;“</a:t>
+                </a:r>
+              </a:p>
+              <a:p>
+                <a:r>
+                  <a:rPr lang="en-US" dirty="0"/>
+                  <a:t>Teaser:</a:t>
+                </a:r>
+              </a:p>
+              <a:p>
+                <a:pPr marL="0" indent="0">
+                  <a:buNone/>
+                </a:pPr>
+                <a:r>
+                  <a:rPr lang="en-US" sz="2000" dirty="0">
+                    <a:latin typeface="Courier New" panose="02070309020205020404" pitchFamily="49" charset="0"/>
+                    <a:cs typeface="Courier New" panose="02070309020205020404" pitchFamily="49" charset="0"/>
+                  </a:rPr>
+                  <a:t>inductive </a:t>
+                </a:r>
+                <a:r>
+                  <a:rPr lang="en-US" sz="2000" dirty="0" err="1">
+                    <a:latin typeface="Courier New" panose="02070309020205020404" pitchFamily="49" charset="0"/>
+                    <a:cs typeface="Courier New" panose="02070309020205020404" pitchFamily="49" charset="0"/>
+                  </a:rPr>
+                  <a:t>tc</a:t>
+                </a:r>
+                <a:r>
+                  <a:rPr lang="en-US" sz="2000" dirty="0">
+                    <a:latin typeface="Courier New" panose="02070309020205020404" pitchFamily="49" charset="0"/>
+                    <a:cs typeface="Courier New" panose="02070309020205020404" pitchFamily="49" charset="0"/>
+                  </a:rPr>
+                  <a:t> {</a:t>
+                </a:r>
+                <a:r>
+                  <a:rPr lang="el-GR" sz="2000" dirty="0">
+                    <a:latin typeface="Courier New" panose="02070309020205020404" pitchFamily="49" charset="0"/>
+                    <a:cs typeface="Courier New" panose="02070309020205020404" pitchFamily="49" charset="0"/>
+                  </a:rPr>
+                  <a:t>α : </a:t>
+                </a:r>
+                <a:r>
+                  <a:rPr lang="en-US" sz="2000" dirty="0">
+                    <a:latin typeface="Courier New" panose="02070309020205020404" pitchFamily="49" charset="0"/>
+                    <a:cs typeface="Courier New" panose="02070309020205020404" pitchFamily="49" charset="0"/>
+                  </a:rPr>
+                  <a:t>Type} (r : </a:t>
+                </a:r>
+                <a:r>
+                  <a:rPr lang="el-GR" sz="2000" dirty="0">
+                    <a:latin typeface="Courier New" panose="02070309020205020404" pitchFamily="49" charset="0"/>
+                    <a:cs typeface="Courier New" panose="02070309020205020404" pitchFamily="49" charset="0"/>
+                  </a:rPr>
+                  <a:t>α → α → </a:t>
+                </a:r>
+                <a:r>
+                  <a:rPr lang="en-US" sz="2000" dirty="0">
+                    <a:latin typeface="Courier New" panose="02070309020205020404" pitchFamily="49" charset="0"/>
+                    <a:cs typeface="Courier New" panose="02070309020205020404" pitchFamily="49" charset="0"/>
+                  </a:rPr>
+                  <a:t>Prop) : </a:t>
+                </a:r>
+                <a:r>
+                  <a:rPr lang="el-GR" sz="2000" dirty="0">
+                    <a:latin typeface="Courier New" panose="02070309020205020404" pitchFamily="49" charset="0"/>
+                    <a:cs typeface="Courier New" panose="02070309020205020404" pitchFamily="49" charset="0"/>
+                  </a:rPr>
+                  <a:t>α → α → </a:t>
+                </a:r>
+                <a:r>
+                  <a:rPr lang="en-US" sz="2000" dirty="0">
+                    <a:latin typeface="Courier New" panose="02070309020205020404" pitchFamily="49" charset="0"/>
+                    <a:cs typeface="Courier New" panose="02070309020205020404" pitchFamily="49" charset="0"/>
+                  </a:rPr>
+                  <a:t>Prop</a:t>
+                </a:r>
+              </a:p>
+              <a:p>
+                <a:pPr marL="0" indent="0">
+                  <a:buNone/>
+                </a:pPr>
+                <a:r>
+                  <a:rPr lang="en-US" sz="2000" dirty="0">
+                    <a:latin typeface="Courier New" panose="02070309020205020404" pitchFamily="49" charset="0"/>
+                    <a:cs typeface="Courier New" panose="02070309020205020404" pitchFamily="49" charset="0"/>
+                  </a:rPr>
+                  <a:t>  | base : ∀ a b, r a b → </a:t>
+                </a:r>
+                <a:r>
+                  <a:rPr lang="en-US" sz="2000" dirty="0" err="1">
+                    <a:latin typeface="Courier New" panose="02070309020205020404" pitchFamily="49" charset="0"/>
+                    <a:cs typeface="Courier New" panose="02070309020205020404" pitchFamily="49" charset="0"/>
+                  </a:rPr>
+                  <a:t>tc</a:t>
+                </a:r>
+                <a:r>
+                  <a:rPr lang="en-US" sz="2000" dirty="0">
+                    <a:latin typeface="Courier New" panose="02070309020205020404" pitchFamily="49" charset="0"/>
+                    <a:cs typeface="Courier New" panose="02070309020205020404" pitchFamily="49" charset="0"/>
+                  </a:rPr>
+                  <a:t> a b</a:t>
+                </a:r>
+              </a:p>
+              <a:p>
+                <a:pPr marL="0" indent="0">
+                  <a:buNone/>
+                </a:pPr>
+                <a:r>
+                  <a:rPr lang="en-US" sz="2000">
+                    <a:latin typeface="Courier New" panose="02070309020205020404" pitchFamily="49" charset="0"/>
+                    <a:cs typeface="Courier New" panose="02070309020205020404" pitchFamily="49" charset="0"/>
+                  </a:rPr>
+                  <a:t>  | </a:t>
+                </a:r>
+                <a:r>
+                  <a:rPr lang="en-US" sz="2000" dirty="0">
+                    <a:latin typeface="Courier New" panose="02070309020205020404" pitchFamily="49" charset="0"/>
+                    <a:cs typeface="Courier New" panose="02070309020205020404" pitchFamily="49" charset="0"/>
+                  </a:rPr>
+                  <a:t>trans : ∀ a b c, </a:t>
+                </a:r>
+                <a:r>
+                  <a:rPr lang="en-US" sz="2000" dirty="0" err="1">
+                    <a:latin typeface="Courier New" panose="02070309020205020404" pitchFamily="49" charset="0"/>
+                    <a:cs typeface="Courier New" panose="02070309020205020404" pitchFamily="49" charset="0"/>
+                  </a:rPr>
+                  <a:t>tc</a:t>
+                </a:r>
+                <a:r>
+                  <a:rPr lang="en-US" sz="2000" dirty="0">
+                    <a:latin typeface="Courier New" panose="02070309020205020404" pitchFamily="49" charset="0"/>
+                    <a:cs typeface="Courier New" panose="02070309020205020404" pitchFamily="49" charset="0"/>
+                  </a:rPr>
+                  <a:t> a b → </a:t>
+                </a:r>
+                <a:r>
+                  <a:rPr lang="en-US" sz="2000" dirty="0" err="1">
+                    <a:latin typeface="Courier New" panose="02070309020205020404" pitchFamily="49" charset="0"/>
+                    <a:cs typeface="Courier New" panose="02070309020205020404" pitchFamily="49" charset="0"/>
+                  </a:rPr>
+                  <a:t>tc</a:t>
+                </a:r>
+                <a:r>
+                  <a:rPr lang="en-US" sz="2000" dirty="0">
+                    <a:latin typeface="Courier New" panose="02070309020205020404" pitchFamily="49" charset="0"/>
+                    <a:cs typeface="Courier New" panose="02070309020205020404" pitchFamily="49" charset="0"/>
+                  </a:rPr>
+                  <a:t> b c → </a:t>
+                </a:r>
+                <a:r>
+                  <a:rPr lang="en-US" sz="2000" dirty="0" err="1">
+                    <a:latin typeface="Courier New" panose="02070309020205020404" pitchFamily="49" charset="0"/>
+                    <a:cs typeface="Courier New" panose="02070309020205020404" pitchFamily="49" charset="0"/>
+                  </a:rPr>
+                  <a:t>tc</a:t>
+                </a:r>
+                <a:r>
+                  <a:rPr lang="en-US" sz="2000" dirty="0">
+                    <a:latin typeface="Courier New" panose="02070309020205020404" pitchFamily="49" charset="0"/>
+                    <a:cs typeface="Courier New" panose="02070309020205020404" pitchFamily="49" charset="0"/>
+                  </a:rPr>
+                  <a:t> a c</a:t>
+                </a:r>
+              </a:p>
+              <a:p>
+                <a:pPr marL="0" indent="0">
+                  <a:buNone/>
+                </a:pPr>
+                <a:endParaRPr lang="en-US" dirty="0"/>
+              </a:p>
+            </p:txBody>
+          </p:sp>
+        </mc:Choice>
+        <mc:Fallback>
+          <p:sp>
+            <p:nvSpPr>
+              <p:cNvPr id="3" name="Content Placeholder 2">
+                <a:extLst>
+                  <a:ext uri="{FF2B5EF4-FFF2-40B4-BE49-F238E27FC236}">
+                    <a16:creationId xmlns:a16="http://schemas.microsoft.com/office/drawing/2014/main" id="{26AC91F6-4CFC-4C44-BA0D-DCF693AFD11A}"/>
+                  </a:ext>
+                </a:extLst>
+              </p:cNvPr>
+              <p:cNvSpPr>
+                <a:spLocks noGrp="1" noRot="1" noChangeAspect="1" noMove="1" noResize="1" noEditPoints="1" noAdjustHandles="1" noChangeArrowheads="1" noChangeShapeType="1" noTextEdit="1"/>
+              </p:cNvSpPr>
+              <p:nvPr>
+                <p:ph idx="1"/>
+              </p:nvPr>
+            </p:nvSpPr>
+            <p:spPr>
+              <a:blipFill>
+                <a:blip r:embed="rId2"/>
+                <a:stretch>
+                  <a:fillRect l="-965" t="-2632"/>
+                </a:stretch>
+              </a:blipFill>
+            </p:spPr>
+            <p:txBody>
+              <a:bodyPr/>
+              <a:lstStyle/>
+              <a:p>
+                <a:r>
+                  <a:rPr lang="en-US">
+                    <a:noFill/>
+                  </a:rPr>
+                  <a:t> </a:t>
+                </a:r>
+              </a:p>
+            </p:txBody>
+          </p:sp>
+        </mc:Fallback>
+      </mc:AlternateContent>
+      <p:sp>
+        <p:nvSpPr>
+          <p:cNvPr id="4" name="Slide Number Placeholder 3">
+            <a:extLst>
+              <a:ext uri="{FF2B5EF4-FFF2-40B4-BE49-F238E27FC236}">
+                <a16:creationId xmlns:a16="http://schemas.microsoft.com/office/drawing/2014/main" id="{BFB842C2-0E60-5C49-B86F-A828A2A11145}"/>
+              </a:ext>
+            </a:extLst>
+          </p:cNvPr>
+          <p:cNvSpPr>
+            <a:spLocks noGrp="1"/>
+          </p:cNvSpPr>
+          <p:nvPr>
+            <p:ph type="sldNum" sz="quarter" idx="12"/>
+          </p:nvPr>
+        </p:nvSpPr>
+        <p:spPr/>
+        <p:txBody>
+          <a:bodyPr/>
+          <a:lstStyle/>
+          <a:p>
+            <a:fld id="{3352CBF5-17B8-4387-88A6-ABF9F8C64D5A}" type="slidenum">
+              <a:rPr lang="en-US" smtClean="0"/>
+              <a:t>11</a:t>
+            </a:fld>
+            <a:endParaRPr lang="en-US"/>
+          </a:p>
+        </p:txBody>
+      </p:sp>
+    </p:spTree>
+    <p:extLst>
+      <p:ext uri="{BB962C8B-B14F-4D97-AF65-F5344CB8AC3E}">
+        <p14:creationId xmlns:p14="http://schemas.microsoft.com/office/powerpoint/2010/main" val="148094795"/>
+      </p:ext>
+    </p:extLst>
+  </p:cSld>
+  <p:clrMapOvr>
+    <a:masterClrMapping/>
+  </p:clrMapOvr>
+</p:sld>
+</file>
+
+<file path=ppt/slides/slide12.xml><?xml version="1.0" encoding="utf-8"?>
+<p:sld xmlns:a="http://schemas.openxmlformats.org/drawingml/2006/main" xmlns:r="http://schemas.openxmlformats.org/officeDocument/2006/relationships" xmlns:p="http://schemas.openxmlformats.org/presentationml/2006/main">
+  <p:cSld>
+    <p:bg>
+      <p:bgPr>
+        <a:solidFill>
+          <a:schemeClr val="bg1"/>
+        </a:solidFill>
+        <a:effectLst/>
+      </p:bgPr>
+    </p:bg>
+    <p:spTree>
+      <p:nvGrpSpPr>
+        <p:cNvPr id="1" name=""/>
+        <p:cNvGrpSpPr/>
+        <p:nvPr/>
+      </p:nvGrpSpPr>
+      <p:grpSpPr>
+        <a:xfrm>
+          <a:off x="0" y="0"/>
+          <a:ext cx="0" cy="0"/>
+          <a:chOff x="0" y="0"/>
+          <a:chExt cx="0" cy="0"/>
+        </a:xfrm>
+      </p:grpSpPr>
+      <p:sp useBgFill="1">
+        <p:nvSpPr>
+          <p:cNvPr id="9" name="Rectangle 8">
+            <a:extLst>
+              <a:ext uri="{FF2B5EF4-FFF2-40B4-BE49-F238E27FC236}">
+                <a16:creationId xmlns:a16="http://schemas.microsoft.com/office/drawing/2014/main" id="{3B854194-185D-494D-905C-7C7CB2E30F6E}"/>
+              </a:ext>
+              <a:ext uri="{C183D7F6-B498-43B3-948B-1728B52AA6E4}">
+                <adec:decorative xmlns:adec="http://schemas.microsoft.com/office/drawing/2017/decorative" val="1"/>
+              </a:ext>
+            </a:extLst>
+          </p:cNvPr>
+          <p:cNvSpPr>
+            <a:spLocks noGrp="1" noRot="1" noChangeAspect="1" noMove="1" noResize="1" noEditPoints="1" noAdjustHandles="1" noChangeArrowheads="1" noChangeShapeType="1" noTextEdit="1"/>
+          </p:cNvSpPr>
+          <p:nvPr>
+            <p:extLst>
+              <p:ext uri="{386F3935-93C4-4BCD-93E2-E3B085C9AB24}">
+                <p16:designElem xmlns:p16="http://schemas.microsoft.com/office/powerpoint/2015/main" val="1"/>
+              </p:ext>
+            </p:extLst>
+          </p:nvPr>
+        </p:nvSpPr>
+        <p:spPr>
+          <a:xfrm>
+            <a:off x="1" y="0"/>
+            <a:ext cx="6082110" cy="6858000"/>
+          </a:xfrm>
+          <a:prstGeom prst="rect">
+            <a:avLst/>
+          </a:prstGeom>
+          <a:ln>
+            <a:noFill/>
+          </a:ln>
+        </p:spPr>
+        <p:style>
+          <a:lnRef idx="2">
+            <a:schemeClr val="accent1">
+              <a:shade val="50000"/>
+            </a:schemeClr>
+          </a:lnRef>
+          <a:fillRef idx="1">
+            <a:schemeClr val="accent1"/>
+          </a:fillRef>
+          <a:effectRef idx="0">
+            <a:schemeClr val="accent1"/>
+          </a:effectRef>
+          <a:fontRef idx="minor">
+            <a:schemeClr val="lt1"/>
+          </a:fontRef>
+        </p:style>
+        <p:txBody>
+          <a:bodyPr rtlCol="0" anchor="ctr"/>
+          <a:lstStyle/>
+          <a:p>
+            <a:pPr algn="ctr"/>
+            <a:endParaRPr lang="en-US"/>
+          </a:p>
+        </p:txBody>
+      </p:sp>
+      <p:sp>
+        <p:nvSpPr>
+          <p:cNvPr id="11" name="Rectangle 10">
+            <a:extLst>
+              <a:ext uri="{FF2B5EF4-FFF2-40B4-BE49-F238E27FC236}">
+                <a16:creationId xmlns:a16="http://schemas.microsoft.com/office/drawing/2014/main" id="{B4F5FA0D-0104-4987-8241-EFF7C85B88DE}"/>
+              </a:ext>
+              <a:ext uri="{C183D7F6-B498-43B3-948B-1728B52AA6E4}">
+                <adec:decorative xmlns:adec="http://schemas.microsoft.com/office/drawing/2017/decorative" val="1"/>
+              </a:ext>
+            </a:extLst>
+          </p:cNvPr>
+          <p:cNvSpPr>
+            <a:spLocks noGrp="1" noRot="1" noChangeAspect="1" noMove="1" noResize="1" noEditPoints="1" noAdjustHandles="1" noChangeArrowheads="1" noChangeShapeType="1" noTextEdit="1"/>
+          </p:cNvSpPr>
+          <p:nvPr>
+            <p:extLst>
+              <p:ext uri="{386F3935-93C4-4BCD-93E2-E3B085C9AB24}">
+                <p16:designElem xmlns:p16="http://schemas.microsoft.com/office/powerpoint/2015/main" val="1"/>
+              </p:ext>
+            </p:extLst>
+          </p:nvPr>
+        </p:nvSpPr>
+        <p:spPr>
+          <a:xfrm>
+            <a:off x="1" y="0"/>
+            <a:ext cx="12191998" cy="6858000"/>
+          </a:xfrm>
+          <a:prstGeom prst="rect">
+            <a:avLst/>
+          </a:prstGeom>
+          <a:gradFill>
+            <a:gsLst>
+              <a:gs pos="0">
+                <a:schemeClr val="accent1">
+                  <a:lumMod val="90000"/>
+                </a:schemeClr>
+              </a:gs>
+              <a:gs pos="25000">
+                <a:schemeClr val="accent1">
+                  <a:lumMod val="90000"/>
+                </a:schemeClr>
+              </a:gs>
+              <a:gs pos="94000">
+                <a:schemeClr val="bg2">
+                  <a:lumMod val="25000"/>
+                </a:schemeClr>
+              </a:gs>
+              <a:gs pos="100000">
+                <a:schemeClr val="bg2">
+                  <a:lumMod val="25000"/>
+                </a:schemeClr>
+              </a:gs>
+            </a:gsLst>
+            <a:lin ang="4200000" scaled="0"/>
+          </a:gradFill>
+          <a:ln>
+            <a:noFill/>
+          </a:ln>
+        </p:spPr>
+        <p:style>
+          <a:lnRef idx="2">
+            <a:schemeClr val="accent1">
+              <a:shade val="50000"/>
+            </a:schemeClr>
+          </a:lnRef>
+          <a:fillRef idx="1">
+            <a:schemeClr val="accent1"/>
+          </a:fillRef>
+          <a:effectRef idx="0">
+            <a:schemeClr val="accent1"/>
+          </a:effectRef>
+          <a:fontRef idx="minor">
+            <a:schemeClr val="lt1"/>
+          </a:fontRef>
+        </p:style>
+        <p:txBody>
+          <a:bodyPr rtlCol="0" anchor="ctr"/>
+          <a:lstStyle/>
+          <a:p>
+            <a:pPr algn="ctr"/>
+            <a:endParaRPr lang="en-US"/>
+          </a:p>
+        </p:txBody>
+      </p:sp>
+      <p:pic>
+        <p:nvPicPr>
+          <p:cNvPr id="13" name="Picture 12">
+            <a:extLst>
+              <a:ext uri="{FF2B5EF4-FFF2-40B4-BE49-F238E27FC236}">
+                <a16:creationId xmlns:a16="http://schemas.microsoft.com/office/drawing/2014/main" id="{2897127E-6CEF-446C-BE87-93B7C46E49D1}"/>
+              </a:ext>
+              <a:ext uri="{C183D7F6-B498-43B3-948B-1728B52AA6E4}">
+                <adec:decorative xmlns:adec="http://schemas.microsoft.com/office/drawing/2017/decorative" val="1"/>
+              </a:ext>
+            </a:extLst>
+          </p:cNvPr>
+          <p:cNvPicPr>
+            <a:picLocks noGrp="1" noRot="1" noChangeAspect="1" noMove="1" noResize="1" noEditPoints="1" noAdjustHandles="1" noChangeArrowheads="1" noChangeShapeType="1" noCrop="1"/>
+          </p:cNvPicPr>
+          <p:nvPr>
+            <p:extLst>
+              <p:ext uri="{386F3935-93C4-4BCD-93E2-E3B085C9AB24}">
+                <p16:designElem xmlns:p16="http://schemas.microsoft.com/office/powerpoint/2015/main" val="1"/>
+              </p:ext>
+            </p:extLst>
+          </p:nvPr>
+        </p:nvPicPr>
+        <p:blipFill>
+          <a:blip r:embed="rId2">
+            <a:extLst>
+              <a:ext uri="{28A0092B-C50C-407E-A947-70E740481C1C}">
+                <a14:useLocalDpi xmlns:a14="http://schemas.microsoft.com/office/drawing/2010/main" val="0"/>
+              </a:ext>
+            </a:extLst>
+          </a:blip>
+          <a:stretch>
+            <a:fillRect/>
+          </a:stretch>
+        </p:blipFill>
+        <p:spPr>
+          <a:xfrm>
+            <a:off x="0" y="0"/>
+            <a:ext cx="12192000" cy="6858000"/>
+          </a:xfrm>
+          <a:prstGeom prst="rect">
+            <a:avLst/>
+          </a:prstGeom>
+        </p:spPr>
+      </p:pic>
+      <p:sp>
+        <p:nvSpPr>
+          <p:cNvPr id="2" name="Title 1"/>
+          <p:cNvSpPr>
+            <a:spLocks noGrp="1"/>
+          </p:cNvSpPr>
+          <p:nvPr>
+            <p:ph type="title"/>
+          </p:nvPr>
+        </p:nvSpPr>
+        <p:spPr>
+          <a:xfrm>
+            <a:off x="640079" y="2053641"/>
+            <a:ext cx="3669161" cy="2760098"/>
+          </a:xfrm>
+        </p:spPr>
+        <p:txBody>
+          <a:bodyPr>
+            <a:normAutofit/>
+          </a:bodyPr>
+          <a:lstStyle/>
+          <a:p>
+            <a:r>
+              <a:rPr lang="en-US">
+                <a:solidFill>
+                  <a:srgbClr val="FFFFFF"/>
+                </a:solidFill>
+              </a:rPr>
+              <a:t>Fin</a:t>
+            </a:r>
+          </a:p>
+        </p:txBody>
+      </p:sp>
+      <p:sp>
+        <p:nvSpPr>
+          <p:cNvPr id="3" name="Slide Number Placeholder 2">
+            <a:extLst>
+              <a:ext uri="{FF2B5EF4-FFF2-40B4-BE49-F238E27FC236}">
+                <a16:creationId xmlns:a16="http://schemas.microsoft.com/office/drawing/2014/main" id="{44CF5CC1-6533-6043-9D5F-346506703E3A}"/>
+              </a:ext>
+            </a:extLst>
+          </p:cNvPr>
+          <p:cNvSpPr>
+            <a:spLocks noGrp="1"/>
+          </p:cNvSpPr>
+          <p:nvPr>
+            <p:ph type="sldNum" sz="quarter" idx="12"/>
+          </p:nvPr>
+        </p:nvSpPr>
+        <p:spPr/>
+        <p:txBody>
+          <a:bodyPr/>
+          <a:lstStyle/>
+          <a:p>
+            <a:fld id="{3352CBF5-17B8-4387-88A6-ABF9F8C64D5A}" type="slidenum">
+              <a:rPr lang="en-US" smtClean="0"/>
+              <a:t>12</a:t>
+            </a:fld>
+            <a:endParaRPr lang="en-US"/>
+          </a:p>
+        </p:txBody>
+      </p:sp>
+    </p:spTree>
+    <p:extLst>
+      <p:ext uri="{BB962C8B-B14F-4D97-AF65-F5344CB8AC3E}">
+        <p14:creationId xmlns:p14="http://schemas.microsoft.com/office/powerpoint/2010/main" val="628979899"/>
+      </p:ext>
+    </p:extLst>
+  </p:cSld>
+  <p:clrMapOvr>
+    <a:masterClrMapping/>
+  </p:clrMapOvr>
+</p:sld>
+</file>
+
 <file path=ppt/slides/slide2.xml><?xml version="1.0" encoding="utf-8"?>
 <p:sld xmlns:a="http://schemas.openxmlformats.org/drawingml/2006/main" xmlns:r="http://schemas.openxmlformats.org/officeDocument/2006/relationships" xmlns:p="http://schemas.openxmlformats.org/presentationml/2006/main">
   <p:cSld>
@@ -5014,14 +5969,6 @@
 <file path=ppt/slides/slide9.xml><?xml version="1.0" encoding="utf-8"?>
 <p:sld xmlns:a="http://schemas.openxmlformats.org/drawingml/2006/main" xmlns:r="http://schemas.openxmlformats.org/officeDocument/2006/relationships" xmlns:p="http://schemas.openxmlformats.org/presentationml/2006/main">
   <p:cSld>
-    <p:bg>
-      <p:bgPr>
-        <a:solidFill>
-          <a:schemeClr val="bg1"/>
-        </a:solidFill>
-        <a:effectLst/>
-      </p:bgPr>
-    </p:bg>
     <p:spTree>
       <p:nvGrpSpPr>
         <p:cNvPr id="1" name=""/>
@@ -5036,235 +5983,174 @@
           <a:chExt cx="0" cy="0"/>
         </a:xfrm>
       </p:grpSpPr>
-      <p:sp useBgFill="1">
-        <p:nvSpPr>
-          <p:cNvPr id="9" name="Rectangle 8">
+      <p:sp>
+        <p:nvSpPr>
+          <p:cNvPr id="2" name="Title 1">
             <a:extLst>
               <a:ext uri="{FF2B5EF4-FFF2-40B4-BE49-F238E27FC236}">
-                <a16:creationId xmlns:a16="http://schemas.microsoft.com/office/drawing/2014/main" id="{3B854194-185D-494D-905C-7C7CB2E30F6E}"/>
-              </a:ext>
-              <a:ext uri="{C183D7F6-B498-43B3-948B-1728B52AA6E4}">
-                <adec:decorative xmlns:adec="http://schemas.microsoft.com/office/drawing/2017/decorative" val="1"/>
+                <a16:creationId xmlns:a16="http://schemas.microsoft.com/office/drawing/2014/main" id="{803C7C4C-2BF4-1442-A6D3-4A3F9949A35C}"/>
               </a:ext>
             </a:extLst>
           </p:cNvPr>
           <p:cNvSpPr>
-            <a:spLocks noGrp="1" noRot="1" noChangeAspect="1" noMove="1" noResize="1" noEditPoints="1" noAdjustHandles="1" noChangeArrowheads="1" noChangeShapeType="1" noTextEdit="1"/>
-          </p:cNvSpPr>
-          <p:nvPr>
-            <p:extLst>
-              <p:ext uri="{386F3935-93C4-4BCD-93E2-E3B085C9AB24}">
-                <p16:designElem xmlns:p16="http://schemas.microsoft.com/office/powerpoint/2015/main" val="1"/>
-              </p:ext>
-            </p:extLst>
-          </p:nvPr>
-        </p:nvSpPr>
-        <p:spPr>
-          <a:xfrm>
-            <a:off x="1" y="0"/>
-            <a:ext cx="6082110" cy="6858000"/>
-          </a:xfrm>
-          <a:prstGeom prst="rect">
-            <a:avLst/>
-          </a:prstGeom>
-          <a:ln>
-            <a:noFill/>
-          </a:ln>
-        </p:spPr>
-        <p:style>
-          <a:lnRef idx="2">
-            <a:schemeClr val="accent1">
-              <a:shade val="50000"/>
-            </a:schemeClr>
-          </a:lnRef>
-          <a:fillRef idx="1">
-            <a:schemeClr val="accent1"/>
-          </a:fillRef>
-          <a:effectRef idx="0">
-            <a:schemeClr val="accent1"/>
-          </a:effectRef>
-          <a:fontRef idx="minor">
-            <a:schemeClr val="lt1"/>
-          </a:fontRef>
-        </p:style>
-        <p:txBody>
-          <a:bodyPr rtlCol="0" anchor="ctr"/>
-          <a:lstStyle/>
-          <a:p>
-            <a:pPr algn="ctr"/>
-            <a:endParaRPr lang="en-US"/>
-          </a:p>
-        </p:txBody>
-      </p:sp>
-      <p:sp>
-        <p:nvSpPr>
-          <p:cNvPr id="11" name="Rectangle 10">
+            <a:spLocks noGrp="1"/>
+          </p:cNvSpPr>
+          <p:nvPr>
+            <p:ph type="title"/>
+          </p:nvPr>
+        </p:nvSpPr>
+        <p:spPr/>
+        <p:txBody>
+          <a:bodyPr/>
+          <a:lstStyle/>
+          <a:p>
+            <a:r>
+              <a:rPr lang="en-US" dirty="0"/>
+              <a:t>Successor Relation</a:t>
+            </a:r>
+          </a:p>
+        </p:txBody>
+      </p:sp>
+      <p:sp>
+        <p:nvSpPr>
+          <p:cNvPr id="3" name="Content Placeholder 2">
             <a:extLst>
               <a:ext uri="{FF2B5EF4-FFF2-40B4-BE49-F238E27FC236}">
-                <a16:creationId xmlns:a16="http://schemas.microsoft.com/office/drawing/2014/main" id="{B4F5FA0D-0104-4987-8241-EFF7C85B88DE}"/>
-              </a:ext>
-              <a:ext uri="{C183D7F6-B498-43B3-948B-1728B52AA6E4}">
-                <adec:decorative xmlns:adec="http://schemas.microsoft.com/office/drawing/2017/decorative" val="1"/>
+                <a16:creationId xmlns:a16="http://schemas.microsoft.com/office/drawing/2014/main" id="{DD455549-A922-674E-A6A8-67B8CAB6F221}"/>
               </a:ext>
             </a:extLst>
           </p:cNvPr>
           <p:cNvSpPr>
-            <a:spLocks noGrp="1" noRot="1" noChangeAspect="1" noMove="1" noResize="1" noEditPoints="1" noAdjustHandles="1" noChangeArrowheads="1" noChangeShapeType="1" noTextEdit="1"/>
-          </p:cNvSpPr>
-          <p:nvPr>
-            <p:extLst>
-              <p:ext uri="{386F3935-93C4-4BCD-93E2-E3B085C9AB24}">
-                <p16:designElem xmlns:p16="http://schemas.microsoft.com/office/powerpoint/2015/main" val="1"/>
-              </p:ext>
-            </p:extLst>
+            <a:spLocks noGrp="1"/>
+          </p:cNvSpPr>
+          <p:nvPr>
+            <p:ph idx="1"/>
           </p:nvPr>
         </p:nvSpPr>
         <p:spPr>
           <a:xfrm>
-            <a:off x="1" y="0"/>
-            <a:ext cx="12191998" cy="6858000"/>
+            <a:off x="838200" y="1603169"/>
+            <a:ext cx="10515600" cy="4573794"/>
           </a:xfrm>
-          <a:prstGeom prst="rect">
-            <a:avLst/>
-          </a:prstGeom>
-          <a:gradFill>
-            <a:gsLst>
-              <a:gs pos="0">
-                <a:schemeClr val="accent1">
-                  <a:lumMod val="90000"/>
-                </a:schemeClr>
-              </a:gs>
-              <a:gs pos="25000">
-                <a:schemeClr val="accent1">
-                  <a:lumMod val="90000"/>
-                </a:schemeClr>
-              </a:gs>
-              <a:gs pos="94000">
-                <a:schemeClr val="bg2">
-                  <a:lumMod val="25000"/>
-                </a:schemeClr>
-              </a:gs>
-              <a:gs pos="100000">
-                <a:schemeClr val="bg2">
-                  <a:lumMod val="25000"/>
-                </a:schemeClr>
-              </a:gs>
-            </a:gsLst>
-            <a:lin ang="4200000" scaled="0"/>
-          </a:gradFill>
-          <a:ln>
-            <a:noFill/>
-          </a:ln>
         </p:spPr>
-        <p:style>
-          <a:lnRef idx="2">
-            <a:schemeClr val="accent1">
-              <a:shade val="50000"/>
-            </a:schemeClr>
-          </a:lnRef>
-          <a:fillRef idx="1">
-            <a:schemeClr val="accent1"/>
-          </a:fillRef>
-          <a:effectRef idx="0">
-            <a:schemeClr val="accent1"/>
-          </a:effectRef>
-          <a:fontRef idx="minor">
-            <a:schemeClr val="lt1"/>
-          </a:fontRef>
-        </p:style>
-        <p:txBody>
-          <a:bodyPr rtlCol="0" anchor="ctr"/>
-          <a:lstStyle/>
-          <a:p>
-            <a:pPr algn="ctr"/>
-            <a:endParaRPr lang="en-US"/>
-          </a:p>
-        </p:txBody>
-      </p:sp>
-      <p:pic>
-        <p:nvPicPr>
-          <p:cNvPr id="13" name="Picture 12">
+        <p:txBody>
+          <a:bodyPr>
+            <a:normAutofit fontScale="92500" lnSpcReduction="20000"/>
+          </a:bodyPr>
+          <a:lstStyle/>
+          <a:p>
+            <a:r>
+              <a:rPr lang="en-US" dirty="0"/>
+              <a:t>Let us define a relation R as R</a:t>
+            </a:r>
+            <a:r>
+              <a:rPr lang="en-US" baseline="30000" dirty="0"/>
+              <a:t>1</a:t>
+            </a:r>
+          </a:p>
+          <a:p>
+            <a:pPr lvl="1"/>
+            <a:r>
+              <a:rPr lang="en-US" dirty="0"/>
+              <a:t>For example imagine the relation “is one or two less than” as defined over the naturals</a:t>
+            </a:r>
+          </a:p>
+          <a:p>
+            <a:pPr lvl="2"/>
+            <a:r>
+              <a:rPr lang="en-US" dirty="0"/>
+              <a:t>It contains the 2-tuples {(0, 1), (0, 2), (1, 2), (1, 3), (2, 3), (2, 4), (3, 4), (3, 5), etc.}</a:t>
+            </a:r>
+          </a:p>
+          <a:p>
+            <a:r>
+              <a:rPr lang="en-US" dirty="0"/>
+              <a:t>Now let us define R</a:t>
+            </a:r>
+            <a:r>
+              <a:rPr lang="en-US" baseline="30000" dirty="0"/>
+              <a:t>2</a:t>
+            </a:r>
+            <a:r>
+              <a:rPr lang="en-US" dirty="0"/>
+              <a:t> (or R ◦ R) as the relation having left-hand elements equal to the left-hand elements of the tuples in R</a:t>
+            </a:r>
+            <a:r>
+              <a:rPr lang="en-US" baseline="30000" dirty="0"/>
+              <a:t>1</a:t>
+            </a:r>
+            <a:r>
+              <a:rPr lang="en-US" dirty="0"/>
+              <a:t>, and right-hand elements equal to the corresponding right-hand elements of the right-hand elements in R</a:t>
+            </a:r>
+            <a:r>
+              <a:rPr lang="en-US" baseline="30000" dirty="0"/>
+              <a:t>1</a:t>
+            </a:r>
+          </a:p>
+          <a:p>
+            <a:pPr lvl="1"/>
+            <a:r>
+              <a:rPr lang="en-US" dirty="0"/>
+              <a:t>E.g., from above this would be “is two, three, or four less than”</a:t>
+            </a:r>
+          </a:p>
+          <a:p>
+            <a:pPr lvl="2"/>
+            <a:r>
+              <a:rPr lang="en-US" dirty="0"/>
+              <a:t>It contains the 2-tuples {(0, 2), (0, 3), (0, 4), (1, 3), (1, 4), (1, 5), etc.)</a:t>
+            </a:r>
+          </a:p>
+          <a:p>
+            <a:r>
+              <a:rPr lang="en-US" dirty="0"/>
+              <a:t>R</a:t>
+            </a:r>
+            <a:r>
+              <a:rPr lang="en-US" baseline="30000" dirty="0"/>
+              <a:t>3</a:t>
+            </a:r>
+            <a:r>
+              <a:rPr lang="en-US" dirty="0"/>
+              <a:t> (or R ◦ R</a:t>
+            </a:r>
+            <a:r>
+              <a:rPr lang="en-US" baseline="30000" dirty="0"/>
+              <a:t>2</a:t>
+            </a:r>
+            <a:r>
+              <a:rPr lang="en-US" dirty="0"/>
+              <a:t>) is the relation having left-hand elements having left-hand elements equal to the left-hand elements of the tuples in R</a:t>
+            </a:r>
+            <a:r>
+              <a:rPr lang="en-US" baseline="30000" dirty="0"/>
+              <a:t>1</a:t>
+            </a:r>
+            <a:r>
+              <a:rPr lang="en-US" dirty="0"/>
+              <a:t>, and right-hand elements equal to the corresponding right-hand elements of the right-hand elements in R</a:t>
+            </a:r>
+            <a:r>
+              <a:rPr lang="en-US" baseline="30000" dirty="0"/>
+              <a:t>2</a:t>
+            </a:r>
+          </a:p>
+          <a:p>
+            <a:pPr lvl="1"/>
+            <a:r>
+              <a:rPr lang="en-US" dirty="0"/>
+              <a:t>E.g., from the above this would be “is three, four, or five less than”</a:t>
+            </a:r>
+          </a:p>
+        </p:txBody>
+      </p:sp>
+      <p:sp>
+        <p:nvSpPr>
+          <p:cNvPr id="4" name="Slide Number Placeholder 3">
             <a:extLst>
               <a:ext uri="{FF2B5EF4-FFF2-40B4-BE49-F238E27FC236}">
-                <a16:creationId xmlns:a16="http://schemas.microsoft.com/office/drawing/2014/main" id="{2897127E-6CEF-446C-BE87-93B7C46E49D1}"/>
-              </a:ext>
-              <a:ext uri="{C183D7F6-B498-43B3-948B-1728B52AA6E4}">
-                <adec:decorative xmlns:adec="http://schemas.microsoft.com/office/drawing/2017/decorative" val="1"/>
-              </a:ext>
-            </a:extLst>
-          </p:cNvPr>
-          <p:cNvPicPr>
-            <a:picLocks noGrp="1" noRot="1" noChangeAspect="1" noMove="1" noResize="1" noEditPoints="1" noAdjustHandles="1" noChangeArrowheads="1" noChangeShapeType="1" noCrop="1"/>
-          </p:cNvPicPr>
-          <p:nvPr>
-            <p:extLst>
-              <p:ext uri="{386F3935-93C4-4BCD-93E2-E3B085C9AB24}">
-                <p16:designElem xmlns:p16="http://schemas.microsoft.com/office/powerpoint/2015/main" val="1"/>
-              </p:ext>
-            </p:extLst>
-          </p:nvPr>
-        </p:nvPicPr>
-        <p:blipFill>
-          <a:blip r:embed="rId2">
-            <a:extLst>
-              <a:ext uri="{28A0092B-C50C-407E-A947-70E740481C1C}">
-                <a14:useLocalDpi xmlns:a14="http://schemas.microsoft.com/office/drawing/2010/main" val="0"/>
-              </a:ext>
-            </a:extLst>
-          </a:blip>
-          <a:stretch>
-            <a:fillRect/>
-          </a:stretch>
-        </p:blipFill>
-        <p:spPr>
-          <a:xfrm>
-            <a:off x="0" y="0"/>
-            <a:ext cx="12192000" cy="6858000"/>
-          </a:xfrm>
-          <a:prstGeom prst="rect">
-            <a:avLst/>
-          </a:prstGeom>
-        </p:spPr>
-      </p:pic>
-      <p:sp>
-        <p:nvSpPr>
-          <p:cNvPr id="2" name="Title 1"/>
-          <p:cNvSpPr>
-            <a:spLocks noGrp="1"/>
-          </p:cNvSpPr>
-          <p:nvPr>
-            <p:ph type="title"/>
-          </p:nvPr>
-        </p:nvSpPr>
-        <p:spPr>
-          <a:xfrm>
-            <a:off x="640079" y="2053641"/>
-            <a:ext cx="3669161" cy="2760098"/>
-          </a:xfrm>
-        </p:spPr>
-        <p:txBody>
-          <a:bodyPr>
-            <a:normAutofit/>
-          </a:bodyPr>
-          <a:lstStyle/>
-          <a:p>
-            <a:r>
-              <a:rPr lang="en-US">
-                <a:solidFill>
-                  <a:srgbClr val="FFFFFF"/>
-                </a:solidFill>
-              </a:rPr>
-              <a:t>Fin</a:t>
-            </a:r>
-          </a:p>
-        </p:txBody>
-      </p:sp>
-      <p:sp>
-        <p:nvSpPr>
-          <p:cNvPr id="3" name="Slide Number Placeholder 2">
-            <a:extLst>
-              <a:ext uri="{FF2B5EF4-FFF2-40B4-BE49-F238E27FC236}">
-                <a16:creationId xmlns:a16="http://schemas.microsoft.com/office/drawing/2014/main" id="{44CF5CC1-6533-6043-9D5F-346506703E3A}"/>
+                <a16:creationId xmlns:a16="http://schemas.microsoft.com/office/drawing/2014/main" id="{153DCD92-4CA0-E543-9B98-16CB3E3C2F5A}"/>
               </a:ext>
             </a:extLst>
           </p:cNvPr>
@@ -5288,10 +6174,42 @@
           </a:p>
         </p:txBody>
       </p:sp>
+      <p:sp>
+        <p:nvSpPr>
+          <p:cNvPr id="5" name="TextBox 4">
+            <a:extLst>
+              <a:ext uri="{FF2B5EF4-FFF2-40B4-BE49-F238E27FC236}">
+                <a16:creationId xmlns:a16="http://schemas.microsoft.com/office/drawing/2014/main" id="{B69D0F7B-4DFF-B344-8CEB-24A06208AFCA}"/>
+              </a:ext>
+            </a:extLst>
+          </p:cNvPr>
+          <p:cNvSpPr txBox="1"/>
+          <p:nvPr/>
+        </p:nvSpPr>
+        <p:spPr>
+          <a:xfrm>
+            <a:off x="-5303520" y="-2067951"/>
+            <a:ext cx="184731" cy="276999"/>
+          </a:xfrm>
+          <a:prstGeom prst="rect">
+            <a:avLst/>
+          </a:prstGeom>
+          <a:noFill/>
+        </p:spPr>
+        <p:txBody>
+          <a:bodyPr wrap="none" rtlCol="0">
+            <a:spAutoFit/>
+          </a:bodyPr>
+          <a:lstStyle/>
+          <a:p>
+            <a:endParaRPr lang="en-US" baseline="30000" dirty="0"/>
+          </a:p>
+        </p:txBody>
+      </p:sp>
     </p:spTree>
     <p:extLst>
       <p:ext uri="{BB962C8B-B14F-4D97-AF65-F5344CB8AC3E}">
-        <p14:creationId xmlns:p14="http://schemas.microsoft.com/office/powerpoint/2010/main" val="628979899"/>
+        <p14:creationId xmlns:p14="http://schemas.microsoft.com/office/powerpoint/2010/main" val="3538559300"/>
       </p:ext>
     </p:extLst>
   </p:cSld>

</xml_diff>

<commit_message>
Merged and updated slides and examples
</commit_message>
<xml_diff>
--- a/src/13_Relations/Relations.pptx
+++ b/src/13_Relations/Relations.pptx
@@ -5,7 +5,7 @@
     <p:sldMasterId id="2147483648" r:id="rId1"/>
   </p:sldMasterIdLst>
   <p:notesMasterIdLst>
-    <p:notesMasterId r:id="rId14"/>
+    <p:notesMasterId r:id="rId17"/>
   </p:notesMasterIdLst>
   <p:sldIdLst>
     <p:sldId id="258" r:id="rId2"/>
@@ -14,12 +14,15 @@
     <p:sldId id="358" r:id="rId5"/>
     <p:sldId id="359" r:id="rId6"/>
     <p:sldId id="360" r:id="rId7"/>
-    <p:sldId id="361" r:id="rId8"/>
-    <p:sldId id="362" r:id="rId9"/>
-    <p:sldId id="363" r:id="rId10"/>
-    <p:sldId id="365" r:id="rId11"/>
-    <p:sldId id="364" r:id="rId12"/>
-    <p:sldId id="261" r:id="rId13"/>
+    <p:sldId id="366" r:id="rId8"/>
+    <p:sldId id="361" r:id="rId9"/>
+    <p:sldId id="362" r:id="rId10"/>
+    <p:sldId id="363" r:id="rId11"/>
+    <p:sldId id="365" r:id="rId12"/>
+    <p:sldId id="368" r:id="rId13"/>
+    <p:sldId id="364" r:id="rId14"/>
+    <p:sldId id="367" r:id="rId15"/>
+    <p:sldId id="261" r:id="rId16"/>
   </p:sldIdLst>
   <p:sldSz cx="12192000" cy="6858000"/>
   <p:notesSz cx="6858000" cy="9144000"/>
@@ -3550,6 +3553,259 @@
           <p:cNvPr id="2" name="Title 1">
             <a:extLst>
               <a:ext uri="{FF2B5EF4-FFF2-40B4-BE49-F238E27FC236}">
+                <a16:creationId xmlns:a16="http://schemas.microsoft.com/office/drawing/2014/main" id="{803C7C4C-2BF4-1442-A6D3-4A3F9949A35C}"/>
+              </a:ext>
+            </a:extLst>
+          </p:cNvPr>
+          <p:cNvSpPr>
+            <a:spLocks noGrp="1"/>
+          </p:cNvSpPr>
+          <p:nvPr>
+            <p:ph type="title"/>
+          </p:nvPr>
+        </p:nvSpPr>
+        <p:spPr/>
+        <p:txBody>
+          <a:bodyPr/>
+          <a:lstStyle/>
+          <a:p>
+            <a:r>
+              <a:rPr lang="en-US" dirty="0"/>
+              <a:t>Successor Relation</a:t>
+            </a:r>
+          </a:p>
+        </p:txBody>
+      </p:sp>
+      <p:sp>
+        <p:nvSpPr>
+          <p:cNvPr id="3" name="Content Placeholder 2">
+            <a:extLst>
+              <a:ext uri="{FF2B5EF4-FFF2-40B4-BE49-F238E27FC236}">
+                <a16:creationId xmlns:a16="http://schemas.microsoft.com/office/drawing/2014/main" id="{DD455549-A922-674E-A6A8-67B8CAB6F221}"/>
+              </a:ext>
+            </a:extLst>
+          </p:cNvPr>
+          <p:cNvSpPr>
+            <a:spLocks noGrp="1"/>
+          </p:cNvSpPr>
+          <p:nvPr>
+            <p:ph idx="1"/>
+          </p:nvPr>
+        </p:nvSpPr>
+        <p:spPr>
+          <a:xfrm>
+            <a:off x="838200" y="1603169"/>
+            <a:ext cx="10515600" cy="4573794"/>
+          </a:xfrm>
+        </p:spPr>
+        <p:txBody>
+          <a:bodyPr>
+            <a:normAutofit fontScale="92500" lnSpcReduction="20000"/>
+          </a:bodyPr>
+          <a:lstStyle/>
+          <a:p>
+            <a:r>
+              <a:rPr lang="en-US" dirty="0"/>
+              <a:t>Let us define a relation R as R</a:t>
+            </a:r>
+            <a:r>
+              <a:rPr lang="en-US" baseline="30000" dirty="0"/>
+              <a:t>1</a:t>
+            </a:r>
+          </a:p>
+          <a:p>
+            <a:pPr lvl="1"/>
+            <a:r>
+              <a:rPr lang="en-US" dirty="0"/>
+              <a:t>For example imagine the relation “is one or two less than” as defined over the naturals</a:t>
+            </a:r>
+          </a:p>
+          <a:p>
+            <a:pPr lvl="2"/>
+            <a:r>
+              <a:rPr lang="en-US" dirty="0"/>
+              <a:t>It contains the 2-tuples {(0, 1), (0, 2), (1, 2), (1, 3), (2, 3), (2, 4), (3, 4), (3, 5), etc.}</a:t>
+            </a:r>
+          </a:p>
+          <a:p>
+            <a:r>
+              <a:rPr lang="en-US" dirty="0"/>
+              <a:t>Now let us define R</a:t>
+            </a:r>
+            <a:r>
+              <a:rPr lang="en-US" baseline="30000" dirty="0"/>
+              <a:t>2</a:t>
+            </a:r>
+            <a:r>
+              <a:rPr lang="en-US" dirty="0"/>
+              <a:t> (or R ◦ R) as the relation having left-hand elements equal to the left-hand elements of the tuples in R</a:t>
+            </a:r>
+            <a:r>
+              <a:rPr lang="en-US" baseline="30000" dirty="0"/>
+              <a:t>1</a:t>
+            </a:r>
+            <a:r>
+              <a:rPr lang="en-US" dirty="0"/>
+              <a:t>, and right-hand elements equal to the corresponding right-hand elements of the right-hand elements in R</a:t>
+            </a:r>
+            <a:r>
+              <a:rPr lang="en-US" baseline="30000" dirty="0"/>
+              <a:t>1</a:t>
+            </a:r>
+          </a:p>
+          <a:p>
+            <a:pPr lvl="1"/>
+            <a:r>
+              <a:rPr lang="en-US" dirty="0"/>
+              <a:t>E.g., from above this would be “is two, three, or four less than”</a:t>
+            </a:r>
+          </a:p>
+          <a:p>
+            <a:pPr lvl="2"/>
+            <a:r>
+              <a:rPr lang="en-US" dirty="0"/>
+              <a:t>It contains the 2-tuples {(0, 2), (0, 3), (0, 4), (1, 3), (1, 4), (1, 5), etc.)</a:t>
+            </a:r>
+          </a:p>
+          <a:p>
+            <a:r>
+              <a:rPr lang="en-US" dirty="0"/>
+              <a:t>R</a:t>
+            </a:r>
+            <a:r>
+              <a:rPr lang="en-US" baseline="30000" dirty="0"/>
+              <a:t>3</a:t>
+            </a:r>
+            <a:r>
+              <a:rPr lang="en-US" dirty="0"/>
+              <a:t> (or R ◦ R</a:t>
+            </a:r>
+            <a:r>
+              <a:rPr lang="en-US" baseline="30000" dirty="0"/>
+              <a:t>2</a:t>
+            </a:r>
+            <a:r>
+              <a:rPr lang="en-US" dirty="0"/>
+              <a:t>) is the relation having left-hand elements having left-hand elements equal to the left-hand elements of the tuples in R</a:t>
+            </a:r>
+            <a:r>
+              <a:rPr lang="en-US" baseline="30000" dirty="0"/>
+              <a:t>1</a:t>
+            </a:r>
+            <a:r>
+              <a:rPr lang="en-US" dirty="0"/>
+              <a:t>, and right-hand elements equal to the corresponding right-hand elements of the right-hand elements in R</a:t>
+            </a:r>
+            <a:r>
+              <a:rPr lang="en-US" baseline="30000" dirty="0"/>
+              <a:t>2</a:t>
+            </a:r>
+          </a:p>
+          <a:p>
+            <a:pPr lvl="1"/>
+            <a:r>
+              <a:rPr lang="en-US" dirty="0"/>
+              <a:t>E.g., from the above this would be “is three, four, or five less than”</a:t>
+            </a:r>
+          </a:p>
+        </p:txBody>
+      </p:sp>
+      <p:sp>
+        <p:nvSpPr>
+          <p:cNvPr id="4" name="Slide Number Placeholder 3">
+            <a:extLst>
+              <a:ext uri="{FF2B5EF4-FFF2-40B4-BE49-F238E27FC236}">
+                <a16:creationId xmlns:a16="http://schemas.microsoft.com/office/drawing/2014/main" id="{153DCD92-4CA0-E543-9B98-16CB3E3C2F5A}"/>
+              </a:ext>
+            </a:extLst>
+          </p:cNvPr>
+          <p:cNvSpPr>
+            <a:spLocks noGrp="1"/>
+          </p:cNvSpPr>
+          <p:nvPr>
+            <p:ph type="sldNum" sz="quarter" idx="12"/>
+          </p:nvPr>
+        </p:nvSpPr>
+        <p:spPr/>
+        <p:txBody>
+          <a:bodyPr/>
+          <a:lstStyle/>
+          <a:p>
+            <a:fld id="{3352CBF5-17B8-4387-88A6-ABF9F8C64D5A}" type="slidenum">
+              <a:rPr lang="en-US" smtClean="0"/>
+              <a:t>10</a:t>
+            </a:fld>
+            <a:endParaRPr lang="en-US"/>
+          </a:p>
+        </p:txBody>
+      </p:sp>
+      <p:sp>
+        <p:nvSpPr>
+          <p:cNvPr id="5" name="TextBox 4">
+            <a:extLst>
+              <a:ext uri="{FF2B5EF4-FFF2-40B4-BE49-F238E27FC236}">
+                <a16:creationId xmlns:a16="http://schemas.microsoft.com/office/drawing/2014/main" id="{B69D0F7B-4DFF-B344-8CEB-24A06208AFCA}"/>
+              </a:ext>
+            </a:extLst>
+          </p:cNvPr>
+          <p:cNvSpPr txBox="1"/>
+          <p:nvPr/>
+        </p:nvSpPr>
+        <p:spPr>
+          <a:xfrm>
+            <a:off x="-5303520" y="-2067951"/>
+            <a:ext cx="184731" cy="276999"/>
+          </a:xfrm>
+          <a:prstGeom prst="rect">
+            <a:avLst/>
+          </a:prstGeom>
+          <a:noFill/>
+        </p:spPr>
+        <p:txBody>
+          <a:bodyPr wrap="none" rtlCol="0">
+            <a:spAutoFit/>
+          </a:bodyPr>
+          <a:lstStyle/>
+          <a:p>
+            <a:endParaRPr lang="en-US" baseline="30000" dirty="0"/>
+          </a:p>
+        </p:txBody>
+      </p:sp>
+    </p:spTree>
+    <p:extLst>
+      <p:ext uri="{BB962C8B-B14F-4D97-AF65-F5344CB8AC3E}">
+        <p14:creationId xmlns:p14="http://schemas.microsoft.com/office/powerpoint/2010/main" val="3538559300"/>
+      </p:ext>
+    </p:extLst>
+  </p:cSld>
+  <p:clrMapOvr>
+    <a:masterClrMapping/>
+  </p:clrMapOvr>
+</p:sld>
+</file>
+
+<file path=ppt/slides/slide11.xml><?xml version="1.0" encoding="utf-8"?>
+<p:sld xmlns:a="http://schemas.openxmlformats.org/drawingml/2006/main" xmlns:r="http://schemas.openxmlformats.org/officeDocument/2006/relationships" xmlns:p="http://schemas.openxmlformats.org/presentationml/2006/main">
+  <p:cSld>
+    <p:spTree>
+      <p:nvGrpSpPr>
+        <p:cNvPr id="1" name=""/>
+        <p:cNvGrpSpPr/>
+        <p:nvPr/>
+      </p:nvGrpSpPr>
+      <p:grpSpPr>
+        <a:xfrm>
+          <a:off x="0" y="0"/>
+          <a:ext cx="0" cy="0"/>
+          <a:chOff x="0" y="0"/>
+          <a:chExt cx="0" cy="0"/>
+        </a:xfrm>
+      </p:grpSpPr>
+      <p:sp>
+        <p:nvSpPr>
+          <p:cNvPr id="2" name="Title 1">
+            <a:extLst>
+              <a:ext uri="{FF2B5EF4-FFF2-40B4-BE49-F238E27FC236}">
                 <a16:creationId xmlns:a16="http://schemas.microsoft.com/office/drawing/2014/main" id="{97457FC6-297F-2043-BC3F-E400592E448A}"/>
               </a:ext>
             </a:extLst>
@@ -3750,7 +4006,7 @@
           <a:p>
             <a:fld id="{3352CBF5-17B8-4387-88A6-ABF9F8C64D5A}" type="slidenum">
               <a:rPr lang="en-US" smtClean="0"/>
-              <a:t>10</a:t>
+              <a:t>11</a:t>
             </a:fld>
             <a:endParaRPr lang="en-US"/>
           </a:p>
@@ -3769,7 +4025,315 @@
 </p:sld>
 </file>
 
-<file path=ppt/slides/slide11.xml><?xml version="1.0" encoding="utf-8"?>
+<file path=ppt/slides/slide12.xml><?xml version="1.0" encoding="utf-8"?>
+<p:sld xmlns:a="http://schemas.openxmlformats.org/drawingml/2006/main" xmlns:r="http://schemas.openxmlformats.org/officeDocument/2006/relationships" xmlns:p="http://schemas.openxmlformats.org/presentationml/2006/main">
+  <p:cSld>
+    <p:spTree>
+      <p:nvGrpSpPr>
+        <p:cNvPr id="1" name=""/>
+        <p:cNvGrpSpPr/>
+        <p:nvPr/>
+      </p:nvGrpSpPr>
+      <p:grpSpPr>
+        <a:xfrm>
+          <a:off x="0" y="0"/>
+          <a:ext cx="0" cy="0"/>
+          <a:chOff x="0" y="0"/>
+          <a:chExt cx="0" cy="0"/>
+        </a:xfrm>
+      </p:grpSpPr>
+      <p:sp>
+        <p:nvSpPr>
+          <p:cNvPr id="2" name="Title 1">
+            <a:extLst>
+              <a:ext uri="{FF2B5EF4-FFF2-40B4-BE49-F238E27FC236}">
+                <a16:creationId xmlns:a16="http://schemas.microsoft.com/office/drawing/2014/main" id="{72BF9966-CB8F-1646-A6A7-089D19A598DB}"/>
+              </a:ext>
+            </a:extLst>
+          </p:cNvPr>
+          <p:cNvSpPr>
+            <a:spLocks noGrp="1"/>
+          </p:cNvSpPr>
+          <p:nvPr>
+            <p:ph type="title"/>
+          </p:nvPr>
+        </p:nvSpPr>
+        <p:spPr/>
+        <p:txBody>
+          <a:bodyPr/>
+          <a:lstStyle/>
+          <a:p>
+            <a:r>
+              <a:rPr lang="en-US" dirty="0"/>
+              <a:t>Exercises</a:t>
+            </a:r>
+          </a:p>
+        </p:txBody>
+      </p:sp>
+      <p:sp>
+        <p:nvSpPr>
+          <p:cNvPr id="3" name="Content Placeholder 2">
+            <a:extLst>
+              <a:ext uri="{FF2B5EF4-FFF2-40B4-BE49-F238E27FC236}">
+                <a16:creationId xmlns:a16="http://schemas.microsoft.com/office/drawing/2014/main" id="{EC7D20FF-3EB4-3745-817A-412158256A62}"/>
+              </a:ext>
+            </a:extLst>
+          </p:cNvPr>
+          <p:cNvSpPr>
+            <a:spLocks noGrp="1"/>
+          </p:cNvSpPr>
+          <p:nvPr>
+            <p:ph idx="1"/>
+          </p:nvPr>
+        </p:nvSpPr>
+        <p:spPr>
+          <a:xfrm>
+            <a:off x="838200" y="1561516"/>
+            <a:ext cx="10515600" cy="4727991"/>
+          </a:xfrm>
+        </p:spPr>
+        <p:txBody>
+          <a:bodyPr/>
+          <a:lstStyle/>
+          <a:p>
+            <a:r>
+              <a:rPr lang="en-US" dirty="0"/>
+              <a:t>Provide R</a:t>
+            </a:r>
+            <a:r>
+              <a:rPr lang="en-US" baseline="30000" dirty="0"/>
+              <a:t>2</a:t>
+            </a:r>
+            <a:r>
+              <a:rPr lang="en-US" dirty="0"/>
+              <a:t> given the following R</a:t>
+            </a:r>
+            <a:r>
+              <a:rPr lang="en-US" baseline="30000" dirty="0"/>
+              <a:t>1</a:t>
+            </a:r>
+            <a:r>
+              <a:rPr lang="en-US" dirty="0"/>
+              <a:t> definitions</a:t>
+            </a:r>
+          </a:p>
+          <a:p>
+            <a:pPr lvl="1"/>
+            <a:r>
+              <a:rPr lang="en-US" dirty="0"/>
+              <a:t>R</a:t>
+            </a:r>
+            <a:r>
+              <a:rPr lang="en-US" baseline="30000" dirty="0"/>
+              <a:t>1</a:t>
+            </a:r>
+            <a:r>
+              <a:rPr lang="en-US" dirty="0"/>
+              <a:t> = “LHS is one less than RHS”</a:t>
+            </a:r>
+          </a:p>
+          <a:p>
+            <a:pPr lvl="2"/>
+            <a:r>
+              <a:rPr lang="en-US" dirty="0"/>
+              <a:t>R</a:t>
+            </a:r>
+            <a:r>
+              <a:rPr lang="en-US" baseline="30000" dirty="0"/>
+              <a:t>2</a:t>
+            </a:r>
+            <a:r>
+              <a:rPr lang="en-US" dirty="0"/>
+              <a:t> = “LHS is two less than RHS”</a:t>
+            </a:r>
+          </a:p>
+          <a:p>
+            <a:pPr lvl="1"/>
+            <a:r>
+              <a:rPr lang="en-US" dirty="0"/>
+              <a:t>R</a:t>
+            </a:r>
+            <a:r>
+              <a:rPr lang="en-US" baseline="30000" dirty="0"/>
+              <a:t>1</a:t>
+            </a:r>
+            <a:r>
+              <a:rPr lang="en-US" dirty="0"/>
+              <a:t> = “LHS is twice the RHS”</a:t>
+            </a:r>
+          </a:p>
+          <a:p>
+            <a:pPr lvl="2"/>
+            <a:r>
+              <a:rPr lang="en-US" dirty="0"/>
+              <a:t>R</a:t>
+            </a:r>
+            <a:r>
+              <a:rPr lang="en-US" baseline="30000" dirty="0"/>
+              <a:t>2</a:t>
+            </a:r>
+            <a:r>
+              <a:rPr lang="en-US" dirty="0"/>
+              <a:t> = “LHS is four times RHS”</a:t>
+            </a:r>
+          </a:p>
+          <a:p>
+            <a:pPr lvl="1"/>
+            <a:r>
+              <a:rPr lang="en-US" dirty="0"/>
+              <a:t>R</a:t>
+            </a:r>
+            <a:r>
+              <a:rPr lang="en-US" baseline="30000" dirty="0"/>
+              <a:t>1</a:t>
+            </a:r>
+            <a:r>
+              <a:rPr lang="en-US" dirty="0"/>
+              <a:t> = “LHS is two or three times the RHS”</a:t>
+            </a:r>
+          </a:p>
+          <a:p>
+            <a:pPr lvl="2"/>
+            <a:r>
+              <a:rPr lang="en-US" dirty="0"/>
+              <a:t>R</a:t>
+            </a:r>
+            <a:r>
+              <a:rPr lang="en-US" baseline="30000" dirty="0"/>
+              <a:t>2</a:t>
+            </a:r>
+            <a:r>
+              <a:rPr lang="en-US" dirty="0"/>
+              <a:t> = “LHS is four, six, or nine times the RHS”</a:t>
+            </a:r>
+          </a:p>
+          <a:p>
+            <a:r>
+              <a:rPr lang="en-US" dirty="0"/>
+              <a:t>Provide R</a:t>
+            </a:r>
+            <a:r>
+              <a:rPr lang="en-US" baseline="30000" dirty="0"/>
+              <a:t>3</a:t>
+            </a:r>
+            <a:r>
+              <a:rPr lang="en-US" dirty="0"/>
+              <a:t> given the following R</a:t>
+            </a:r>
+            <a:r>
+              <a:rPr lang="en-US" baseline="30000" dirty="0"/>
+              <a:t>1</a:t>
+            </a:r>
+            <a:r>
+              <a:rPr lang="en-US" dirty="0"/>
+              <a:t> definitions</a:t>
+            </a:r>
+          </a:p>
+          <a:p>
+            <a:pPr lvl="1"/>
+            <a:r>
+              <a:rPr lang="en-US" dirty="0"/>
+              <a:t>R</a:t>
+            </a:r>
+            <a:r>
+              <a:rPr lang="en-US" baseline="30000" dirty="0"/>
+              <a:t>1</a:t>
+            </a:r>
+            <a:r>
+              <a:rPr lang="en-US" dirty="0"/>
+              <a:t> = “LHS is one less than RHS”</a:t>
+            </a:r>
+          </a:p>
+          <a:p>
+            <a:pPr lvl="2"/>
+            <a:r>
+              <a:rPr lang="en-US" dirty="0"/>
+              <a:t>R</a:t>
+            </a:r>
+            <a:r>
+              <a:rPr lang="en-US" baseline="30000" dirty="0"/>
+              <a:t>3</a:t>
+            </a:r>
+            <a:r>
+              <a:rPr lang="en-US" dirty="0"/>
+              <a:t> = “LHS is three less than RHS”</a:t>
+            </a:r>
+          </a:p>
+          <a:p>
+            <a:pPr lvl="1"/>
+            <a:r>
+              <a:rPr lang="en-US" dirty="0"/>
+              <a:t>R</a:t>
+            </a:r>
+            <a:r>
+              <a:rPr lang="en-US" baseline="30000" dirty="0"/>
+              <a:t>1</a:t>
+            </a:r>
+            <a:r>
+              <a:rPr lang="en-US" dirty="0"/>
+              <a:t> = “LHS is two or three times the RHS”</a:t>
+            </a:r>
+          </a:p>
+          <a:p>
+            <a:pPr lvl="2"/>
+            <a:r>
+              <a:rPr lang="en-US" dirty="0"/>
+              <a:t>R</a:t>
+            </a:r>
+            <a:r>
+              <a:rPr lang="en-US" baseline="30000" dirty="0"/>
+              <a:t>3</a:t>
+            </a:r>
+            <a:r>
+              <a:rPr lang="en-US" dirty="0"/>
+              <a:t> = “LHS is 8, 12, 18, or 27 times the RHS”</a:t>
+            </a:r>
+          </a:p>
+        </p:txBody>
+      </p:sp>
+      <p:sp>
+        <p:nvSpPr>
+          <p:cNvPr id="4" name="Slide Number Placeholder 3">
+            <a:extLst>
+              <a:ext uri="{FF2B5EF4-FFF2-40B4-BE49-F238E27FC236}">
+                <a16:creationId xmlns:a16="http://schemas.microsoft.com/office/drawing/2014/main" id="{72CCA53F-F47F-174D-ADBA-99CCE91AB203}"/>
+              </a:ext>
+            </a:extLst>
+          </p:cNvPr>
+          <p:cNvSpPr>
+            <a:spLocks noGrp="1"/>
+          </p:cNvSpPr>
+          <p:nvPr>
+            <p:ph type="sldNum" sz="quarter" idx="12"/>
+          </p:nvPr>
+        </p:nvSpPr>
+        <p:spPr/>
+        <p:txBody>
+          <a:bodyPr/>
+          <a:lstStyle/>
+          <a:p>
+            <a:fld id="{3352CBF5-17B8-4387-88A6-ABF9F8C64D5A}" type="slidenum">
+              <a:rPr lang="en-US" smtClean="0"/>
+              <a:t>12</a:t>
+            </a:fld>
+            <a:endParaRPr lang="en-US"/>
+          </a:p>
+        </p:txBody>
+      </p:sp>
+    </p:spTree>
+    <p:extLst>
+      <p:ext uri="{BB962C8B-B14F-4D97-AF65-F5344CB8AC3E}">
+        <p14:creationId xmlns:p14="http://schemas.microsoft.com/office/powerpoint/2010/main" val="4262916467"/>
+      </p:ext>
+    </p:extLst>
+  </p:cSld>
+  <p:clrMapOvr>
+    <a:masterClrMapping/>
+  </p:clrMapOvr>
+</p:sld>
+</file>
+
+<file path=ppt/slides/slide13.xml><?xml version="1.0" encoding="utf-8"?>
 <p:sld xmlns:a="http://schemas.openxmlformats.org/drawingml/2006/main" xmlns:r="http://schemas.openxmlformats.org/officeDocument/2006/relationships" xmlns:p="http://schemas.openxmlformats.org/presentationml/2006/main">
   <p:cSld>
     <p:spTree>
@@ -4043,18 +4607,11 @@
                   <a:buNone/>
                 </a:pPr>
                 <a:r>
-                  <a:rPr lang="en-US" sz="2000">
-                    <a:latin typeface="Courier New" panose="02070309020205020404" pitchFamily="49" charset="0"/>
-                    <a:cs typeface="Courier New" panose="02070309020205020404" pitchFamily="49" charset="0"/>
-                  </a:rPr>
-                  <a:t>  | </a:t>
-                </a:r>
-                <a:r>
                   <a:rPr lang="en-US" sz="2000" dirty="0">
                     <a:latin typeface="Courier New" panose="02070309020205020404" pitchFamily="49" charset="0"/>
                     <a:cs typeface="Courier New" panose="02070309020205020404" pitchFamily="49" charset="0"/>
                   </a:rPr>
-                  <a:t>trans : ∀ a b c, </a:t>
+                  <a:t>  | trans : ∀ a b c, </a:t>
                 </a:r>
                 <a:r>
                   <a:rPr lang="en-US" sz="2000" dirty="0" err="1">
@@ -4171,7 +4728,7 @@
           <a:p>
             <a:fld id="{3352CBF5-17B8-4387-88A6-ABF9F8C64D5A}" type="slidenum">
               <a:rPr lang="en-US" smtClean="0"/>
-              <a:t>11</a:t>
+              <a:t>13</a:t>
             </a:fld>
             <a:endParaRPr lang="en-US"/>
           </a:p>
@@ -4190,7 +4747,471 @@
 </p:sld>
 </file>
 
-<file path=ppt/slides/slide12.xml><?xml version="1.0" encoding="utf-8"?>
+<file path=ppt/slides/slide14.xml><?xml version="1.0" encoding="utf-8"?>
+<p:sld xmlns:a="http://schemas.openxmlformats.org/drawingml/2006/main" xmlns:r="http://schemas.openxmlformats.org/officeDocument/2006/relationships" xmlns:p="http://schemas.openxmlformats.org/presentationml/2006/main">
+  <p:cSld>
+    <p:spTree>
+      <p:nvGrpSpPr>
+        <p:cNvPr id="1" name=""/>
+        <p:cNvGrpSpPr/>
+        <p:nvPr/>
+      </p:nvGrpSpPr>
+      <p:grpSpPr>
+        <a:xfrm>
+          <a:off x="0" y="0"/>
+          <a:ext cx="0" cy="0"/>
+          <a:chOff x="0" y="0"/>
+          <a:chExt cx="0" cy="0"/>
+        </a:xfrm>
+      </p:grpSpPr>
+      <p:sp>
+        <p:nvSpPr>
+          <p:cNvPr id="2" name="Title 1">
+            <a:extLst>
+              <a:ext uri="{FF2B5EF4-FFF2-40B4-BE49-F238E27FC236}">
+                <a16:creationId xmlns:a16="http://schemas.microsoft.com/office/drawing/2014/main" id="{D91A5279-3EBC-1C44-A05D-78182A4277DF}"/>
+              </a:ext>
+            </a:extLst>
+          </p:cNvPr>
+          <p:cNvSpPr>
+            <a:spLocks noGrp="1"/>
+          </p:cNvSpPr>
+          <p:nvPr>
+            <p:ph type="title"/>
+          </p:nvPr>
+        </p:nvSpPr>
+        <p:spPr/>
+        <p:txBody>
+          <a:bodyPr/>
+          <a:lstStyle/>
+          <a:p>
+            <a:r>
+              <a:rPr lang="en-US" dirty="0"/>
+              <a:t>Exercises</a:t>
+            </a:r>
+          </a:p>
+        </p:txBody>
+      </p:sp>
+      <p:sp>
+        <p:nvSpPr>
+          <p:cNvPr id="3" name="Content Placeholder 2">
+            <a:extLst>
+              <a:ext uri="{FF2B5EF4-FFF2-40B4-BE49-F238E27FC236}">
+                <a16:creationId xmlns:a16="http://schemas.microsoft.com/office/drawing/2014/main" id="{9ACE09E0-4887-F840-91C2-3D708AF33C9B}"/>
+              </a:ext>
+            </a:extLst>
+          </p:cNvPr>
+          <p:cNvSpPr>
+            <a:spLocks noGrp="1"/>
+          </p:cNvSpPr>
+          <p:nvPr>
+            <p:ph idx="1"/>
+          </p:nvPr>
+        </p:nvSpPr>
+        <p:spPr/>
+        <p:txBody>
+          <a:bodyPr/>
+          <a:lstStyle/>
+          <a:p>
+            <a:r>
+              <a:rPr lang="en-US" dirty="0"/>
+              <a:t>What is the transitive closure of the following:</a:t>
+            </a:r>
+          </a:p>
+          <a:p>
+            <a:pPr lvl="1"/>
+            <a:r>
+              <a:rPr lang="en-US" dirty="0"/>
+              <a:t>R</a:t>
+            </a:r>
+            <a:r>
+              <a:rPr lang="en-US" baseline="30000" dirty="0"/>
+              <a:t>1</a:t>
+            </a:r>
+            <a:r>
+              <a:rPr lang="en-US" dirty="0"/>
+              <a:t> = “LHS is one less than RHS”</a:t>
+            </a:r>
+          </a:p>
+          <a:p>
+            <a:pPr lvl="2"/>
+            <a:r>
+              <a:rPr lang="en-US" dirty="0"/>
+              <a:t>TC = &lt;</a:t>
+            </a:r>
+          </a:p>
+          <a:p>
+            <a:pPr lvl="1"/>
+            <a:r>
+              <a:rPr lang="en-US" dirty="0"/>
+              <a:t>R</a:t>
+            </a:r>
+            <a:r>
+              <a:rPr lang="en-US" baseline="30000" dirty="0"/>
+              <a:t>1</a:t>
+            </a:r>
+            <a:r>
+              <a:rPr lang="en-US" dirty="0"/>
+              <a:t> = “LHS is zero or one less than RHS”</a:t>
+            </a:r>
+          </a:p>
+          <a:p>
+            <a:pPr lvl="2"/>
+            <a:r>
+              <a:rPr lang="en-US" dirty="0"/>
+              <a:t>TC = ≤</a:t>
+            </a:r>
+          </a:p>
+          <a:p>
+            <a:pPr lvl="1"/>
+            <a:r>
+              <a:rPr lang="en-US" dirty="0"/>
+              <a:t>R</a:t>
+            </a:r>
+            <a:r>
+              <a:rPr lang="en-US" baseline="30000" dirty="0"/>
+              <a:t>1</a:t>
+            </a:r>
+            <a:r>
+              <a:rPr lang="en-US" dirty="0"/>
+              <a:t> = “LHS is two more than RHS”</a:t>
+            </a:r>
+          </a:p>
+          <a:p>
+            <a:pPr lvl="2"/>
+            <a:r>
+              <a:rPr lang="en-US" dirty="0"/>
+              <a:t>TC = ∃n: </a:t>
+            </a:r>
+            <a:r>
+              <a:rPr lang="en-US" dirty="0" err="1"/>
+              <a:t>ℕ</a:t>
+            </a:r>
+            <a:r>
+              <a:rPr lang="en-US" dirty="0"/>
+              <a:t>, LHS = n &gt; 0 ∧ 2n + RHS</a:t>
+            </a:r>
+          </a:p>
+          <a:p>
+            <a:pPr lvl="1"/>
+            <a:r>
+              <a:rPr lang="en-US" dirty="0"/>
+              <a:t>R</a:t>
+            </a:r>
+            <a:r>
+              <a:rPr lang="en-US" baseline="30000" dirty="0"/>
+              <a:t>1</a:t>
+            </a:r>
+            <a:r>
+              <a:rPr lang="en-US" dirty="0"/>
+              <a:t> = “LHS is two more or two less than RHS”</a:t>
+            </a:r>
+          </a:p>
+          <a:p>
+            <a:pPr lvl="2"/>
+            <a:r>
+              <a:rPr lang="en-US" dirty="0"/>
+              <a:t>TC = “LHS has same parity as RHS”</a:t>
+            </a:r>
+            <a:br>
+              <a:rPr lang="en-US" dirty="0"/>
+            </a:br>
+            <a:r>
+              <a:rPr lang="en-US" dirty="0"/>
+              <a:t>AKA “LHS is even </a:t>
+            </a:r>
+            <a:r>
+              <a:rPr lang="en-US" dirty="0" err="1"/>
+              <a:t>iff</a:t>
+            </a:r>
+            <a:r>
+              <a:rPr lang="en-US" dirty="0"/>
+              <a:t> RHS is even and LHS is odd </a:t>
+            </a:r>
+            <a:r>
+              <a:rPr lang="en-US" dirty="0" err="1"/>
+              <a:t>iff</a:t>
+            </a:r>
+            <a:r>
+              <a:rPr lang="en-US" dirty="0"/>
+              <a:t> RHS is odd”</a:t>
+            </a:r>
+          </a:p>
+          <a:p>
+            <a:pPr lvl="1"/>
+            <a:endParaRPr lang="en-US" dirty="0"/>
+          </a:p>
+        </p:txBody>
+      </p:sp>
+      <p:sp>
+        <p:nvSpPr>
+          <p:cNvPr id="4" name="Slide Number Placeholder 3">
+            <a:extLst>
+              <a:ext uri="{FF2B5EF4-FFF2-40B4-BE49-F238E27FC236}">
+                <a16:creationId xmlns:a16="http://schemas.microsoft.com/office/drawing/2014/main" id="{96B1DE7C-970B-0447-991A-BEBC0062670B}"/>
+              </a:ext>
+            </a:extLst>
+          </p:cNvPr>
+          <p:cNvSpPr>
+            <a:spLocks noGrp="1"/>
+          </p:cNvSpPr>
+          <p:nvPr>
+            <p:ph type="sldNum" sz="quarter" idx="12"/>
+          </p:nvPr>
+        </p:nvSpPr>
+        <p:spPr/>
+        <p:txBody>
+          <a:bodyPr/>
+          <a:lstStyle/>
+          <a:p>
+            <a:fld id="{3352CBF5-17B8-4387-88A6-ABF9F8C64D5A}" type="slidenum">
+              <a:rPr lang="en-US" smtClean="0"/>
+              <a:t>14</a:t>
+            </a:fld>
+            <a:endParaRPr lang="en-US"/>
+          </a:p>
+        </p:txBody>
+      </p:sp>
+    </p:spTree>
+    <p:extLst>
+      <p:ext uri="{BB962C8B-B14F-4D97-AF65-F5344CB8AC3E}">
+        <p14:creationId xmlns:p14="http://schemas.microsoft.com/office/powerpoint/2010/main" val="3926047593"/>
+      </p:ext>
+    </p:extLst>
+  </p:cSld>
+  <p:clrMapOvr>
+    <a:masterClrMapping/>
+  </p:clrMapOvr>
+  <p:timing>
+    <p:tnLst>
+      <p:par>
+        <p:cTn id="1" dur="indefinite" restart="never" nodeType="tmRoot">
+          <p:childTnLst>
+            <p:seq concurrent="1" nextAc="seek">
+              <p:cTn id="2" dur="indefinite" nodeType="mainSeq">
+                <p:childTnLst>
+                  <p:par>
+                    <p:cTn id="3" fill="hold">
+                      <p:stCondLst>
+                        <p:cond delay="indefinite"/>
+                      </p:stCondLst>
+                      <p:childTnLst>
+                        <p:par>
+                          <p:cTn id="4" fill="hold">
+                            <p:stCondLst>
+                              <p:cond delay="0"/>
+                            </p:stCondLst>
+                            <p:childTnLst>
+                              <p:par>
+                                <p:cTn id="5" presetID="1" presetClass="entr" presetSubtype="0" fill="hold" nodeType="clickEffect">
+                                  <p:stCondLst>
+                                    <p:cond delay="0"/>
+                                  </p:stCondLst>
+                                  <p:childTnLst>
+                                    <p:set>
+                                      <p:cBhvr>
+                                        <p:cTn id="6" dur="1" fill="hold">
+                                          <p:stCondLst>
+                                            <p:cond delay="0"/>
+                                          </p:stCondLst>
+                                        </p:cTn>
+                                        <p:tgtEl>
+                                          <p:spTgt spid="3">
+                                            <p:txEl>
+                                              <p:pRg st="2" end="2"/>
+                                            </p:txEl>
+                                          </p:spTgt>
+                                        </p:tgtEl>
+                                        <p:attrNameLst>
+                                          <p:attrName>style.visibility</p:attrName>
+                                        </p:attrNameLst>
+                                      </p:cBhvr>
+                                      <p:to>
+                                        <p:strVal val="visible"/>
+                                      </p:to>
+                                    </p:set>
+                                  </p:childTnLst>
+                                </p:cTn>
+                              </p:par>
+                            </p:childTnLst>
+                          </p:cTn>
+                        </p:par>
+                      </p:childTnLst>
+                    </p:cTn>
+                  </p:par>
+                  <p:par>
+                    <p:cTn id="7" fill="hold">
+                      <p:stCondLst>
+                        <p:cond delay="indefinite"/>
+                      </p:stCondLst>
+                      <p:childTnLst>
+                        <p:par>
+                          <p:cTn id="8" fill="hold">
+                            <p:stCondLst>
+                              <p:cond delay="0"/>
+                            </p:stCondLst>
+                            <p:childTnLst>
+                              <p:par>
+                                <p:cTn id="9" presetID="1" presetClass="entr" presetSubtype="0" fill="hold" nodeType="clickEffect">
+                                  <p:stCondLst>
+                                    <p:cond delay="0"/>
+                                  </p:stCondLst>
+                                  <p:childTnLst>
+                                    <p:set>
+                                      <p:cBhvr>
+                                        <p:cTn id="10" dur="1" fill="hold">
+                                          <p:stCondLst>
+                                            <p:cond delay="0"/>
+                                          </p:stCondLst>
+                                        </p:cTn>
+                                        <p:tgtEl>
+                                          <p:spTgt spid="3">
+                                            <p:txEl>
+                                              <p:pRg st="4" end="4"/>
+                                            </p:txEl>
+                                          </p:spTgt>
+                                        </p:tgtEl>
+                                        <p:attrNameLst>
+                                          <p:attrName>style.visibility</p:attrName>
+                                        </p:attrNameLst>
+                                      </p:cBhvr>
+                                      <p:to>
+                                        <p:strVal val="visible"/>
+                                      </p:to>
+                                    </p:set>
+                                  </p:childTnLst>
+                                </p:cTn>
+                              </p:par>
+                            </p:childTnLst>
+                          </p:cTn>
+                        </p:par>
+                      </p:childTnLst>
+                    </p:cTn>
+                  </p:par>
+                  <p:par>
+                    <p:cTn id="11" fill="hold">
+                      <p:stCondLst>
+                        <p:cond delay="indefinite"/>
+                      </p:stCondLst>
+                      <p:childTnLst>
+                        <p:par>
+                          <p:cTn id="12" fill="hold">
+                            <p:stCondLst>
+                              <p:cond delay="0"/>
+                            </p:stCondLst>
+                            <p:childTnLst>
+                              <p:par>
+                                <p:cTn id="13" presetID="1" presetClass="entr" presetSubtype="0" fill="hold" nodeType="clickEffect">
+                                  <p:stCondLst>
+                                    <p:cond delay="0"/>
+                                  </p:stCondLst>
+                                  <p:childTnLst>
+                                    <p:set>
+                                      <p:cBhvr>
+                                        <p:cTn id="14" dur="1" fill="hold">
+                                          <p:stCondLst>
+                                            <p:cond delay="0"/>
+                                          </p:stCondLst>
+                                        </p:cTn>
+                                        <p:tgtEl>
+                                          <p:spTgt spid="3">
+                                            <p:txEl>
+                                              <p:pRg st="6" end="6"/>
+                                            </p:txEl>
+                                          </p:spTgt>
+                                        </p:tgtEl>
+                                        <p:attrNameLst>
+                                          <p:attrName>style.visibility</p:attrName>
+                                        </p:attrNameLst>
+                                      </p:cBhvr>
+                                      <p:to>
+                                        <p:strVal val="visible"/>
+                                      </p:to>
+                                    </p:set>
+                                  </p:childTnLst>
+                                </p:cTn>
+                              </p:par>
+                            </p:childTnLst>
+                          </p:cTn>
+                        </p:par>
+                      </p:childTnLst>
+                    </p:cTn>
+                  </p:par>
+                  <p:par>
+                    <p:cTn id="15" fill="hold">
+                      <p:stCondLst>
+                        <p:cond delay="indefinite"/>
+                      </p:stCondLst>
+                      <p:childTnLst>
+                        <p:par>
+                          <p:cTn id="16" fill="hold">
+                            <p:stCondLst>
+                              <p:cond delay="0"/>
+                            </p:stCondLst>
+                            <p:childTnLst>
+                              <p:par>
+                                <p:cTn id="17" presetID="1" presetClass="entr" presetSubtype="0" fill="hold" nodeType="clickEffect">
+                                  <p:stCondLst>
+                                    <p:cond delay="0"/>
+                                  </p:stCondLst>
+                                  <p:childTnLst>
+                                    <p:set>
+                                      <p:cBhvr>
+                                        <p:cTn id="18" dur="1" fill="hold">
+                                          <p:stCondLst>
+                                            <p:cond delay="0"/>
+                                          </p:stCondLst>
+                                        </p:cTn>
+                                        <p:tgtEl>
+                                          <p:spTgt spid="3">
+                                            <p:txEl>
+                                              <p:pRg st="8" end="8"/>
+                                            </p:txEl>
+                                          </p:spTgt>
+                                        </p:tgtEl>
+                                        <p:attrNameLst>
+                                          <p:attrName>style.visibility</p:attrName>
+                                        </p:attrNameLst>
+                                      </p:cBhvr>
+                                      <p:to>
+                                        <p:strVal val="visible"/>
+                                      </p:to>
+                                    </p:set>
+                                  </p:childTnLst>
+                                </p:cTn>
+                              </p:par>
+                            </p:childTnLst>
+                          </p:cTn>
+                        </p:par>
+                      </p:childTnLst>
+                    </p:cTn>
+                  </p:par>
+                </p:childTnLst>
+              </p:cTn>
+              <p:prevCondLst>
+                <p:cond evt="onPrev" delay="0">
+                  <p:tgtEl>
+                    <p:sldTgt/>
+                  </p:tgtEl>
+                </p:cond>
+              </p:prevCondLst>
+              <p:nextCondLst>
+                <p:cond evt="onNext" delay="0">
+                  <p:tgtEl>
+                    <p:sldTgt/>
+                  </p:tgtEl>
+                </p:cond>
+              </p:nextCondLst>
+            </p:seq>
+          </p:childTnLst>
+        </p:cTn>
+      </p:par>
+    </p:tnLst>
+  </p:timing>
+</p:sld>
+</file>
+
+<file path=ppt/slides/slide15.xml><?xml version="1.0" encoding="utf-8"?>
 <p:sld xmlns:a="http://schemas.openxmlformats.org/drawingml/2006/main" xmlns:r="http://schemas.openxmlformats.org/officeDocument/2006/relationships" xmlns:p="http://schemas.openxmlformats.org/presentationml/2006/main">
   <p:cSld>
     <p:bg>
@@ -4461,7 +5482,7 @@
           <a:p>
             <a:fld id="{3352CBF5-17B8-4387-88A6-ABF9F8C64D5A}" type="slidenum">
               <a:rPr lang="en-US" smtClean="0"/>
-              <a:t>12</a:t>
+              <a:t>15</a:t>
             </a:fld>
             <a:endParaRPr lang="en-US"/>
           </a:p>
@@ -5633,7 +6654,7 @@
           <p:cNvPr id="2" name="Title 1">
             <a:extLst>
               <a:ext uri="{FF2B5EF4-FFF2-40B4-BE49-F238E27FC236}">
-                <a16:creationId xmlns:a16="http://schemas.microsoft.com/office/drawing/2014/main" id="{E3C4CA33-4434-BE4E-97E4-A0CCB701DDDD}"/>
+                <a16:creationId xmlns:a16="http://schemas.microsoft.com/office/drawing/2014/main" id="{95E6BB3C-BF52-BF40-810F-CF9A1360B7AF}"/>
               </a:ext>
             </a:extLst>
           </p:cNvPr>
@@ -5650,10 +6671,9 @@
           <a:lstStyle/>
           <a:p>
             <a:r>
-              <a:rPr lang="en-US" dirty="0" err="1"/>
-              <a:t>Subrelation</a:t>
-            </a:r>
-            <a:endParaRPr lang="en-US" dirty="0"/>
+              <a:rPr lang="en-US" dirty="0"/>
+              <a:t>Exercises</a:t>
+            </a:r>
           </a:p>
         </p:txBody>
       </p:sp>
@@ -5662,7 +6682,7 @@
           <p:cNvPr id="3" name="Content Placeholder 2">
             <a:extLst>
               <a:ext uri="{FF2B5EF4-FFF2-40B4-BE49-F238E27FC236}">
-                <a16:creationId xmlns:a16="http://schemas.microsoft.com/office/drawing/2014/main" id="{B2CA3D67-F698-ED41-864E-77500B8BCA93}"/>
+                <a16:creationId xmlns:a16="http://schemas.microsoft.com/office/drawing/2014/main" id="{47F1BB11-93C4-3F44-BE67-FCB0336DB455}"/>
               </a:ext>
             </a:extLst>
           </p:cNvPr>
@@ -5673,86 +6693,131 @@
             <p:ph idx="1"/>
           </p:nvPr>
         </p:nvSpPr>
-        <p:spPr/>
-        <p:txBody>
-          <a:bodyPr/>
-          <a:lstStyle/>
-          <a:p>
-            <a:r>
-              <a:rPr lang="en-US" dirty="0" err="1"/>
-              <a:t>Subrelation</a:t>
-            </a:r>
-            <a:r>
-              <a:rPr lang="en-US" dirty="0"/>
-              <a:t> is a property between two relations</a:t>
-            </a:r>
-          </a:p>
-          <a:p>
-            <a:r>
-              <a:rPr lang="en-US" dirty="0"/>
-              <a:t>For example, &lt; is a </a:t>
-            </a:r>
-            <a:r>
-              <a:rPr lang="en-US" dirty="0" err="1"/>
-              <a:t>subrelation</a:t>
-            </a:r>
-            <a:r>
-              <a:rPr lang="en-US" dirty="0"/>
-              <a:t> of ≤, because x &lt; y → x ≤ y </a:t>
-            </a:r>
-          </a:p>
-          <a:p>
-            <a:pPr marL="0" indent="0">
-              <a:buNone/>
-            </a:pPr>
-            <a:r>
-              <a:rPr lang="en-US" sz="2000" dirty="0">
-                <a:latin typeface="Courier New" panose="02070309020205020404" pitchFamily="49" charset="0"/>
-                <a:cs typeface="Courier New" panose="02070309020205020404" pitchFamily="49" charset="0"/>
-              </a:rPr>
-              <a:t>def </a:t>
-            </a:r>
-            <a:r>
-              <a:rPr lang="en-US" sz="2000" dirty="0" err="1">
-                <a:latin typeface="Courier New" panose="02070309020205020404" pitchFamily="49" charset="0"/>
-                <a:cs typeface="Courier New" panose="02070309020205020404" pitchFamily="49" charset="0"/>
-              </a:rPr>
-              <a:t>subrelation</a:t>
-            </a:r>
-            <a:r>
-              <a:rPr lang="en-US" sz="2000" dirty="0">
-                <a:latin typeface="Courier New" panose="02070309020205020404" pitchFamily="49" charset="0"/>
-                <a:cs typeface="Courier New" panose="02070309020205020404" pitchFamily="49" charset="0"/>
-              </a:rPr>
-              <a:t> (q r : </a:t>
-            </a:r>
-            <a:r>
-              <a:rPr lang="el-GR" sz="2000" dirty="0">
-                <a:latin typeface="Courier New" panose="02070309020205020404" pitchFamily="49" charset="0"/>
-                <a:cs typeface="Courier New" panose="02070309020205020404" pitchFamily="49" charset="0"/>
-              </a:rPr>
-              <a:t>β → β → </a:t>
-            </a:r>
-            <a:r>
-              <a:rPr lang="en-US" sz="2000" dirty="0">
-                <a:latin typeface="Courier New" panose="02070309020205020404" pitchFamily="49" charset="0"/>
-                <a:cs typeface="Courier New" panose="02070309020205020404" pitchFamily="49" charset="0"/>
-              </a:rPr>
-              <a:t>Prop) := ∀ ⦃x y⦄, q x y → r x y</a:t>
-            </a:r>
-          </a:p>
-          <a:p>
-            <a:r>
-              <a:rPr lang="en-US" dirty="0"/>
-              <a:t>Is &lt; a </a:t>
-            </a:r>
-            <a:r>
-              <a:rPr lang="en-US" dirty="0" err="1"/>
-              <a:t>subrelation</a:t>
-            </a:r>
-            <a:r>
-              <a:rPr lang="en-US" dirty="0"/>
-              <a:t> of &lt;?</a:t>
+        <p:spPr>
+          <a:xfrm>
+            <a:off x="838200" y="1690688"/>
+            <a:ext cx="10515600" cy="4486275"/>
+          </a:xfrm>
+        </p:spPr>
+        <p:txBody>
+          <a:bodyPr>
+            <a:normAutofit fontScale="77500" lnSpcReduction="20000"/>
+          </a:bodyPr>
+          <a:lstStyle/>
+          <a:p>
+            <a:r>
+              <a:rPr lang="en-US" dirty="0"/>
+              <a:t>Which properties do the following relations hold of: (a) reflexive, (b) symmetric, (c) transitive, (d) total, (e) irreflexive, (f) anti-symmetric, (g) connected, (h) empty</a:t>
+            </a:r>
+          </a:p>
+          <a:p>
+            <a:r>
+              <a:rPr lang="en-US" dirty="0"/>
+              <a:t>=</a:t>
+            </a:r>
+          </a:p>
+          <a:p>
+            <a:pPr lvl="1"/>
+            <a:r>
+              <a:rPr lang="en-US" dirty="0"/>
+              <a:t>a, b, c</a:t>
+            </a:r>
+          </a:p>
+          <a:p>
+            <a:r>
+              <a:rPr lang="en-US" dirty="0"/>
+              <a:t>&lt;</a:t>
+            </a:r>
+          </a:p>
+          <a:p>
+            <a:pPr lvl="1"/>
+            <a:r>
+              <a:rPr lang="en-US" dirty="0"/>
+              <a:t>c, e, f</a:t>
+            </a:r>
+            <a:r>
+              <a:rPr lang="en-US" baseline="30000" dirty="0"/>
+              <a:t>*</a:t>
+            </a:r>
+            <a:r>
+              <a:rPr lang="en-US" dirty="0"/>
+              <a:t>, g</a:t>
+            </a:r>
+          </a:p>
+          <a:p>
+            <a:r>
+              <a:rPr lang="en-US" dirty="0"/>
+              <a:t>≤</a:t>
+            </a:r>
+          </a:p>
+          <a:p>
+            <a:pPr lvl="1"/>
+            <a:r>
+              <a:rPr lang="en-US" dirty="0"/>
+              <a:t>a, c, d, f, g</a:t>
+            </a:r>
+          </a:p>
+          <a:p>
+            <a:r>
+              <a:rPr lang="en-US" dirty="0"/>
+              <a:t>≠</a:t>
+            </a:r>
+          </a:p>
+          <a:p>
+            <a:pPr lvl="1"/>
+            <a:r>
+              <a:rPr lang="en-US" dirty="0"/>
+              <a:t>b, e, g</a:t>
+            </a:r>
+          </a:p>
+          <a:p>
+            <a:r>
+              <a:rPr lang="en-US" dirty="0"/>
+              <a:t>“left-hand side equals 0 * right-hand side”</a:t>
+            </a:r>
+          </a:p>
+          <a:p>
+            <a:pPr lvl="1"/>
+            <a:r>
+              <a:rPr lang="en-US" dirty="0"/>
+              <a:t>f</a:t>
+            </a:r>
+          </a:p>
+          <a:p>
+            <a:r>
+              <a:rPr lang="en-US" dirty="0"/>
+              <a:t>“left-hand side equals 1 + right-hand side”</a:t>
+            </a:r>
+          </a:p>
+          <a:p>
+            <a:pPr lvl="1"/>
+            <a:r>
+              <a:rPr lang="en-US" dirty="0"/>
+              <a:t>b</a:t>
+            </a:r>
+            <a:r>
+              <a:rPr lang="en-US" baseline="30000" dirty="0"/>
+              <a:t>*</a:t>
+            </a:r>
+            <a:r>
+              <a:rPr lang="en-US" dirty="0"/>
+              <a:t>, c</a:t>
+            </a:r>
+            <a:r>
+              <a:rPr lang="en-US" baseline="30000" dirty="0"/>
+              <a:t>*</a:t>
+            </a:r>
+            <a:r>
+              <a:rPr lang="en-US" dirty="0"/>
+              <a:t>, f</a:t>
+            </a:r>
+            <a:r>
+              <a:rPr lang="en-US" baseline="30000" dirty="0"/>
+              <a:t>*</a:t>
+            </a:r>
+            <a:r>
+              <a:rPr lang="en-US" dirty="0"/>
+              <a:t>, h</a:t>
             </a:r>
           </a:p>
         </p:txBody>
@@ -5762,7 +6827,7 @@
           <p:cNvPr id="4" name="Slide Number Placeholder 3">
             <a:extLst>
               <a:ext uri="{FF2B5EF4-FFF2-40B4-BE49-F238E27FC236}">
-                <a16:creationId xmlns:a16="http://schemas.microsoft.com/office/drawing/2014/main" id="{B4CAEE64-C215-D741-8F93-FB0548281D88}"/>
+                <a16:creationId xmlns:a16="http://schemas.microsoft.com/office/drawing/2014/main" id="{032A4CC0-B2E6-5C43-973F-14AD7A45B69A}"/>
               </a:ext>
             </a:extLst>
           </p:cNvPr>
@@ -5789,13 +6854,337 @@
     </p:spTree>
     <p:extLst>
       <p:ext uri="{BB962C8B-B14F-4D97-AF65-F5344CB8AC3E}">
-        <p14:creationId xmlns:p14="http://schemas.microsoft.com/office/powerpoint/2010/main" val="1599300464"/>
+        <p14:creationId xmlns:p14="http://schemas.microsoft.com/office/powerpoint/2010/main" val="4011766976"/>
       </p:ext>
     </p:extLst>
   </p:cSld>
   <p:clrMapOvr>
     <a:masterClrMapping/>
   </p:clrMapOvr>
+  <p:timing>
+    <p:tnLst>
+      <p:par>
+        <p:cTn id="1" dur="indefinite" restart="never" nodeType="tmRoot">
+          <p:childTnLst>
+            <p:seq concurrent="1" nextAc="seek">
+              <p:cTn id="2" dur="indefinite" nodeType="mainSeq">
+                <p:childTnLst>
+                  <p:par>
+                    <p:cTn id="3" fill="hold">
+                      <p:stCondLst>
+                        <p:cond delay="indefinite"/>
+                      </p:stCondLst>
+                      <p:childTnLst>
+                        <p:par>
+                          <p:cTn id="4" fill="hold">
+                            <p:stCondLst>
+                              <p:cond delay="0"/>
+                            </p:stCondLst>
+                            <p:childTnLst>
+                              <p:par>
+                                <p:cTn id="5" presetID="1" presetClass="entr" presetSubtype="0" fill="hold" nodeType="clickEffect">
+                                  <p:stCondLst>
+                                    <p:cond delay="0"/>
+                                  </p:stCondLst>
+                                  <p:childTnLst>
+                                    <p:set>
+                                      <p:cBhvr>
+                                        <p:cTn id="6" dur="1" fill="hold">
+                                          <p:stCondLst>
+                                            <p:cond delay="0"/>
+                                          </p:stCondLst>
+                                        </p:cTn>
+                                        <p:tgtEl>
+                                          <p:spTgt spid="3">
+                                            <p:txEl>
+                                              <p:pRg st="2" end="2"/>
+                                            </p:txEl>
+                                          </p:spTgt>
+                                        </p:tgtEl>
+                                        <p:attrNameLst>
+                                          <p:attrName>style.visibility</p:attrName>
+                                        </p:attrNameLst>
+                                      </p:cBhvr>
+                                      <p:to>
+                                        <p:strVal val="visible"/>
+                                      </p:to>
+                                    </p:set>
+                                  </p:childTnLst>
+                                </p:cTn>
+                              </p:par>
+                            </p:childTnLst>
+                          </p:cTn>
+                        </p:par>
+                      </p:childTnLst>
+                    </p:cTn>
+                  </p:par>
+                  <p:par>
+                    <p:cTn id="7" fill="hold">
+                      <p:stCondLst>
+                        <p:cond delay="indefinite"/>
+                      </p:stCondLst>
+                      <p:childTnLst>
+                        <p:par>
+                          <p:cTn id="8" fill="hold">
+                            <p:stCondLst>
+                              <p:cond delay="0"/>
+                            </p:stCondLst>
+                            <p:childTnLst>
+                              <p:par>
+                                <p:cTn id="9" presetID="1" presetClass="entr" presetSubtype="0" fill="hold" nodeType="clickEffect">
+                                  <p:stCondLst>
+                                    <p:cond delay="0"/>
+                                  </p:stCondLst>
+                                  <p:childTnLst>
+                                    <p:set>
+                                      <p:cBhvr>
+                                        <p:cTn id="10" dur="1" fill="hold">
+                                          <p:stCondLst>
+                                            <p:cond delay="0"/>
+                                          </p:stCondLst>
+                                        </p:cTn>
+                                        <p:tgtEl>
+                                          <p:spTgt spid="3">
+                                            <p:txEl>
+                                              <p:pRg st="4" end="4"/>
+                                            </p:txEl>
+                                          </p:spTgt>
+                                        </p:tgtEl>
+                                        <p:attrNameLst>
+                                          <p:attrName>style.visibility</p:attrName>
+                                        </p:attrNameLst>
+                                      </p:cBhvr>
+                                      <p:to>
+                                        <p:strVal val="visible"/>
+                                      </p:to>
+                                    </p:set>
+                                  </p:childTnLst>
+                                </p:cTn>
+                              </p:par>
+                            </p:childTnLst>
+                          </p:cTn>
+                        </p:par>
+                      </p:childTnLst>
+                    </p:cTn>
+                  </p:par>
+                  <p:par>
+                    <p:cTn id="11" fill="hold">
+                      <p:stCondLst>
+                        <p:cond delay="indefinite"/>
+                      </p:stCondLst>
+                      <p:childTnLst>
+                        <p:par>
+                          <p:cTn id="12" fill="hold">
+                            <p:stCondLst>
+                              <p:cond delay="0"/>
+                            </p:stCondLst>
+                            <p:childTnLst>
+                              <p:par>
+                                <p:cTn id="13" presetID="1" presetClass="entr" presetSubtype="0" fill="hold" nodeType="clickEffect">
+                                  <p:stCondLst>
+                                    <p:cond delay="0"/>
+                                  </p:stCondLst>
+                                  <p:childTnLst>
+                                    <p:set>
+                                      <p:cBhvr>
+                                        <p:cTn id="14" dur="1" fill="hold">
+                                          <p:stCondLst>
+                                            <p:cond delay="0"/>
+                                          </p:stCondLst>
+                                        </p:cTn>
+                                        <p:tgtEl>
+                                          <p:spTgt spid="3">
+                                            <p:txEl>
+                                              <p:pRg st="6" end="6"/>
+                                            </p:txEl>
+                                          </p:spTgt>
+                                        </p:tgtEl>
+                                        <p:attrNameLst>
+                                          <p:attrName>style.visibility</p:attrName>
+                                        </p:attrNameLst>
+                                      </p:cBhvr>
+                                      <p:to>
+                                        <p:strVal val="visible"/>
+                                      </p:to>
+                                    </p:set>
+                                  </p:childTnLst>
+                                </p:cTn>
+                              </p:par>
+                            </p:childTnLst>
+                          </p:cTn>
+                        </p:par>
+                      </p:childTnLst>
+                    </p:cTn>
+                  </p:par>
+                  <p:par>
+                    <p:cTn id="15" fill="hold">
+                      <p:stCondLst>
+                        <p:cond delay="indefinite"/>
+                      </p:stCondLst>
+                      <p:childTnLst>
+                        <p:par>
+                          <p:cTn id="16" fill="hold">
+                            <p:stCondLst>
+                              <p:cond delay="0"/>
+                            </p:stCondLst>
+                            <p:childTnLst>
+                              <p:par>
+                                <p:cTn id="17" presetID="1" presetClass="entr" presetSubtype="0" fill="hold" nodeType="clickEffect">
+                                  <p:stCondLst>
+                                    <p:cond delay="0"/>
+                                  </p:stCondLst>
+                                  <p:childTnLst>
+                                    <p:set>
+                                      <p:cBhvr>
+                                        <p:cTn id="18" dur="1" fill="hold">
+                                          <p:stCondLst>
+                                            <p:cond delay="0"/>
+                                          </p:stCondLst>
+                                        </p:cTn>
+                                        <p:tgtEl>
+                                          <p:spTgt spid="3">
+                                            <p:txEl>
+                                              <p:pRg st="8" end="8"/>
+                                            </p:txEl>
+                                          </p:spTgt>
+                                        </p:tgtEl>
+                                        <p:attrNameLst>
+                                          <p:attrName>style.visibility</p:attrName>
+                                        </p:attrNameLst>
+                                      </p:cBhvr>
+                                      <p:to>
+                                        <p:strVal val="visible"/>
+                                      </p:to>
+                                    </p:set>
+                                  </p:childTnLst>
+                                </p:cTn>
+                              </p:par>
+                            </p:childTnLst>
+                          </p:cTn>
+                        </p:par>
+                      </p:childTnLst>
+                    </p:cTn>
+                  </p:par>
+                  <p:par>
+                    <p:cTn id="19" fill="hold">
+                      <p:stCondLst>
+                        <p:cond delay="indefinite"/>
+                      </p:stCondLst>
+                      <p:childTnLst>
+                        <p:par>
+                          <p:cTn id="20" fill="hold">
+                            <p:stCondLst>
+                              <p:cond delay="0"/>
+                            </p:stCondLst>
+                            <p:childTnLst>
+                              <p:par>
+                                <p:cTn id="21" presetID="1" presetClass="entr" presetSubtype="0" fill="hold" nodeType="clickEffect">
+                                  <p:stCondLst>
+                                    <p:cond delay="0"/>
+                                  </p:stCondLst>
+                                  <p:childTnLst>
+                                    <p:set>
+                                      <p:cBhvr>
+                                        <p:cTn id="22" dur="1" fill="hold">
+                                          <p:stCondLst>
+                                            <p:cond delay="0"/>
+                                          </p:stCondLst>
+                                        </p:cTn>
+                                        <p:tgtEl>
+                                          <p:spTgt spid="3">
+                                            <p:txEl>
+                                              <p:pRg st="10" end="10"/>
+                                            </p:txEl>
+                                          </p:spTgt>
+                                        </p:tgtEl>
+                                        <p:attrNameLst>
+                                          <p:attrName>style.visibility</p:attrName>
+                                        </p:attrNameLst>
+                                      </p:cBhvr>
+                                      <p:to>
+                                        <p:strVal val="visible"/>
+                                      </p:to>
+                                    </p:set>
+                                  </p:childTnLst>
+                                </p:cTn>
+                              </p:par>
+                            </p:childTnLst>
+                          </p:cTn>
+                        </p:par>
+                      </p:childTnLst>
+                    </p:cTn>
+                  </p:par>
+                  <p:par>
+                    <p:cTn id="23" fill="hold">
+                      <p:stCondLst>
+                        <p:cond delay="indefinite"/>
+                      </p:stCondLst>
+                      <p:childTnLst>
+                        <p:par>
+                          <p:cTn id="24" fill="hold">
+                            <p:stCondLst>
+                              <p:cond delay="0"/>
+                            </p:stCondLst>
+                            <p:childTnLst>
+                              <p:par>
+                                <p:cTn id="25" presetID="1" presetClass="entr" presetSubtype="0" fill="hold" nodeType="clickEffect">
+                                  <p:stCondLst>
+                                    <p:cond delay="0"/>
+                                  </p:stCondLst>
+                                  <p:childTnLst>
+                                    <p:set>
+                                      <p:cBhvr>
+                                        <p:cTn id="26" dur="1" fill="hold">
+                                          <p:stCondLst>
+                                            <p:cond delay="0"/>
+                                          </p:stCondLst>
+                                        </p:cTn>
+                                        <p:tgtEl>
+                                          <p:spTgt spid="3">
+                                            <p:txEl>
+                                              <p:pRg st="12" end="12"/>
+                                            </p:txEl>
+                                          </p:spTgt>
+                                        </p:tgtEl>
+                                        <p:attrNameLst>
+                                          <p:attrName>style.visibility</p:attrName>
+                                        </p:attrNameLst>
+                                      </p:cBhvr>
+                                      <p:to>
+                                        <p:strVal val="visible"/>
+                                      </p:to>
+                                    </p:set>
+                                  </p:childTnLst>
+                                </p:cTn>
+                              </p:par>
+                            </p:childTnLst>
+                          </p:cTn>
+                        </p:par>
+                      </p:childTnLst>
+                    </p:cTn>
+                  </p:par>
+                </p:childTnLst>
+              </p:cTn>
+              <p:prevCondLst>
+                <p:cond evt="onPrev" delay="0">
+                  <p:tgtEl>
+                    <p:sldTgt/>
+                  </p:tgtEl>
+                </p:cond>
+              </p:prevCondLst>
+              <p:nextCondLst>
+                <p:cond evt="onNext" delay="0">
+                  <p:tgtEl>
+                    <p:sldTgt/>
+                  </p:tgtEl>
+                </p:cond>
+              </p:nextCondLst>
+            </p:seq>
+          </p:childTnLst>
+        </p:cTn>
+      </p:par>
+    </p:tnLst>
+  </p:timing>
 </p:sld>
 </file>
 
@@ -5821,7 +7210,7 @@
           <p:cNvPr id="2" name="Title 1">
             <a:extLst>
               <a:ext uri="{FF2B5EF4-FFF2-40B4-BE49-F238E27FC236}">
-                <a16:creationId xmlns:a16="http://schemas.microsoft.com/office/drawing/2014/main" id="{1687F924-3CDE-4C4C-B303-90249158F795}"/>
+                <a16:creationId xmlns:a16="http://schemas.microsoft.com/office/drawing/2014/main" id="{E3C4CA33-4434-BE4E-97E4-A0CCB701DDDD}"/>
               </a:ext>
             </a:extLst>
           </p:cNvPr>
@@ -5838,9 +7227,10 @@
           <a:lstStyle/>
           <a:p>
             <a:r>
-              <a:rPr lang="en-US" dirty="0"/>
-              <a:t>Relations as sets of 2-tuples</a:t>
-            </a:r>
+              <a:rPr lang="en-US" dirty="0" err="1"/>
+              <a:t>Subrelation</a:t>
+            </a:r>
+            <a:endParaRPr lang="en-US" dirty="0"/>
           </a:p>
         </p:txBody>
       </p:sp>
@@ -5849,7 +7239,7 @@
           <p:cNvPr id="3" name="Content Placeholder 2">
             <a:extLst>
               <a:ext uri="{FF2B5EF4-FFF2-40B4-BE49-F238E27FC236}">
-                <a16:creationId xmlns:a16="http://schemas.microsoft.com/office/drawing/2014/main" id="{8FBA40C9-D27B-FC4B-94FC-F46839BC8DB0}"/>
+                <a16:creationId xmlns:a16="http://schemas.microsoft.com/office/drawing/2014/main" id="{B2CA3D67-F698-ED41-864E-77500B8BCA93}"/>
               </a:ext>
             </a:extLst>
           </p:cNvPr>
@@ -5866,60 +7256,80 @@
           <a:lstStyle/>
           <a:p>
             <a:r>
-              <a:rPr lang="en-US" dirty="0"/>
-              <a:t>Conceptually, we can also think of a relation as a set of 2-tuples</a:t>
-            </a:r>
-          </a:p>
-          <a:p>
-            <a:r>
-              <a:rPr lang="en-US" dirty="0"/>
-              <a:t>Why does this make sense?</a:t>
-            </a:r>
-          </a:p>
-          <a:p>
-            <a:r>
-              <a:rPr lang="en-US" dirty="0"/>
-              <a:t>What is a set?</a:t>
-            </a:r>
-          </a:p>
-          <a:p>
-            <a:pPr lvl="1"/>
-            <a:r>
-              <a:rPr lang="en-US" dirty="0"/>
-              <a:t>A set is a proposition about a value</a:t>
-            </a:r>
-          </a:p>
-          <a:p>
-            <a:pPr lvl="2"/>
-            <a:r>
-              <a:rPr lang="en-US" dirty="0"/>
-              <a:t>Conceptually, the proposition is about whether that value is in the set</a:t>
-            </a:r>
-          </a:p>
-          <a:p>
-            <a:r>
-              <a:rPr lang="en-US" dirty="0"/>
-              <a:t>What is a relation?</a:t>
-            </a:r>
-          </a:p>
-          <a:p>
-            <a:pPr lvl="1"/>
-            <a:r>
-              <a:rPr lang="en-US" dirty="0"/>
-              <a:t>A relation is a proposition about two values</a:t>
-            </a:r>
-          </a:p>
-          <a:p>
-            <a:pPr lvl="2"/>
-            <a:r>
-              <a:rPr lang="en-US" dirty="0"/>
-              <a:t>Conceptually, whether the relation holds for those two values</a:t>
-            </a:r>
-          </a:p>
-          <a:p>
-            <a:r>
-              <a:rPr lang="en-US" i="1" dirty="0"/>
-              <a:t>Note, however, that the syntax is different</a:t>
+              <a:rPr lang="en-US" dirty="0" err="1"/>
+              <a:t>Subrelation</a:t>
+            </a:r>
+            <a:r>
+              <a:rPr lang="en-US" dirty="0"/>
+              <a:t> is a property between two relations</a:t>
+            </a:r>
+          </a:p>
+          <a:p>
+            <a:r>
+              <a:rPr lang="en-US" dirty="0"/>
+              <a:t>For example, &lt; is a </a:t>
+            </a:r>
+            <a:r>
+              <a:rPr lang="en-US" dirty="0" err="1"/>
+              <a:t>subrelation</a:t>
+            </a:r>
+            <a:r>
+              <a:rPr lang="en-US" dirty="0"/>
+              <a:t> of ≤, because x &lt; y → x ≤ y </a:t>
+            </a:r>
+          </a:p>
+          <a:p>
+            <a:pPr marL="0" indent="0">
+              <a:buNone/>
+            </a:pPr>
+            <a:r>
+              <a:rPr lang="en-US" sz="2000" dirty="0">
+                <a:latin typeface="Courier New" panose="02070309020205020404" pitchFamily="49" charset="0"/>
+                <a:cs typeface="Courier New" panose="02070309020205020404" pitchFamily="49" charset="0"/>
+              </a:rPr>
+              <a:t>def </a:t>
+            </a:r>
+            <a:r>
+              <a:rPr lang="en-US" sz="2000" dirty="0" err="1">
+                <a:latin typeface="Courier New" panose="02070309020205020404" pitchFamily="49" charset="0"/>
+                <a:cs typeface="Courier New" panose="02070309020205020404" pitchFamily="49" charset="0"/>
+              </a:rPr>
+              <a:t>subrelation</a:t>
+            </a:r>
+            <a:r>
+              <a:rPr lang="en-US" sz="2000" dirty="0">
+                <a:latin typeface="Courier New" panose="02070309020205020404" pitchFamily="49" charset="0"/>
+                <a:cs typeface="Courier New" panose="02070309020205020404" pitchFamily="49" charset="0"/>
+              </a:rPr>
+              <a:t> (q r : </a:t>
+            </a:r>
+            <a:r>
+              <a:rPr lang="el-GR" sz="2000" dirty="0">
+                <a:latin typeface="Courier New" panose="02070309020205020404" pitchFamily="49" charset="0"/>
+                <a:cs typeface="Courier New" panose="02070309020205020404" pitchFamily="49" charset="0"/>
+              </a:rPr>
+              <a:t>β → β → </a:t>
+            </a:r>
+            <a:r>
+              <a:rPr lang="en-US" sz="2000" dirty="0">
+                <a:latin typeface="Courier New" panose="02070309020205020404" pitchFamily="49" charset="0"/>
+                <a:cs typeface="Courier New" panose="02070309020205020404" pitchFamily="49" charset="0"/>
+              </a:rPr>
+              <a:t>Prop) := ∀ ⦃x y⦄, q x y → r x y</a:t>
+            </a:r>
+          </a:p>
+          <a:p>
+            <a:r>
+              <a:rPr lang="en-US" dirty="0"/>
+              <a:t>Is &lt; a </a:t>
+            </a:r>
+            <a:r>
+              <a:rPr lang="en-US" dirty="0" err="1"/>
+              <a:t>subrelation</a:t>
+            </a:r>
+            <a:r>
+              <a:rPr lang="en-US" dirty="0"/>
+              <a:t> of &lt;?</a:t>
             </a:r>
           </a:p>
         </p:txBody>
@@ -5929,7 +7339,7 @@
           <p:cNvPr id="4" name="Slide Number Placeholder 3">
             <a:extLst>
               <a:ext uri="{FF2B5EF4-FFF2-40B4-BE49-F238E27FC236}">
-                <a16:creationId xmlns:a16="http://schemas.microsoft.com/office/drawing/2014/main" id="{25EDC6CB-ECE4-364A-AB4C-82FA39BA13DE}"/>
+                <a16:creationId xmlns:a16="http://schemas.microsoft.com/office/drawing/2014/main" id="{B4CAEE64-C215-D741-8F93-FB0548281D88}"/>
               </a:ext>
             </a:extLst>
           </p:cNvPr>
@@ -5956,7 +7366,7 @@
     </p:spTree>
     <p:extLst>
       <p:ext uri="{BB962C8B-B14F-4D97-AF65-F5344CB8AC3E}">
-        <p14:creationId xmlns:p14="http://schemas.microsoft.com/office/powerpoint/2010/main" val="1170081373"/>
+        <p14:creationId xmlns:p14="http://schemas.microsoft.com/office/powerpoint/2010/main" val="1599300464"/>
       </p:ext>
     </p:extLst>
   </p:cSld>
@@ -5988,7 +7398,7 @@
           <p:cNvPr id="2" name="Title 1">
             <a:extLst>
               <a:ext uri="{FF2B5EF4-FFF2-40B4-BE49-F238E27FC236}">
-                <a16:creationId xmlns:a16="http://schemas.microsoft.com/office/drawing/2014/main" id="{803C7C4C-2BF4-1442-A6D3-4A3F9949A35C}"/>
+                <a16:creationId xmlns:a16="http://schemas.microsoft.com/office/drawing/2014/main" id="{1687F924-3CDE-4C4C-B303-90249158F795}"/>
               </a:ext>
             </a:extLst>
           </p:cNvPr>
@@ -6006,7 +7416,7 @@
           <a:p>
             <a:r>
               <a:rPr lang="en-US" dirty="0"/>
-              <a:t>Successor Relation</a:t>
+              <a:t>Relations as sets of 2-tuples</a:t>
             </a:r>
           </a:p>
         </p:txBody>
@@ -6016,7 +7426,7 @@
           <p:cNvPr id="3" name="Content Placeholder 2">
             <a:extLst>
               <a:ext uri="{FF2B5EF4-FFF2-40B4-BE49-F238E27FC236}">
-                <a16:creationId xmlns:a16="http://schemas.microsoft.com/office/drawing/2014/main" id="{DD455549-A922-674E-A6A8-67B8CAB6F221}"/>
+                <a16:creationId xmlns:a16="http://schemas.microsoft.com/office/drawing/2014/main" id="{8FBA40C9-D27B-FC4B-94FC-F46839BC8DB0}"/>
               </a:ext>
             </a:extLst>
           </p:cNvPr>
@@ -6027,120 +7437,66 @@
             <p:ph idx="1"/>
           </p:nvPr>
         </p:nvSpPr>
-        <p:spPr>
-          <a:xfrm>
-            <a:off x="838200" y="1603169"/>
-            <a:ext cx="10515600" cy="4573794"/>
-          </a:xfrm>
-        </p:spPr>
-        <p:txBody>
-          <a:bodyPr>
-            <a:normAutofit fontScale="92500" lnSpcReduction="20000"/>
-          </a:bodyPr>
-          <a:lstStyle/>
-          <a:p>
-            <a:r>
-              <a:rPr lang="en-US" dirty="0"/>
-              <a:t>Let us define a relation R as R</a:t>
-            </a:r>
-            <a:r>
-              <a:rPr lang="en-US" baseline="30000" dirty="0"/>
-              <a:t>1</a:t>
+        <p:spPr/>
+        <p:txBody>
+          <a:bodyPr/>
+          <a:lstStyle/>
+          <a:p>
+            <a:r>
+              <a:rPr lang="en-US" dirty="0"/>
+              <a:t>Conceptually, we can also think of a relation as a set of 2-tuples</a:t>
+            </a:r>
+          </a:p>
+          <a:p>
+            <a:r>
+              <a:rPr lang="en-US" dirty="0"/>
+              <a:t>Why does this make sense?</a:t>
+            </a:r>
+          </a:p>
+          <a:p>
+            <a:r>
+              <a:rPr lang="en-US" dirty="0"/>
+              <a:t>What is a set?</a:t>
             </a:r>
           </a:p>
           <a:p>
             <a:pPr lvl="1"/>
             <a:r>
               <a:rPr lang="en-US" dirty="0"/>
-              <a:t>For example imagine the relation “is one or two less than” as defined over the naturals</a:t>
+              <a:t>A set is a proposition about a value</a:t>
             </a:r>
           </a:p>
           <a:p>
             <a:pPr lvl="2"/>
             <a:r>
               <a:rPr lang="en-US" dirty="0"/>
-              <a:t>It contains the 2-tuples {(0, 1), (0, 2), (1, 2), (1, 3), (2, 3), (2, 4), (3, 4), (3, 5), etc.}</a:t>
-            </a:r>
-          </a:p>
-          <a:p>
-            <a:r>
-              <a:rPr lang="en-US" dirty="0"/>
-              <a:t>Now let us define R</a:t>
-            </a:r>
-            <a:r>
-              <a:rPr lang="en-US" baseline="30000" dirty="0"/>
-              <a:t>2</a:t>
-            </a:r>
-            <a:r>
-              <a:rPr lang="en-US" dirty="0"/>
-              <a:t> (or R ◦ R) as the relation having left-hand elements equal to the left-hand elements of the tuples in R</a:t>
-            </a:r>
-            <a:r>
-              <a:rPr lang="en-US" baseline="30000" dirty="0"/>
-              <a:t>1</a:t>
-            </a:r>
-            <a:r>
-              <a:rPr lang="en-US" dirty="0"/>
-              <a:t>, and right-hand elements equal to the corresponding right-hand elements of the right-hand elements in R</a:t>
-            </a:r>
-            <a:r>
-              <a:rPr lang="en-US" baseline="30000" dirty="0"/>
-              <a:t>1</a:t>
+              <a:t>Conceptually, the proposition is about whether that value is in the set</a:t>
+            </a:r>
+          </a:p>
+          <a:p>
+            <a:r>
+              <a:rPr lang="en-US" dirty="0"/>
+              <a:t>What is a relation?</a:t>
             </a:r>
           </a:p>
           <a:p>
             <a:pPr lvl="1"/>
             <a:r>
               <a:rPr lang="en-US" dirty="0"/>
-              <a:t>E.g., from above this would be “is two, three, or four less than”</a:t>
+              <a:t>A relation is a proposition about two values</a:t>
             </a:r>
           </a:p>
           <a:p>
             <a:pPr lvl="2"/>
             <a:r>
               <a:rPr lang="en-US" dirty="0"/>
-              <a:t>It contains the 2-tuples {(0, 2), (0, 3), (0, 4), (1, 3), (1, 4), (1, 5), etc.)</a:t>
-            </a:r>
-          </a:p>
-          <a:p>
-            <a:r>
-              <a:rPr lang="en-US" dirty="0"/>
-              <a:t>R</a:t>
-            </a:r>
-            <a:r>
-              <a:rPr lang="en-US" baseline="30000" dirty="0"/>
-              <a:t>3</a:t>
-            </a:r>
-            <a:r>
-              <a:rPr lang="en-US" dirty="0"/>
-              <a:t> (or R ◦ R</a:t>
-            </a:r>
-            <a:r>
-              <a:rPr lang="en-US" baseline="30000" dirty="0"/>
-              <a:t>2</a:t>
-            </a:r>
-            <a:r>
-              <a:rPr lang="en-US" dirty="0"/>
-              <a:t>) is the relation having left-hand elements having left-hand elements equal to the left-hand elements of the tuples in R</a:t>
-            </a:r>
-            <a:r>
-              <a:rPr lang="en-US" baseline="30000" dirty="0"/>
-              <a:t>1</a:t>
-            </a:r>
-            <a:r>
-              <a:rPr lang="en-US" dirty="0"/>
-              <a:t>, and right-hand elements equal to the corresponding right-hand elements of the right-hand elements in R</a:t>
-            </a:r>
-            <a:r>
-              <a:rPr lang="en-US" baseline="30000" dirty="0"/>
-              <a:t>2</a:t>
-            </a:r>
-          </a:p>
-          <a:p>
-            <a:pPr lvl="1"/>
-            <a:r>
-              <a:rPr lang="en-US" dirty="0"/>
-              <a:t>E.g., from the above this would be “is three, four, or five less than”</a:t>
+              <a:t>Conceptually, whether the relation holds for those two values</a:t>
+            </a:r>
+          </a:p>
+          <a:p>
+            <a:r>
+              <a:rPr lang="en-US" i="1" dirty="0"/>
+              <a:t>Note, however, that the syntax is different</a:t>
             </a:r>
           </a:p>
         </p:txBody>
@@ -6150,7 +7506,7 @@
           <p:cNvPr id="4" name="Slide Number Placeholder 3">
             <a:extLst>
               <a:ext uri="{FF2B5EF4-FFF2-40B4-BE49-F238E27FC236}">
-                <a16:creationId xmlns:a16="http://schemas.microsoft.com/office/drawing/2014/main" id="{153DCD92-4CA0-E543-9B98-16CB3E3C2F5A}"/>
+                <a16:creationId xmlns:a16="http://schemas.microsoft.com/office/drawing/2014/main" id="{25EDC6CB-ECE4-364A-AB4C-82FA39BA13DE}"/>
               </a:ext>
             </a:extLst>
           </p:cNvPr>
@@ -6174,42 +7530,10 @@
           </a:p>
         </p:txBody>
       </p:sp>
-      <p:sp>
-        <p:nvSpPr>
-          <p:cNvPr id="5" name="TextBox 4">
-            <a:extLst>
-              <a:ext uri="{FF2B5EF4-FFF2-40B4-BE49-F238E27FC236}">
-                <a16:creationId xmlns:a16="http://schemas.microsoft.com/office/drawing/2014/main" id="{B69D0F7B-4DFF-B344-8CEB-24A06208AFCA}"/>
-              </a:ext>
-            </a:extLst>
-          </p:cNvPr>
-          <p:cNvSpPr txBox="1"/>
-          <p:nvPr/>
-        </p:nvSpPr>
-        <p:spPr>
-          <a:xfrm>
-            <a:off x="-5303520" y="-2067951"/>
-            <a:ext cx="184731" cy="276999"/>
-          </a:xfrm>
-          <a:prstGeom prst="rect">
-            <a:avLst/>
-          </a:prstGeom>
-          <a:noFill/>
-        </p:spPr>
-        <p:txBody>
-          <a:bodyPr wrap="none" rtlCol="0">
-            <a:spAutoFit/>
-          </a:bodyPr>
-          <a:lstStyle/>
-          <a:p>
-            <a:endParaRPr lang="en-US" baseline="30000" dirty="0"/>
-          </a:p>
-        </p:txBody>
-      </p:sp>
     </p:spTree>
     <p:extLst>
       <p:ext uri="{BB962C8B-B14F-4D97-AF65-F5344CB8AC3E}">
-        <p14:creationId xmlns:p14="http://schemas.microsoft.com/office/powerpoint/2010/main" val="3538559300"/>
+        <p14:creationId xmlns:p14="http://schemas.microsoft.com/office/powerpoint/2010/main" val="1170081373"/>
       </p:ext>
     </p:extLst>
   </p:cSld>

</xml_diff>

<commit_message>
Fixed animation on one slide
</commit_message>
<xml_diff>
--- a/src/13_Relations/Relations.pptx
+++ b/src/13_Relations/Relations.pptx
@@ -4330,6 +4330,281 @@
   <p:clrMapOvr>
     <a:masterClrMapping/>
   </p:clrMapOvr>
+  <p:timing>
+    <p:tnLst>
+      <p:par>
+        <p:cTn id="1" dur="indefinite" restart="never" nodeType="tmRoot">
+          <p:childTnLst>
+            <p:seq concurrent="1" nextAc="seek">
+              <p:cTn id="2" dur="indefinite" nodeType="mainSeq">
+                <p:childTnLst>
+                  <p:par>
+                    <p:cTn id="3" fill="hold">
+                      <p:stCondLst>
+                        <p:cond delay="indefinite"/>
+                      </p:stCondLst>
+                      <p:childTnLst>
+                        <p:par>
+                          <p:cTn id="4" fill="hold">
+                            <p:stCondLst>
+                              <p:cond delay="0"/>
+                            </p:stCondLst>
+                            <p:childTnLst>
+                              <p:par>
+                                <p:cTn id="5" presetID="1" presetClass="entr" presetSubtype="0" fill="hold" nodeType="clickEffect">
+                                  <p:stCondLst>
+                                    <p:cond delay="0"/>
+                                  </p:stCondLst>
+                                  <p:childTnLst>
+                                    <p:set>
+                                      <p:cBhvr>
+                                        <p:cTn id="6" dur="1" fill="hold">
+                                          <p:stCondLst>
+                                            <p:cond delay="0"/>
+                                          </p:stCondLst>
+                                        </p:cTn>
+                                        <p:tgtEl>
+                                          <p:spTgt spid="3">
+                                            <p:txEl>
+                                              <p:pRg st="2" end="2"/>
+                                            </p:txEl>
+                                          </p:spTgt>
+                                        </p:tgtEl>
+                                        <p:attrNameLst>
+                                          <p:attrName>style.visibility</p:attrName>
+                                        </p:attrNameLst>
+                                      </p:cBhvr>
+                                      <p:to>
+                                        <p:strVal val="visible"/>
+                                      </p:to>
+                                    </p:set>
+                                  </p:childTnLst>
+                                </p:cTn>
+                              </p:par>
+                            </p:childTnLst>
+                          </p:cTn>
+                        </p:par>
+                      </p:childTnLst>
+                    </p:cTn>
+                  </p:par>
+                  <p:par>
+                    <p:cTn id="7" fill="hold">
+                      <p:stCondLst>
+                        <p:cond delay="indefinite"/>
+                      </p:stCondLst>
+                      <p:childTnLst>
+                        <p:par>
+                          <p:cTn id="8" fill="hold">
+                            <p:stCondLst>
+                              <p:cond delay="0"/>
+                            </p:stCondLst>
+                            <p:childTnLst>
+                              <p:par>
+                                <p:cTn id="9" presetID="1" presetClass="entr" presetSubtype="0" fill="hold" nodeType="clickEffect">
+                                  <p:stCondLst>
+                                    <p:cond delay="0"/>
+                                  </p:stCondLst>
+                                  <p:childTnLst>
+                                    <p:set>
+                                      <p:cBhvr>
+                                        <p:cTn id="10" dur="1" fill="hold">
+                                          <p:stCondLst>
+                                            <p:cond delay="0"/>
+                                          </p:stCondLst>
+                                        </p:cTn>
+                                        <p:tgtEl>
+                                          <p:spTgt spid="3">
+                                            <p:txEl>
+                                              <p:pRg st="4" end="4"/>
+                                            </p:txEl>
+                                          </p:spTgt>
+                                        </p:tgtEl>
+                                        <p:attrNameLst>
+                                          <p:attrName>style.visibility</p:attrName>
+                                        </p:attrNameLst>
+                                      </p:cBhvr>
+                                      <p:to>
+                                        <p:strVal val="visible"/>
+                                      </p:to>
+                                    </p:set>
+                                  </p:childTnLst>
+                                </p:cTn>
+                              </p:par>
+                            </p:childTnLst>
+                          </p:cTn>
+                        </p:par>
+                      </p:childTnLst>
+                    </p:cTn>
+                  </p:par>
+                  <p:par>
+                    <p:cTn id="11" fill="hold">
+                      <p:stCondLst>
+                        <p:cond delay="indefinite"/>
+                      </p:stCondLst>
+                      <p:childTnLst>
+                        <p:par>
+                          <p:cTn id="12" fill="hold">
+                            <p:stCondLst>
+                              <p:cond delay="0"/>
+                            </p:stCondLst>
+                            <p:childTnLst>
+                              <p:par>
+                                <p:cTn id="13" presetID="1" presetClass="entr" presetSubtype="0" fill="hold" nodeType="clickEffect">
+                                  <p:stCondLst>
+                                    <p:cond delay="0"/>
+                                  </p:stCondLst>
+                                  <p:childTnLst>
+                                    <p:set>
+                                      <p:cBhvr>
+                                        <p:cTn id="14" dur="1" fill="hold">
+                                          <p:stCondLst>
+                                            <p:cond delay="0"/>
+                                          </p:stCondLst>
+                                        </p:cTn>
+                                        <p:tgtEl>
+                                          <p:spTgt spid="3">
+                                            <p:txEl>
+                                              <p:pRg st="6" end="6"/>
+                                            </p:txEl>
+                                          </p:spTgt>
+                                        </p:tgtEl>
+                                        <p:attrNameLst>
+                                          <p:attrName>style.visibility</p:attrName>
+                                        </p:attrNameLst>
+                                      </p:cBhvr>
+                                      <p:to>
+                                        <p:strVal val="visible"/>
+                                      </p:to>
+                                    </p:set>
+                                  </p:childTnLst>
+                                </p:cTn>
+                              </p:par>
+                            </p:childTnLst>
+                          </p:cTn>
+                        </p:par>
+                      </p:childTnLst>
+                    </p:cTn>
+                  </p:par>
+                  <p:par>
+                    <p:cTn id="15" fill="hold">
+                      <p:stCondLst>
+                        <p:cond delay="indefinite"/>
+                      </p:stCondLst>
+                      <p:childTnLst>
+                        <p:par>
+                          <p:cTn id="16" fill="hold">
+                            <p:stCondLst>
+                              <p:cond delay="0"/>
+                            </p:stCondLst>
+                            <p:childTnLst>
+                              <p:par>
+                                <p:cTn id="17" presetID="1" presetClass="entr" presetSubtype="0" fill="hold" nodeType="clickEffect">
+                                  <p:stCondLst>
+                                    <p:cond delay="0"/>
+                                  </p:stCondLst>
+                                  <p:childTnLst>
+                                    <p:set>
+                                      <p:cBhvr>
+                                        <p:cTn id="18" dur="1" fill="hold">
+                                          <p:stCondLst>
+                                            <p:cond delay="0"/>
+                                          </p:stCondLst>
+                                        </p:cTn>
+                                        <p:tgtEl>
+                                          <p:spTgt spid="3">
+                                            <p:txEl>
+                                              <p:pRg st="9" end="9"/>
+                                            </p:txEl>
+                                          </p:spTgt>
+                                        </p:tgtEl>
+                                        <p:attrNameLst>
+                                          <p:attrName>style.visibility</p:attrName>
+                                        </p:attrNameLst>
+                                      </p:cBhvr>
+                                      <p:to>
+                                        <p:strVal val="visible"/>
+                                      </p:to>
+                                    </p:set>
+                                  </p:childTnLst>
+                                </p:cTn>
+                              </p:par>
+                            </p:childTnLst>
+                          </p:cTn>
+                        </p:par>
+                      </p:childTnLst>
+                    </p:cTn>
+                  </p:par>
+                  <p:par>
+                    <p:cTn id="19" fill="hold">
+                      <p:stCondLst>
+                        <p:cond delay="indefinite"/>
+                      </p:stCondLst>
+                      <p:childTnLst>
+                        <p:par>
+                          <p:cTn id="20" fill="hold">
+                            <p:stCondLst>
+                              <p:cond delay="0"/>
+                            </p:stCondLst>
+                            <p:childTnLst>
+                              <p:par>
+                                <p:cTn id="21" presetID="1" presetClass="entr" presetSubtype="0" fill="hold" nodeType="clickEffect">
+                                  <p:stCondLst>
+                                    <p:cond delay="0"/>
+                                  </p:stCondLst>
+                                  <p:childTnLst>
+                                    <p:set>
+                                      <p:cBhvr>
+                                        <p:cTn id="22" dur="1" fill="hold">
+                                          <p:stCondLst>
+                                            <p:cond delay="0"/>
+                                          </p:stCondLst>
+                                        </p:cTn>
+                                        <p:tgtEl>
+                                          <p:spTgt spid="3">
+                                            <p:txEl>
+                                              <p:pRg st="11" end="11"/>
+                                            </p:txEl>
+                                          </p:spTgt>
+                                        </p:tgtEl>
+                                        <p:attrNameLst>
+                                          <p:attrName>style.visibility</p:attrName>
+                                        </p:attrNameLst>
+                                      </p:cBhvr>
+                                      <p:to>
+                                        <p:strVal val="visible"/>
+                                      </p:to>
+                                    </p:set>
+                                  </p:childTnLst>
+                                </p:cTn>
+                              </p:par>
+                            </p:childTnLst>
+                          </p:cTn>
+                        </p:par>
+                      </p:childTnLst>
+                    </p:cTn>
+                  </p:par>
+                </p:childTnLst>
+              </p:cTn>
+              <p:prevCondLst>
+                <p:cond evt="onPrev" delay="0">
+                  <p:tgtEl>
+                    <p:sldTgt/>
+                  </p:tgtEl>
+                </p:cond>
+              </p:prevCondLst>
+              <p:nextCondLst>
+                <p:cond evt="onNext" delay="0">
+                  <p:tgtEl>
+                    <p:sldTgt/>
+                  </p:tgtEl>
+                </p:cond>
+              </p:nextCondLst>
+            </p:seq>
+          </p:childTnLst>
+        </p:cTn>
+      </p:par>
+    </p:tnLst>
+  </p:timing>
 </p:sld>
 </file>
 

</xml_diff>

<commit_message>
Fixed slides for Relations
</commit_message>
<xml_diff>
--- a/src/13_Relations/Relations.pptx
+++ b/src/13_Relations/Relations.pptx
@@ -5,7 +5,7 @@
     <p:sldMasterId id="2147483648" r:id="rId1"/>
   </p:sldMasterIdLst>
   <p:notesMasterIdLst>
-    <p:notesMasterId r:id="rId17"/>
+    <p:notesMasterId r:id="rId18"/>
   </p:notesMasterIdLst>
   <p:sldIdLst>
     <p:sldId id="258" r:id="rId2"/>
@@ -14,15 +14,16 @@
     <p:sldId id="358" r:id="rId5"/>
     <p:sldId id="359" r:id="rId6"/>
     <p:sldId id="360" r:id="rId7"/>
-    <p:sldId id="366" r:id="rId8"/>
-    <p:sldId id="361" r:id="rId9"/>
-    <p:sldId id="362" r:id="rId10"/>
-    <p:sldId id="363" r:id="rId11"/>
-    <p:sldId id="365" r:id="rId12"/>
-    <p:sldId id="368" r:id="rId13"/>
-    <p:sldId id="364" r:id="rId14"/>
-    <p:sldId id="367" r:id="rId15"/>
-    <p:sldId id="261" r:id="rId16"/>
+    <p:sldId id="369" r:id="rId8"/>
+    <p:sldId id="366" r:id="rId9"/>
+    <p:sldId id="361" r:id="rId10"/>
+    <p:sldId id="362" r:id="rId11"/>
+    <p:sldId id="363" r:id="rId12"/>
+    <p:sldId id="365" r:id="rId13"/>
+    <p:sldId id="368" r:id="rId14"/>
+    <p:sldId id="364" r:id="rId15"/>
+    <p:sldId id="367" r:id="rId16"/>
+    <p:sldId id="261" r:id="rId17"/>
   </p:sldIdLst>
   <p:sldSz cx="12192000" cy="6858000"/>
   <p:notesSz cx="6858000" cy="9144000"/>
@@ -3553,7 +3554,7 @@
           <p:cNvPr id="2" name="Title 1">
             <a:extLst>
               <a:ext uri="{FF2B5EF4-FFF2-40B4-BE49-F238E27FC236}">
-                <a16:creationId xmlns:a16="http://schemas.microsoft.com/office/drawing/2014/main" id="{803C7C4C-2BF4-1442-A6D3-4A3F9949A35C}"/>
+                <a16:creationId xmlns:a16="http://schemas.microsoft.com/office/drawing/2014/main" id="{1687F924-3CDE-4C4C-B303-90249158F795}"/>
               </a:ext>
             </a:extLst>
           </p:cNvPr>
@@ -3571,7 +3572,7 @@
           <a:p>
             <a:r>
               <a:rPr lang="en-US" dirty="0"/>
-              <a:t>Successor Relation</a:t>
+              <a:t>Relations as sets of 2-tuples</a:t>
             </a:r>
           </a:p>
         </p:txBody>
@@ -3581,7 +3582,7 @@
           <p:cNvPr id="3" name="Content Placeholder 2">
             <a:extLst>
               <a:ext uri="{FF2B5EF4-FFF2-40B4-BE49-F238E27FC236}">
-                <a16:creationId xmlns:a16="http://schemas.microsoft.com/office/drawing/2014/main" id="{DD455549-A922-674E-A6A8-67B8CAB6F221}"/>
+                <a16:creationId xmlns:a16="http://schemas.microsoft.com/office/drawing/2014/main" id="{8FBA40C9-D27B-FC4B-94FC-F46839BC8DB0}"/>
               </a:ext>
             </a:extLst>
           </p:cNvPr>
@@ -3592,120 +3593,66 @@
             <p:ph idx="1"/>
           </p:nvPr>
         </p:nvSpPr>
-        <p:spPr>
-          <a:xfrm>
-            <a:off x="838200" y="1603169"/>
-            <a:ext cx="10515600" cy="4573794"/>
-          </a:xfrm>
-        </p:spPr>
-        <p:txBody>
-          <a:bodyPr>
-            <a:normAutofit fontScale="92500" lnSpcReduction="20000"/>
-          </a:bodyPr>
-          <a:lstStyle/>
-          <a:p>
-            <a:r>
-              <a:rPr lang="en-US" dirty="0"/>
-              <a:t>Let us define a relation R as R</a:t>
-            </a:r>
-            <a:r>
-              <a:rPr lang="en-US" baseline="30000" dirty="0"/>
-              <a:t>1</a:t>
+        <p:spPr/>
+        <p:txBody>
+          <a:bodyPr/>
+          <a:lstStyle/>
+          <a:p>
+            <a:r>
+              <a:rPr lang="en-US" dirty="0"/>
+              <a:t>Conceptually, we can also think of a relation as a set of 2-tuples</a:t>
+            </a:r>
+          </a:p>
+          <a:p>
+            <a:r>
+              <a:rPr lang="en-US" dirty="0"/>
+              <a:t>Why does this make sense?</a:t>
+            </a:r>
+          </a:p>
+          <a:p>
+            <a:r>
+              <a:rPr lang="en-US" dirty="0"/>
+              <a:t>What is a set?</a:t>
             </a:r>
           </a:p>
           <a:p>
             <a:pPr lvl="1"/>
             <a:r>
               <a:rPr lang="en-US" dirty="0"/>
-              <a:t>For example imagine the relation “is one or two less than” as defined over the naturals</a:t>
+              <a:t>A set is a proposition about a value</a:t>
             </a:r>
           </a:p>
           <a:p>
             <a:pPr lvl="2"/>
             <a:r>
               <a:rPr lang="en-US" dirty="0"/>
-              <a:t>It contains the 2-tuples {(0, 1), (0, 2), (1, 2), (1, 3), (2, 3), (2, 4), (3, 4), (3, 5), etc.}</a:t>
-            </a:r>
-          </a:p>
-          <a:p>
-            <a:r>
-              <a:rPr lang="en-US" dirty="0"/>
-              <a:t>Now let us define R</a:t>
-            </a:r>
-            <a:r>
-              <a:rPr lang="en-US" baseline="30000" dirty="0"/>
-              <a:t>2</a:t>
-            </a:r>
-            <a:r>
-              <a:rPr lang="en-US" dirty="0"/>
-              <a:t> (or R ◦ R) as the relation having left-hand elements equal to the left-hand elements of the tuples in R</a:t>
-            </a:r>
-            <a:r>
-              <a:rPr lang="en-US" baseline="30000" dirty="0"/>
-              <a:t>1</a:t>
-            </a:r>
-            <a:r>
-              <a:rPr lang="en-US" dirty="0"/>
-              <a:t>, and right-hand elements equal to the corresponding right-hand elements of the right-hand elements in R</a:t>
-            </a:r>
-            <a:r>
-              <a:rPr lang="en-US" baseline="30000" dirty="0"/>
-              <a:t>1</a:t>
+              <a:t>Conceptually, the proposition is about whether that value is in the set</a:t>
+            </a:r>
+          </a:p>
+          <a:p>
+            <a:r>
+              <a:rPr lang="en-US" dirty="0"/>
+              <a:t>What is a relation?</a:t>
             </a:r>
           </a:p>
           <a:p>
             <a:pPr lvl="1"/>
             <a:r>
               <a:rPr lang="en-US" dirty="0"/>
-              <a:t>E.g., from above this would be “is two, three, or four less than”</a:t>
+              <a:t>A relation is a proposition about two values</a:t>
             </a:r>
           </a:p>
           <a:p>
             <a:pPr lvl="2"/>
             <a:r>
               <a:rPr lang="en-US" dirty="0"/>
-              <a:t>It contains the 2-tuples {(0, 2), (0, 3), (0, 4), (1, 3), (1, 4), (1, 5), etc.)</a:t>
-            </a:r>
-          </a:p>
-          <a:p>
-            <a:r>
-              <a:rPr lang="en-US" dirty="0"/>
-              <a:t>R</a:t>
-            </a:r>
-            <a:r>
-              <a:rPr lang="en-US" baseline="30000" dirty="0"/>
-              <a:t>3</a:t>
-            </a:r>
-            <a:r>
-              <a:rPr lang="en-US" dirty="0"/>
-              <a:t> (or R ◦ R</a:t>
-            </a:r>
-            <a:r>
-              <a:rPr lang="en-US" baseline="30000" dirty="0"/>
-              <a:t>2</a:t>
-            </a:r>
-            <a:r>
-              <a:rPr lang="en-US" dirty="0"/>
-              <a:t>) is the relation having left-hand elements having left-hand elements equal to the left-hand elements of the tuples in R</a:t>
-            </a:r>
-            <a:r>
-              <a:rPr lang="en-US" baseline="30000" dirty="0"/>
-              <a:t>1</a:t>
-            </a:r>
-            <a:r>
-              <a:rPr lang="en-US" dirty="0"/>
-              <a:t>, and right-hand elements equal to the corresponding right-hand elements of the right-hand elements in R</a:t>
-            </a:r>
-            <a:r>
-              <a:rPr lang="en-US" baseline="30000" dirty="0"/>
-              <a:t>2</a:t>
-            </a:r>
-          </a:p>
-          <a:p>
-            <a:pPr lvl="1"/>
-            <a:r>
-              <a:rPr lang="en-US" dirty="0"/>
-              <a:t>E.g., from the above this would be “is three, four, or five less than”</a:t>
+              <a:t>Conceptually, whether the relation holds for those two values</a:t>
+            </a:r>
+          </a:p>
+          <a:p>
+            <a:r>
+              <a:rPr lang="en-US" i="1" dirty="0"/>
+              <a:t>Note, however, that the syntax is different</a:t>
             </a:r>
           </a:p>
         </p:txBody>
@@ -3715,7 +3662,7 @@
           <p:cNvPr id="4" name="Slide Number Placeholder 3">
             <a:extLst>
               <a:ext uri="{FF2B5EF4-FFF2-40B4-BE49-F238E27FC236}">
-                <a16:creationId xmlns:a16="http://schemas.microsoft.com/office/drawing/2014/main" id="{153DCD92-4CA0-E543-9B98-16CB3E3C2F5A}"/>
+                <a16:creationId xmlns:a16="http://schemas.microsoft.com/office/drawing/2014/main" id="{25EDC6CB-ECE4-364A-AB4C-82FA39BA13DE}"/>
               </a:ext>
             </a:extLst>
           </p:cNvPr>
@@ -3739,42 +3686,10 @@
           </a:p>
         </p:txBody>
       </p:sp>
-      <p:sp>
-        <p:nvSpPr>
-          <p:cNvPr id="5" name="TextBox 4">
-            <a:extLst>
-              <a:ext uri="{FF2B5EF4-FFF2-40B4-BE49-F238E27FC236}">
-                <a16:creationId xmlns:a16="http://schemas.microsoft.com/office/drawing/2014/main" id="{B69D0F7B-4DFF-B344-8CEB-24A06208AFCA}"/>
-              </a:ext>
-            </a:extLst>
-          </p:cNvPr>
-          <p:cNvSpPr txBox="1"/>
-          <p:nvPr/>
-        </p:nvSpPr>
-        <p:spPr>
-          <a:xfrm>
-            <a:off x="-5303520" y="-2067951"/>
-            <a:ext cx="184731" cy="276999"/>
-          </a:xfrm>
-          <a:prstGeom prst="rect">
-            <a:avLst/>
-          </a:prstGeom>
-          <a:noFill/>
-        </p:spPr>
-        <p:txBody>
-          <a:bodyPr wrap="none" rtlCol="0">
-            <a:spAutoFit/>
-          </a:bodyPr>
-          <a:lstStyle/>
-          <a:p>
-            <a:endParaRPr lang="en-US" baseline="30000" dirty="0"/>
-          </a:p>
-        </p:txBody>
-      </p:sp>
     </p:spTree>
     <p:extLst>
       <p:ext uri="{BB962C8B-B14F-4D97-AF65-F5344CB8AC3E}">
-        <p14:creationId xmlns:p14="http://schemas.microsoft.com/office/powerpoint/2010/main" val="3538559300"/>
+        <p14:creationId xmlns:p14="http://schemas.microsoft.com/office/powerpoint/2010/main" val="1170081373"/>
       </p:ext>
     </p:extLst>
   </p:cSld>
@@ -3806,7 +3721,7 @@
           <p:cNvPr id="2" name="Title 1">
             <a:extLst>
               <a:ext uri="{FF2B5EF4-FFF2-40B4-BE49-F238E27FC236}">
-                <a16:creationId xmlns:a16="http://schemas.microsoft.com/office/drawing/2014/main" id="{97457FC6-297F-2043-BC3F-E400592E448A}"/>
+                <a16:creationId xmlns:a16="http://schemas.microsoft.com/office/drawing/2014/main" id="{803C7C4C-2BF4-1442-A6D3-4A3F9949A35C}"/>
               </a:ext>
             </a:extLst>
           </p:cNvPr>
@@ -3824,7 +3739,7 @@
           <a:p>
             <a:r>
               <a:rPr lang="en-US" dirty="0"/>
-              <a:t>Successor Relation in Lean</a:t>
+              <a:t>Successor Relation</a:t>
             </a:r>
           </a:p>
         </p:txBody>
@@ -3834,7 +3749,7 @@
           <p:cNvPr id="3" name="Content Placeholder 2">
             <a:extLst>
               <a:ext uri="{FF2B5EF4-FFF2-40B4-BE49-F238E27FC236}">
-                <a16:creationId xmlns:a16="http://schemas.microsoft.com/office/drawing/2014/main" id="{ECE7E586-8B4B-9348-9966-6E0690A5DC66}"/>
+                <a16:creationId xmlns:a16="http://schemas.microsoft.com/office/drawing/2014/main" id="{DD455549-A922-674E-A6A8-67B8CAB6F221}"/>
               </a:ext>
             </a:extLst>
           </p:cNvPr>
@@ -3845,140 +3760,132 @@
             <p:ph idx="1"/>
           </p:nvPr>
         </p:nvSpPr>
-        <p:spPr/>
+        <p:spPr>
+          <a:xfrm>
+            <a:off x="838200" y="1505243"/>
+            <a:ext cx="10515600" cy="4851107"/>
+          </a:xfrm>
+        </p:spPr>
         <p:txBody>
           <a:bodyPr>
-            <a:normAutofit/>
+            <a:normAutofit fontScale="92500" lnSpcReduction="20000"/>
           </a:bodyPr>
           <a:lstStyle/>
           <a:p>
-            <a:pPr marL="0" indent="0">
-              <a:buNone/>
-            </a:pPr>
-            <a:r>
-              <a:rPr lang="en-US" sz="2400" dirty="0">
-                <a:latin typeface="Courier New" panose="02070309020205020404" pitchFamily="49" charset="0"/>
-                <a:cs typeface="Courier New" panose="02070309020205020404" pitchFamily="49" charset="0"/>
-              </a:rPr>
-              <a:t>def successor: (</a:t>
-            </a:r>
-            <a:r>
-              <a:rPr lang="el-GR" sz="2400" dirty="0">
-                <a:latin typeface="Courier New" panose="02070309020205020404" pitchFamily="49" charset="0"/>
-                <a:cs typeface="Courier New" panose="02070309020205020404" pitchFamily="49" charset="0"/>
-              </a:rPr>
-              <a:t>β → β → </a:t>
-            </a:r>
-            <a:r>
-              <a:rPr lang="en-US" sz="2400" dirty="0">
-                <a:latin typeface="Courier New" panose="02070309020205020404" pitchFamily="49" charset="0"/>
-                <a:cs typeface="Courier New" panose="02070309020205020404" pitchFamily="49" charset="0"/>
-              </a:rPr>
-              <a:t>Prop) → (</a:t>
-            </a:r>
-            <a:r>
-              <a:rPr lang="el-GR" sz="2400" dirty="0">
-                <a:latin typeface="Courier New" panose="02070309020205020404" pitchFamily="49" charset="0"/>
-                <a:cs typeface="Courier New" panose="02070309020205020404" pitchFamily="49" charset="0"/>
-              </a:rPr>
-              <a:t>β → β → </a:t>
-            </a:r>
-            <a:r>
-              <a:rPr lang="en-US" sz="2400" dirty="0">
-                <a:latin typeface="Courier New" panose="02070309020205020404" pitchFamily="49" charset="0"/>
-                <a:cs typeface="Courier New" panose="02070309020205020404" pitchFamily="49" charset="0"/>
-              </a:rPr>
-              <a:t>Prop) :=</a:t>
-            </a:r>
-          </a:p>
-          <a:p>
-            <a:pPr marL="0" indent="0">
-              <a:buNone/>
-            </a:pPr>
-            <a:r>
-              <a:rPr lang="en-US" sz="2400" dirty="0">
-                <a:latin typeface="Courier New" panose="02070309020205020404" pitchFamily="49" charset="0"/>
-                <a:cs typeface="Courier New" panose="02070309020205020404" pitchFamily="49" charset="0"/>
-              </a:rPr>
-              <a:t>begin</a:t>
-            </a:r>
-          </a:p>
-          <a:p>
-            <a:pPr marL="0" indent="0">
-              <a:buNone/>
-            </a:pPr>
-            <a:r>
-              <a:rPr lang="en-US" sz="2400" dirty="0">
-                <a:latin typeface="Courier New" panose="02070309020205020404" pitchFamily="49" charset="0"/>
-                <a:cs typeface="Courier New" panose="02070309020205020404" pitchFamily="49" charset="0"/>
-              </a:rPr>
-              <a:t>  assume r,</a:t>
-            </a:r>
-          </a:p>
-          <a:p>
-            <a:pPr marL="0" indent="0">
-              <a:buNone/>
-            </a:pPr>
-            <a:r>
-              <a:rPr lang="en-US" sz="2400" dirty="0">
-                <a:latin typeface="Courier New" panose="02070309020205020404" pitchFamily="49" charset="0"/>
-                <a:cs typeface="Courier New" panose="02070309020205020404" pitchFamily="49" charset="0"/>
-              </a:rPr>
-              <a:t>  exact </a:t>
-            </a:r>
-            <a:r>
-              <a:rPr lang="el-GR" sz="2400" dirty="0">
-                <a:latin typeface="Courier New" panose="02070309020205020404" pitchFamily="49" charset="0"/>
-                <a:cs typeface="Courier New" panose="02070309020205020404" pitchFamily="49" charset="0"/>
-              </a:rPr>
-              <a:t>λ(</a:t>
-            </a:r>
-            <a:r>
-              <a:rPr lang="en-US" sz="2400" dirty="0">
-                <a:latin typeface="Courier New" panose="02070309020205020404" pitchFamily="49" charset="0"/>
-                <a:cs typeface="Courier New" panose="02070309020205020404" pitchFamily="49" charset="0"/>
-              </a:rPr>
-              <a:t>x y: </a:t>
-            </a:r>
-            <a:r>
-              <a:rPr lang="el-GR" sz="2400" dirty="0">
-                <a:latin typeface="Courier New" panose="02070309020205020404" pitchFamily="49" charset="0"/>
-                <a:cs typeface="Courier New" panose="02070309020205020404" pitchFamily="49" charset="0"/>
-              </a:rPr>
-              <a:t>β), ∃(</a:t>
-            </a:r>
-            <a:r>
-              <a:rPr lang="en-US" sz="2400" dirty="0">
-                <a:latin typeface="Courier New" panose="02070309020205020404" pitchFamily="49" charset="0"/>
-                <a:cs typeface="Courier New" panose="02070309020205020404" pitchFamily="49" charset="0"/>
-              </a:rPr>
-              <a:t>b: </a:t>
-            </a:r>
-            <a:r>
-              <a:rPr lang="el-GR" sz="2400" dirty="0">
-                <a:latin typeface="Courier New" panose="02070309020205020404" pitchFamily="49" charset="0"/>
-                <a:cs typeface="Courier New" panose="02070309020205020404" pitchFamily="49" charset="0"/>
-              </a:rPr>
-              <a:t>β), (</a:t>
-            </a:r>
-            <a:r>
-              <a:rPr lang="en-US" sz="2400" dirty="0">
-                <a:latin typeface="Courier New" panose="02070309020205020404" pitchFamily="49" charset="0"/>
-                <a:cs typeface="Courier New" panose="02070309020205020404" pitchFamily="49" charset="0"/>
-              </a:rPr>
-              <a:t>r x b) ∧ (r b y)</a:t>
-            </a:r>
-          </a:p>
-          <a:p>
-            <a:pPr marL="0" indent="0">
-              <a:buNone/>
-            </a:pPr>
-            <a:r>
-              <a:rPr lang="en-US" sz="2400" dirty="0">
-                <a:latin typeface="Courier New" panose="02070309020205020404" pitchFamily="49" charset="0"/>
-                <a:cs typeface="Courier New" panose="02070309020205020404" pitchFamily="49" charset="0"/>
-              </a:rPr>
-              <a:t>end</a:t>
+            <a:r>
+              <a:rPr lang="en-US" dirty="0"/>
+              <a:t>Let us define a relation R as R</a:t>
+            </a:r>
+            <a:r>
+              <a:rPr lang="en-US" baseline="30000" dirty="0"/>
+              <a:t>1</a:t>
+            </a:r>
+          </a:p>
+          <a:p>
+            <a:pPr lvl="1"/>
+            <a:r>
+              <a:rPr lang="en-US" dirty="0"/>
+              <a:t>For example imagine the relation “is one or two less than” as defined over the naturals</a:t>
+            </a:r>
+          </a:p>
+          <a:p>
+            <a:pPr lvl="2"/>
+            <a:r>
+              <a:rPr lang="en-US" dirty="0"/>
+              <a:t>It contains the 2-tuples {(0, 1), (0, 2), (1, 2), (1, 3), (2, 3), (2, 4), (3, 4), (3, 5), etc.}</a:t>
+            </a:r>
+          </a:p>
+          <a:p>
+            <a:r>
+              <a:rPr lang="en-US" dirty="0"/>
+              <a:t>Now let us define R</a:t>
+            </a:r>
+            <a:r>
+              <a:rPr lang="en-US" baseline="30000" dirty="0"/>
+              <a:t>2</a:t>
+            </a:r>
+            <a:r>
+              <a:rPr lang="en-US" dirty="0"/>
+              <a:t> (or R ◦ R) as the relation having left-hand elements equal to the left-hand elements of the tuples in R</a:t>
+            </a:r>
+            <a:r>
+              <a:rPr lang="en-US" baseline="30000" dirty="0"/>
+              <a:t>1</a:t>
+            </a:r>
+            <a:r>
+              <a:rPr lang="en-US" dirty="0"/>
+              <a:t>, and right-hand elements equal to the corresponding right-hand elements of the right-hand elements in R</a:t>
+            </a:r>
+            <a:r>
+              <a:rPr lang="en-US" baseline="30000" dirty="0"/>
+              <a:t>1</a:t>
+            </a:r>
+          </a:p>
+          <a:p>
+            <a:pPr lvl="1"/>
+            <a:r>
+              <a:rPr lang="en-US" dirty="0"/>
+              <a:t>E.g., from above this would be “is two, three, or four less than”</a:t>
+            </a:r>
+          </a:p>
+          <a:p>
+            <a:pPr lvl="2"/>
+            <a:r>
+              <a:rPr lang="en-US" dirty="0"/>
+              <a:t>It contains the 2-tuples {(0, 2), (0, 3), (0, 4), (1, 3), (1, 4), (1, 5), </a:t>
+            </a:r>
+            <a:r>
+              <a:rPr lang="en-US"/>
+              <a:t>etc.}</a:t>
+            </a:r>
+            <a:endParaRPr lang="en-US" dirty="0"/>
+          </a:p>
+          <a:p>
+            <a:r>
+              <a:rPr lang="en-US" dirty="0"/>
+              <a:t>R</a:t>
+            </a:r>
+            <a:r>
+              <a:rPr lang="en-US" baseline="30000" dirty="0"/>
+              <a:t>3</a:t>
+            </a:r>
+            <a:r>
+              <a:rPr lang="en-US" dirty="0"/>
+              <a:t> (or R ◦ R</a:t>
+            </a:r>
+            <a:r>
+              <a:rPr lang="en-US" baseline="30000" dirty="0"/>
+              <a:t>2</a:t>
+            </a:r>
+            <a:r>
+              <a:rPr lang="en-US" dirty="0"/>
+              <a:t>) is the relation having left-hand elements having left-hand elements equal to the left-hand elements of the tuples in R</a:t>
+            </a:r>
+            <a:r>
+              <a:rPr lang="en-US" baseline="30000" dirty="0"/>
+              <a:t>1</a:t>
+            </a:r>
+            <a:r>
+              <a:rPr lang="en-US" dirty="0"/>
+              <a:t>, and right-hand elements equal to the corresponding right-hand elements of the right-hand elements in R</a:t>
+            </a:r>
+            <a:r>
+              <a:rPr lang="en-US" baseline="30000" dirty="0"/>
+              <a:t>2</a:t>
+            </a:r>
+          </a:p>
+          <a:p>
+            <a:pPr lvl="1"/>
+            <a:r>
+              <a:rPr lang="en-US" dirty="0"/>
+              <a:t>E.g., from the above this would be “is three, four, five, or six less than”</a:t>
+            </a:r>
+          </a:p>
+          <a:p>
+            <a:pPr lvl="2"/>
+            <a:r>
+              <a:rPr lang="en-US" dirty="0"/>
+              <a:t>It contains the 2-tuples {(0, 3), (0, 4), (0, 5), (0, 6), (1, 4), (1, 5), (1, 6), (1, 7), etc.}</a:t>
             </a:r>
           </a:p>
         </p:txBody>
@@ -3988,7 +3895,7 @@
           <p:cNvPr id="4" name="Slide Number Placeholder 3">
             <a:extLst>
               <a:ext uri="{FF2B5EF4-FFF2-40B4-BE49-F238E27FC236}">
-                <a16:creationId xmlns:a16="http://schemas.microsoft.com/office/drawing/2014/main" id="{886F7B50-6C69-1A48-B617-2408CA5FE67A}"/>
+                <a16:creationId xmlns:a16="http://schemas.microsoft.com/office/drawing/2014/main" id="{153DCD92-4CA0-E543-9B98-16CB3E3C2F5A}"/>
               </a:ext>
             </a:extLst>
           </p:cNvPr>
@@ -4012,10 +3919,42 @@
           </a:p>
         </p:txBody>
       </p:sp>
+      <p:sp>
+        <p:nvSpPr>
+          <p:cNvPr id="5" name="TextBox 4">
+            <a:extLst>
+              <a:ext uri="{FF2B5EF4-FFF2-40B4-BE49-F238E27FC236}">
+                <a16:creationId xmlns:a16="http://schemas.microsoft.com/office/drawing/2014/main" id="{B69D0F7B-4DFF-B344-8CEB-24A06208AFCA}"/>
+              </a:ext>
+            </a:extLst>
+          </p:cNvPr>
+          <p:cNvSpPr txBox="1"/>
+          <p:nvPr/>
+        </p:nvSpPr>
+        <p:spPr>
+          <a:xfrm>
+            <a:off x="-5303520" y="-2067951"/>
+            <a:ext cx="184731" cy="276999"/>
+          </a:xfrm>
+          <a:prstGeom prst="rect">
+            <a:avLst/>
+          </a:prstGeom>
+          <a:noFill/>
+        </p:spPr>
+        <p:txBody>
+          <a:bodyPr wrap="none" rtlCol="0">
+            <a:spAutoFit/>
+          </a:bodyPr>
+          <a:lstStyle/>
+          <a:p>
+            <a:endParaRPr lang="en-US" baseline="30000" dirty="0"/>
+          </a:p>
+        </p:txBody>
+      </p:sp>
     </p:spTree>
     <p:extLst>
       <p:ext uri="{BB962C8B-B14F-4D97-AF65-F5344CB8AC3E}">
-        <p14:creationId xmlns:p14="http://schemas.microsoft.com/office/powerpoint/2010/main" val="3238652549"/>
+        <p14:creationId xmlns:p14="http://schemas.microsoft.com/office/powerpoint/2010/main" val="3538559300"/>
       </p:ext>
     </p:extLst>
   </p:cSld>
@@ -4047,6 +3986,247 @@
           <p:cNvPr id="2" name="Title 1">
             <a:extLst>
               <a:ext uri="{FF2B5EF4-FFF2-40B4-BE49-F238E27FC236}">
+                <a16:creationId xmlns:a16="http://schemas.microsoft.com/office/drawing/2014/main" id="{97457FC6-297F-2043-BC3F-E400592E448A}"/>
+              </a:ext>
+            </a:extLst>
+          </p:cNvPr>
+          <p:cNvSpPr>
+            <a:spLocks noGrp="1"/>
+          </p:cNvSpPr>
+          <p:nvPr>
+            <p:ph type="title"/>
+          </p:nvPr>
+        </p:nvSpPr>
+        <p:spPr/>
+        <p:txBody>
+          <a:bodyPr/>
+          <a:lstStyle/>
+          <a:p>
+            <a:r>
+              <a:rPr lang="en-US" dirty="0"/>
+              <a:t>Successor Relation in Lean</a:t>
+            </a:r>
+          </a:p>
+        </p:txBody>
+      </p:sp>
+      <p:sp>
+        <p:nvSpPr>
+          <p:cNvPr id="3" name="Content Placeholder 2">
+            <a:extLst>
+              <a:ext uri="{FF2B5EF4-FFF2-40B4-BE49-F238E27FC236}">
+                <a16:creationId xmlns:a16="http://schemas.microsoft.com/office/drawing/2014/main" id="{ECE7E586-8B4B-9348-9966-6E0690A5DC66}"/>
+              </a:ext>
+            </a:extLst>
+          </p:cNvPr>
+          <p:cNvSpPr>
+            <a:spLocks noGrp="1"/>
+          </p:cNvSpPr>
+          <p:nvPr>
+            <p:ph idx="1"/>
+          </p:nvPr>
+        </p:nvSpPr>
+        <p:spPr/>
+        <p:txBody>
+          <a:bodyPr>
+            <a:normAutofit/>
+          </a:bodyPr>
+          <a:lstStyle/>
+          <a:p>
+            <a:pPr marL="0" indent="0">
+              <a:buNone/>
+            </a:pPr>
+            <a:r>
+              <a:rPr lang="en-US" sz="2400" dirty="0">
+                <a:latin typeface="Courier New" panose="02070309020205020404" pitchFamily="49" charset="0"/>
+                <a:cs typeface="Courier New" panose="02070309020205020404" pitchFamily="49" charset="0"/>
+              </a:rPr>
+              <a:t>def successor: (</a:t>
+            </a:r>
+            <a:r>
+              <a:rPr lang="el-GR" sz="2400" dirty="0">
+                <a:latin typeface="Courier New" panose="02070309020205020404" pitchFamily="49" charset="0"/>
+                <a:cs typeface="Courier New" panose="02070309020205020404" pitchFamily="49" charset="0"/>
+              </a:rPr>
+              <a:t>β → β → </a:t>
+            </a:r>
+            <a:r>
+              <a:rPr lang="en-US" sz="2400" dirty="0">
+                <a:latin typeface="Courier New" panose="02070309020205020404" pitchFamily="49" charset="0"/>
+                <a:cs typeface="Courier New" panose="02070309020205020404" pitchFamily="49" charset="0"/>
+              </a:rPr>
+              <a:t>Prop) → (</a:t>
+            </a:r>
+            <a:r>
+              <a:rPr lang="el-GR" sz="2400" dirty="0">
+                <a:latin typeface="Courier New" panose="02070309020205020404" pitchFamily="49" charset="0"/>
+                <a:cs typeface="Courier New" panose="02070309020205020404" pitchFamily="49" charset="0"/>
+              </a:rPr>
+              <a:t>β → β → </a:t>
+            </a:r>
+            <a:r>
+              <a:rPr lang="en-US" sz="2400" dirty="0">
+                <a:latin typeface="Courier New" panose="02070309020205020404" pitchFamily="49" charset="0"/>
+                <a:cs typeface="Courier New" panose="02070309020205020404" pitchFamily="49" charset="0"/>
+              </a:rPr>
+              <a:t>Prop) :=</a:t>
+            </a:r>
+          </a:p>
+          <a:p>
+            <a:pPr marL="0" indent="0">
+              <a:buNone/>
+            </a:pPr>
+            <a:r>
+              <a:rPr lang="en-US" sz="2400" dirty="0">
+                <a:latin typeface="Courier New" panose="02070309020205020404" pitchFamily="49" charset="0"/>
+                <a:cs typeface="Courier New" panose="02070309020205020404" pitchFamily="49" charset="0"/>
+              </a:rPr>
+              <a:t>begin</a:t>
+            </a:r>
+          </a:p>
+          <a:p>
+            <a:pPr marL="0" indent="0">
+              <a:buNone/>
+            </a:pPr>
+            <a:r>
+              <a:rPr lang="en-US" sz="2400" dirty="0">
+                <a:latin typeface="Courier New" panose="02070309020205020404" pitchFamily="49" charset="0"/>
+                <a:cs typeface="Courier New" panose="02070309020205020404" pitchFamily="49" charset="0"/>
+              </a:rPr>
+              <a:t>  assume r,</a:t>
+            </a:r>
+          </a:p>
+          <a:p>
+            <a:pPr marL="0" indent="0">
+              <a:buNone/>
+            </a:pPr>
+            <a:r>
+              <a:rPr lang="en-US" sz="2400" dirty="0">
+                <a:latin typeface="Courier New" panose="02070309020205020404" pitchFamily="49" charset="0"/>
+                <a:cs typeface="Courier New" panose="02070309020205020404" pitchFamily="49" charset="0"/>
+              </a:rPr>
+              <a:t>  exact </a:t>
+            </a:r>
+            <a:r>
+              <a:rPr lang="el-GR" sz="2400" dirty="0">
+                <a:latin typeface="Courier New" panose="02070309020205020404" pitchFamily="49" charset="0"/>
+                <a:cs typeface="Courier New" panose="02070309020205020404" pitchFamily="49" charset="0"/>
+              </a:rPr>
+              <a:t>λ(</a:t>
+            </a:r>
+            <a:r>
+              <a:rPr lang="en-US" sz="2400" dirty="0">
+                <a:latin typeface="Courier New" panose="02070309020205020404" pitchFamily="49" charset="0"/>
+                <a:cs typeface="Courier New" panose="02070309020205020404" pitchFamily="49" charset="0"/>
+              </a:rPr>
+              <a:t>x y: </a:t>
+            </a:r>
+            <a:r>
+              <a:rPr lang="el-GR" sz="2400" dirty="0">
+                <a:latin typeface="Courier New" panose="02070309020205020404" pitchFamily="49" charset="0"/>
+                <a:cs typeface="Courier New" panose="02070309020205020404" pitchFamily="49" charset="0"/>
+              </a:rPr>
+              <a:t>β), ∃(</a:t>
+            </a:r>
+            <a:r>
+              <a:rPr lang="en-US" sz="2400" dirty="0">
+                <a:latin typeface="Courier New" panose="02070309020205020404" pitchFamily="49" charset="0"/>
+                <a:cs typeface="Courier New" panose="02070309020205020404" pitchFamily="49" charset="0"/>
+              </a:rPr>
+              <a:t>b: </a:t>
+            </a:r>
+            <a:r>
+              <a:rPr lang="el-GR" sz="2400" dirty="0">
+                <a:latin typeface="Courier New" panose="02070309020205020404" pitchFamily="49" charset="0"/>
+                <a:cs typeface="Courier New" panose="02070309020205020404" pitchFamily="49" charset="0"/>
+              </a:rPr>
+              <a:t>β), (</a:t>
+            </a:r>
+            <a:r>
+              <a:rPr lang="en-US" sz="2400" dirty="0">
+                <a:latin typeface="Courier New" panose="02070309020205020404" pitchFamily="49" charset="0"/>
+                <a:cs typeface="Courier New" panose="02070309020205020404" pitchFamily="49" charset="0"/>
+              </a:rPr>
+              <a:t>r x b) ∧ (r b y)</a:t>
+            </a:r>
+          </a:p>
+          <a:p>
+            <a:pPr marL="0" indent="0">
+              <a:buNone/>
+            </a:pPr>
+            <a:r>
+              <a:rPr lang="en-US" sz="2400" dirty="0">
+                <a:latin typeface="Courier New" panose="02070309020205020404" pitchFamily="49" charset="0"/>
+                <a:cs typeface="Courier New" panose="02070309020205020404" pitchFamily="49" charset="0"/>
+              </a:rPr>
+              <a:t>end</a:t>
+            </a:r>
+          </a:p>
+        </p:txBody>
+      </p:sp>
+      <p:sp>
+        <p:nvSpPr>
+          <p:cNvPr id="4" name="Slide Number Placeholder 3">
+            <a:extLst>
+              <a:ext uri="{FF2B5EF4-FFF2-40B4-BE49-F238E27FC236}">
+                <a16:creationId xmlns:a16="http://schemas.microsoft.com/office/drawing/2014/main" id="{886F7B50-6C69-1A48-B617-2408CA5FE67A}"/>
+              </a:ext>
+            </a:extLst>
+          </p:cNvPr>
+          <p:cNvSpPr>
+            <a:spLocks noGrp="1"/>
+          </p:cNvSpPr>
+          <p:nvPr>
+            <p:ph type="sldNum" sz="quarter" idx="12"/>
+          </p:nvPr>
+        </p:nvSpPr>
+        <p:spPr/>
+        <p:txBody>
+          <a:bodyPr/>
+          <a:lstStyle/>
+          <a:p>
+            <a:fld id="{3352CBF5-17B8-4387-88A6-ABF9F8C64D5A}" type="slidenum">
+              <a:rPr lang="en-US" smtClean="0"/>
+              <a:t>12</a:t>
+            </a:fld>
+            <a:endParaRPr lang="en-US"/>
+          </a:p>
+        </p:txBody>
+      </p:sp>
+    </p:spTree>
+    <p:extLst>
+      <p:ext uri="{BB962C8B-B14F-4D97-AF65-F5344CB8AC3E}">
+        <p14:creationId xmlns:p14="http://schemas.microsoft.com/office/powerpoint/2010/main" val="3238652549"/>
+      </p:ext>
+    </p:extLst>
+  </p:cSld>
+  <p:clrMapOvr>
+    <a:masterClrMapping/>
+  </p:clrMapOvr>
+</p:sld>
+</file>
+
+<file path=ppt/slides/slide13.xml><?xml version="1.0" encoding="utf-8"?>
+<p:sld xmlns:a="http://schemas.openxmlformats.org/drawingml/2006/main" xmlns:r="http://schemas.openxmlformats.org/officeDocument/2006/relationships" xmlns:p="http://schemas.openxmlformats.org/presentationml/2006/main">
+  <p:cSld>
+    <p:spTree>
+      <p:nvGrpSpPr>
+        <p:cNvPr id="1" name=""/>
+        <p:cNvGrpSpPr/>
+        <p:nvPr/>
+      </p:nvGrpSpPr>
+      <p:grpSpPr>
+        <a:xfrm>
+          <a:off x="0" y="0"/>
+          <a:ext cx="0" cy="0"/>
+          <a:chOff x="0" y="0"/>
+          <a:chExt cx="0" cy="0"/>
+        </a:xfrm>
+      </p:grpSpPr>
+      <p:sp>
+        <p:nvSpPr>
+          <p:cNvPr id="2" name="Title 1">
+            <a:extLst>
+              <a:ext uri="{FF2B5EF4-FFF2-40B4-BE49-F238E27FC236}">
                 <a16:creationId xmlns:a16="http://schemas.microsoft.com/office/drawing/2014/main" id="{72BF9966-CB8F-1646-A6A7-089D19A598DB}"/>
               </a:ext>
             </a:extLst>
@@ -4314,7 +4494,7 @@
           <a:p>
             <a:fld id="{3352CBF5-17B8-4387-88A6-ABF9F8C64D5A}" type="slidenum">
               <a:rPr lang="en-US" smtClean="0"/>
-              <a:t>12</a:t>
+              <a:t>13</a:t>
             </a:fld>
             <a:endParaRPr lang="en-US"/>
           </a:p>
@@ -4608,7 +4788,7 @@
 </p:sld>
 </file>
 
-<file path=ppt/slides/slide13.xml><?xml version="1.0" encoding="utf-8"?>
+<file path=ppt/slides/slide14.xml><?xml version="1.0" encoding="utf-8"?>
 <p:sld xmlns:a="http://schemas.openxmlformats.org/drawingml/2006/main" xmlns:r="http://schemas.openxmlformats.org/officeDocument/2006/relationships" xmlns:p="http://schemas.openxmlformats.org/presentationml/2006/main">
   <p:cSld>
     <p:spTree>
@@ -5003,7 +5183,7 @@
           <a:p>
             <a:fld id="{3352CBF5-17B8-4387-88A6-ABF9F8C64D5A}" type="slidenum">
               <a:rPr lang="en-US" smtClean="0"/>
-              <a:t>13</a:t>
+              <a:t>14</a:t>
             </a:fld>
             <a:endParaRPr lang="en-US"/>
           </a:p>
@@ -5022,7 +5202,7 @@
 </p:sld>
 </file>
 
-<file path=ppt/slides/slide14.xml><?xml version="1.0" encoding="utf-8"?>
+<file path=ppt/slides/slide15.xml><?xml version="1.0" encoding="utf-8"?>
 <p:sld xmlns:a="http://schemas.openxmlformats.org/drawingml/2006/main" xmlns:r="http://schemas.openxmlformats.org/officeDocument/2006/relationships" xmlns:p="http://schemas.openxmlformats.org/presentationml/2006/main">
   <p:cSld>
     <p:spTree>
@@ -5164,7 +5344,7 @@
             </a:r>
             <a:r>
               <a:rPr lang="en-US" dirty="0"/>
-              <a:t>, LHS = n &gt; 0 ∧ 2n + RHS</a:t>
+              <a:t>, n &gt; 0 ∧ LHS = 2n + RHS</a:t>
             </a:r>
           </a:p>
           <a:p>
@@ -5186,7 +5366,7 @@
             <a:pPr lvl="2"/>
             <a:r>
               <a:rPr lang="en-US" dirty="0"/>
-              <a:t>TC = “LHS has same parity as RHS”</a:t>
+              <a:t>TC = “LHS has same parity as RHS and is not equal to the RHS”</a:t>
             </a:r>
             <a:br>
               <a:rPr lang="en-US" dirty="0"/>
@@ -5209,7 +5389,30 @@
             </a:r>
             <a:r>
               <a:rPr lang="en-US" dirty="0"/>
-              <a:t> RHS is odd”</a:t>
+              <a:t> RHS is odd (and they’re not equal)”</a:t>
+            </a:r>
+            <a:br>
+              <a:rPr lang="en-US" dirty="0"/>
+            </a:br>
+            <a:r>
+              <a:rPr lang="en-US" dirty="0"/>
+              <a:t>AKA ∃n: </a:t>
+            </a:r>
+            <a:r>
+              <a:rPr lang="en-US" dirty="0" err="1"/>
+              <a:t>ℤ</a:t>
+            </a:r>
+            <a:r>
+              <a:rPr lang="en-US" dirty="0"/>
+              <a:t>, </a:t>
+            </a:r>
+            <a:r>
+              <a:rPr lang="en-US" dirty="0" err="1"/>
+              <a:t>i</a:t>
+            </a:r>
+            <a:r>
+              <a:rPr lang="en-US" dirty="0"/>
+              <a:t> ≠ 0 ∧ LHS = 2i + RHS</a:t>
             </a:r>
           </a:p>
           <a:p>
@@ -5241,7 +5444,7 @@
           <a:p>
             <a:fld id="{3352CBF5-17B8-4387-88A6-ABF9F8C64D5A}" type="slidenum">
               <a:rPr lang="en-US" smtClean="0"/>
-              <a:t>14</a:t>
+              <a:t>15</a:t>
             </a:fld>
             <a:endParaRPr lang="en-US"/>
           </a:p>
@@ -5486,7 +5689,7 @@
 </p:sld>
 </file>
 
-<file path=ppt/slides/slide15.xml><?xml version="1.0" encoding="utf-8"?>
+<file path=ppt/slides/slide16.xml><?xml version="1.0" encoding="utf-8"?>
 <p:sld xmlns:a="http://schemas.openxmlformats.org/drawingml/2006/main" xmlns:r="http://schemas.openxmlformats.org/officeDocument/2006/relationships" xmlns:p="http://schemas.openxmlformats.org/presentationml/2006/main">
   <p:cSld>
     <p:bg>
@@ -5757,7 +5960,7 @@
           <a:p>
             <a:fld id="{3352CBF5-17B8-4387-88A6-ABF9F8C64D5A}" type="slidenum">
               <a:rPr lang="en-US" smtClean="0"/>
-              <a:t>15</a:t>
+              <a:t>16</a:t>
             </a:fld>
             <a:endParaRPr lang="en-US"/>
           </a:p>
@@ -6929,6 +7132,197 @@
           <p:cNvPr id="2" name="Title 1">
             <a:extLst>
               <a:ext uri="{FF2B5EF4-FFF2-40B4-BE49-F238E27FC236}">
+                <a16:creationId xmlns:a16="http://schemas.microsoft.com/office/drawing/2014/main" id="{8DFB4089-925C-3848-A3DD-46562FB8AC71}"/>
+              </a:ext>
+            </a:extLst>
+          </p:cNvPr>
+          <p:cNvSpPr>
+            <a:spLocks noGrp="1"/>
+          </p:cNvSpPr>
+          <p:nvPr>
+            <p:ph type="title"/>
+          </p:nvPr>
+        </p:nvSpPr>
+        <p:spPr/>
+        <p:txBody>
+          <a:bodyPr/>
+          <a:lstStyle/>
+          <a:p>
+            <a:r>
+              <a:rPr lang="en-US" dirty="0"/>
+              <a:t>Relation properties summary</a:t>
+            </a:r>
+          </a:p>
+        </p:txBody>
+      </p:sp>
+      <p:sp>
+        <p:nvSpPr>
+          <p:cNvPr id="3" name="Content Placeholder 2">
+            <a:extLst>
+              <a:ext uri="{FF2B5EF4-FFF2-40B4-BE49-F238E27FC236}">
+                <a16:creationId xmlns:a16="http://schemas.microsoft.com/office/drawing/2014/main" id="{184FA296-3FCB-3642-A44A-4E9BE1B53589}"/>
+              </a:ext>
+            </a:extLst>
+          </p:cNvPr>
+          <p:cNvSpPr>
+            <a:spLocks noGrp="1"/>
+          </p:cNvSpPr>
+          <p:nvPr>
+            <p:ph idx="1"/>
+          </p:nvPr>
+        </p:nvSpPr>
+        <p:spPr/>
+        <p:txBody>
+          <a:bodyPr>
+            <a:normAutofit/>
+          </a:bodyPr>
+          <a:lstStyle/>
+          <a:p>
+            <a:pPr marL="514350" indent="-514350">
+              <a:buFont typeface="+mj-lt"/>
+              <a:buAutoNum type="alphaLcParenR"/>
+            </a:pPr>
+            <a:r>
+              <a:rPr lang="en-US" dirty="0"/>
+              <a:t>Reflexive: ∀x, x R x</a:t>
+            </a:r>
+          </a:p>
+          <a:p>
+            <a:pPr marL="514350" indent="-514350">
+              <a:buFont typeface="+mj-lt"/>
+              <a:buAutoNum type="alphaLcParenR"/>
+            </a:pPr>
+            <a:r>
+              <a:rPr lang="en-US" dirty="0"/>
+              <a:t>Symmetric: ∀ x y, x R y → y R x</a:t>
+            </a:r>
+          </a:p>
+          <a:p>
+            <a:pPr marL="514350" indent="-514350">
+              <a:buFont typeface="+mj-lt"/>
+              <a:buAutoNum type="alphaLcParenR"/>
+            </a:pPr>
+            <a:r>
+              <a:rPr lang="en-US" dirty="0"/>
+              <a:t>Transitive: ∀ x y z, x R y ∧ y R z → x R z</a:t>
+            </a:r>
+          </a:p>
+          <a:p>
+            <a:pPr marL="514350" indent="-514350">
+              <a:buFont typeface="+mj-lt"/>
+              <a:buAutoNum type="alphaLcParenR"/>
+            </a:pPr>
+            <a:r>
+              <a:rPr lang="en-US" dirty="0"/>
+              <a:t>Total: ∀ x y, x R y ∨ y R x</a:t>
+            </a:r>
+          </a:p>
+          <a:p>
+            <a:pPr marL="514350" indent="-514350">
+              <a:buFont typeface="+mj-lt"/>
+              <a:buAutoNum type="alphaLcParenR"/>
+            </a:pPr>
+            <a:r>
+              <a:rPr lang="en-US" dirty="0"/>
+              <a:t>Irreflexive: ∀x, x R x → false</a:t>
+            </a:r>
+          </a:p>
+          <a:p>
+            <a:pPr marL="514350" indent="-514350">
+              <a:buFont typeface="+mj-lt"/>
+              <a:buAutoNum type="alphaLcParenR"/>
+            </a:pPr>
+            <a:r>
+              <a:rPr lang="en-US" dirty="0"/>
+              <a:t>Anti-symmetric: ∀ x y, x R y ∧ y R x → x = y</a:t>
+            </a:r>
+          </a:p>
+          <a:p>
+            <a:pPr marL="514350" indent="-514350">
+              <a:buFont typeface="+mj-lt"/>
+              <a:buAutoNum type="alphaLcParenR"/>
+            </a:pPr>
+            <a:r>
+              <a:rPr lang="en-US" dirty="0"/>
+              <a:t>Connected: ∀ x y, x ≠ y → x R y ∨ y R x</a:t>
+            </a:r>
+          </a:p>
+          <a:p>
+            <a:pPr marL="514350" indent="-514350">
+              <a:buFont typeface="+mj-lt"/>
+              <a:buAutoNum type="alphaLcParenR"/>
+            </a:pPr>
+            <a:r>
+              <a:rPr lang="en-US" dirty="0"/>
+              <a:t>Empty: ∀ x y, x R y → false</a:t>
+            </a:r>
+          </a:p>
+        </p:txBody>
+      </p:sp>
+      <p:sp>
+        <p:nvSpPr>
+          <p:cNvPr id="4" name="Slide Number Placeholder 3">
+            <a:extLst>
+              <a:ext uri="{FF2B5EF4-FFF2-40B4-BE49-F238E27FC236}">
+                <a16:creationId xmlns:a16="http://schemas.microsoft.com/office/drawing/2014/main" id="{3E636F93-C882-A342-9E45-90AF33D86FF8}"/>
+              </a:ext>
+            </a:extLst>
+          </p:cNvPr>
+          <p:cNvSpPr>
+            <a:spLocks noGrp="1"/>
+          </p:cNvSpPr>
+          <p:nvPr>
+            <p:ph type="sldNum" sz="quarter" idx="12"/>
+          </p:nvPr>
+        </p:nvSpPr>
+        <p:spPr/>
+        <p:txBody>
+          <a:bodyPr/>
+          <a:lstStyle/>
+          <a:p>
+            <a:fld id="{3352CBF5-17B8-4387-88A6-ABF9F8C64D5A}" type="slidenum">
+              <a:rPr lang="en-US" smtClean="0"/>
+              <a:t>7</a:t>
+            </a:fld>
+            <a:endParaRPr lang="en-US"/>
+          </a:p>
+        </p:txBody>
+      </p:sp>
+    </p:spTree>
+    <p:extLst>
+      <p:ext uri="{BB962C8B-B14F-4D97-AF65-F5344CB8AC3E}">
+        <p14:creationId xmlns:p14="http://schemas.microsoft.com/office/powerpoint/2010/main" val="567146598"/>
+      </p:ext>
+    </p:extLst>
+  </p:cSld>
+  <p:clrMapOvr>
+    <a:masterClrMapping/>
+  </p:clrMapOvr>
+</p:sld>
+</file>
+
+<file path=ppt/slides/slide8.xml><?xml version="1.0" encoding="utf-8"?>
+<p:sld xmlns:a="http://schemas.openxmlformats.org/drawingml/2006/main" xmlns:r="http://schemas.openxmlformats.org/officeDocument/2006/relationships" xmlns:p="http://schemas.openxmlformats.org/presentationml/2006/main">
+  <p:cSld>
+    <p:spTree>
+      <p:nvGrpSpPr>
+        <p:cNvPr id="1" name=""/>
+        <p:cNvGrpSpPr/>
+        <p:nvPr/>
+      </p:nvGrpSpPr>
+      <p:grpSpPr>
+        <a:xfrm>
+          <a:off x="0" y="0"/>
+          <a:ext cx="0" cy="0"/>
+          <a:chOff x="0" y="0"/>
+          <a:chExt cx="0" cy="0"/>
+        </a:xfrm>
+      </p:grpSpPr>
+      <p:sp>
+        <p:nvSpPr>
+          <p:cNvPr id="2" name="Title 1">
+            <a:extLst>
+              <a:ext uri="{FF2B5EF4-FFF2-40B4-BE49-F238E27FC236}">
                 <a16:creationId xmlns:a16="http://schemas.microsoft.com/office/drawing/2014/main" id="{95E6BB3C-BF52-BF40-810F-CF9A1360B7AF}"/>
               </a:ext>
             </a:extLst>
@@ -6976,7 +7370,7 @@
         </p:spPr>
         <p:txBody>
           <a:bodyPr>
-            <a:normAutofit fontScale="77500" lnSpcReduction="20000"/>
+            <a:normAutofit fontScale="62500" lnSpcReduction="20000"/>
           </a:bodyPr>
           <a:lstStyle/>
           <a:p>
@@ -7016,59 +7410,7 @@
             </a:r>
             <a:r>
               <a:rPr lang="en-US" dirty="0"/>
-              <a:t>, g</a:t>
-            </a:r>
-          </a:p>
-          <a:p>
-            <a:r>
-              <a:rPr lang="en-US" dirty="0"/>
-              <a:t>≤</a:t>
-            </a:r>
-          </a:p>
-          <a:p>
-            <a:pPr lvl="1"/>
-            <a:r>
-              <a:rPr lang="en-US" dirty="0"/>
-              <a:t>a, c, d, f, g</a:t>
-            </a:r>
-          </a:p>
-          <a:p>
-            <a:r>
-              <a:rPr lang="en-US" dirty="0"/>
-              <a:t>≠</a:t>
-            </a:r>
-          </a:p>
-          <a:p>
-            <a:pPr lvl="1"/>
-            <a:r>
-              <a:rPr lang="en-US" dirty="0"/>
-              <a:t>b, e, g</a:t>
-            </a:r>
-          </a:p>
-          <a:p>
-            <a:r>
-              <a:rPr lang="en-US" dirty="0"/>
-              <a:t>“left-hand side equals 0 * right-hand side”</a:t>
-            </a:r>
-          </a:p>
-          <a:p>
-            <a:pPr lvl="1"/>
-            <a:r>
-              <a:rPr lang="en-US" dirty="0"/>
-              <a:t>f</a:t>
-            </a:r>
-          </a:p>
-          <a:p>
-            <a:r>
-              <a:rPr lang="en-US" dirty="0"/>
-              <a:t>“left-hand side equals 1 + right-hand side”</a:t>
-            </a:r>
-          </a:p>
-          <a:p>
-            <a:pPr lvl="1"/>
-            <a:r>
-              <a:rPr lang="en-US" dirty="0"/>
-              <a:t>b</a:t>
+              <a:t>, g  (</a:t>
             </a:r>
             <a:r>
               <a:rPr lang="en-US" baseline="30000" dirty="0"/>
@@ -7076,15 +7418,77 @@
             </a:r>
             <a:r>
               <a:rPr lang="en-US" dirty="0"/>
-              <a:t>, c</a:t>
+              <a:t> indicates a proof from false elimination, AKA a “vacuous” proof)</a:t>
+            </a:r>
+          </a:p>
+          <a:p>
+            <a:r>
+              <a:rPr lang="en-US" dirty="0"/>
+              <a:t>≤</a:t>
+            </a:r>
+          </a:p>
+          <a:p>
+            <a:pPr lvl="1"/>
+            <a:r>
+              <a:rPr lang="en-US" dirty="0"/>
+              <a:t>a, c, d, f, g</a:t>
+            </a:r>
+          </a:p>
+          <a:p>
+            <a:r>
+              <a:rPr lang="en-US" dirty="0"/>
+              <a:t>≠</a:t>
+            </a:r>
+          </a:p>
+          <a:p>
+            <a:pPr lvl="1"/>
+            <a:r>
+              <a:rPr lang="en-US" dirty="0"/>
+              <a:t>b, e, g</a:t>
+            </a:r>
+          </a:p>
+          <a:p>
+            <a:r>
+              <a:rPr lang="en-US" dirty="0"/>
+              <a:t>“left-hand side (LHS) equals 0 * right-hand side (RHS)”</a:t>
+            </a:r>
+          </a:p>
+          <a:p>
+            <a:pPr lvl="1"/>
+            <a:r>
+              <a:rPr lang="en-US" dirty="0"/>
+              <a:t>c, f</a:t>
+            </a:r>
+          </a:p>
+          <a:p>
+            <a:r>
+              <a:rPr lang="en-US" dirty="0"/>
+              <a:t>“LHS equals 1 + RHS”</a:t>
+            </a:r>
+          </a:p>
+          <a:p>
+            <a:pPr lvl="1"/>
+            <a:r>
+              <a:rPr lang="en-US" dirty="0"/>
+              <a:t>e, f</a:t>
             </a:r>
             <a:r>
               <a:rPr lang="en-US" baseline="30000" dirty="0"/>
               <a:t>*</a:t>
             </a:r>
-            <a:r>
-              <a:rPr lang="en-US" dirty="0"/>
-              <a:t>, f</a:t>
+            <a:endParaRPr lang="en-US" dirty="0"/>
+          </a:p>
+          <a:p>
+            <a:r>
+              <a:rPr lang="en-US" dirty="0"/>
+              <a:t>“LHS &lt; RHS and RHS &lt; LHS”</a:t>
+            </a:r>
+          </a:p>
+          <a:p>
+            <a:pPr lvl="1"/>
+            <a:r>
+              <a:rPr lang="en-US" dirty="0"/>
+              <a:t>b</a:t>
             </a:r>
             <a:r>
               <a:rPr lang="en-US" baseline="30000" dirty="0"/>
@@ -7092,8 +7496,36 @@
             </a:r>
             <a:r>
               <a:rPr lang="en-US" dirty="0"/>
+              <a:t>, c</a:t>
+            </a:r>
+            <a:r>
+              <a:rPr lang="en-US" baseline="30000" dirty="0"/>
+              <a:t>*</a:t>
+            </a:r>
+            <a:r>
+              <a:rPr lang="en-US" dirty="0"/>
+              <a:t>, e</a:t>
+            </a:r>
+            <a:r>
+              <a:rPr lang="en-US" baseline="30000" dirty="0"/>
+              <a:t>*</a:t>
+            </a:r>
+            <a:r>
+              <a:rPr lang="en-US" dirty="0"/>
+              <a:t>, f</a:t>
+            </a:r>
+            <a:r>
+              <a:rPr lang="en-US" baseline="30000" dirty="0"/>
+              <a:t>*</a:t>
+            </a:r>
+            <a:r>
+              <a:rPr lang="en-US" dirty="0"/>
               <a:t>, h</a:t>
             </a:r>
+          </a:p>
+          <a:p>
+            <a:pPr lvl="1"/>
+            <a:endParaRPr lang="en-US" dirty="0"/>
           </a:p>
         </p:txBody>
       </p:sp>
@@ -7120,7 +7552,7 @@
           <a:p>
             <a:fld id="{3352CBF5-17B8-4387-88A6-ABF9F8C64D5A}" type="slidenum">
               <a:rPr lang="en-US" smtClean="0"/>
-              <a:t>7</a:t>
+              <a:t>8</a:t>
             </a:fld>
             <a:endParaRPr lang="en-US"/>
           </a:p>
@@ -7438,6 +7870,55 @@
                       </p:childTnLst>
                     </p:cTn>
                   </p:par>
+                  <p:par>
+                    <p:cTn id="27" fill="hold">
+                      <p:stCondLst>
+                        <p:cond delay="indefinite"/>
+                      </p:stCondLst>
+                      <p:childTnLst>
+                        <p:par>
+                          <p:cTn id="28" fill="hold">
+                            <p:stCondLst>
+                              <p:cond delay="0"/>
+                            </p:stCondLst>
+                            <p:childTnLst>
+                              <p:par>
+                                <p:cTn id="29" presetID="1" presetClass="entr" presetSubtype="0" fill="hold" nodeType="clickEffect">
+                                  <p:stCondLst>
+                                    <p:cond delay="0"/>
+                                  </p:stCondLst>
+                                  <p:childTnLst>
+                                    <p:set>
+                                      <p:cBhvr>
+                                        <p:cTn id="30" dur="1" fill="hold">
+                                          <p:stCondLst>
+                                            <p:cond delay="0"/>
+                                          </p:stCondLst>
+                                        </p:cTn>
+                                        <p:tgtEl>
+                                          <p:spTgt spid="3">
+                                            <p:txEl>
+                                              <p:pRg st="14" end="14"/>
+                                            </p:txEl>
+                                          </p:spTgt>
+                                        </p:tgtEl>
+                                        <p:attrNameLst>
+                                          <p:attrName>style.visibility</p:attrName>
+                                        </p:attrNameLst>
+                                      </p:cBhvr>
+                                      <p:to>
+                                        <p:strVal val="visible"/>
+                                      </p:to>
+                                    </p:set>
+                                  </p:childTnLst>
+                                </p:cTn>
+                              </p:par>
+                            </p:childTnLst>
+                          </p:cTn>
+                        </p:par>
+                      </p:childTnLst>
+                    </p:cTn>
+                  </p:par>
                 </p:childTnLst>
               </p:cTn>
               <p:prevCondLst>
@@ -7463,194 +7944,6 @@
 </p:sld>
 </file>
 
-<file path=ppt/slides/slide8.xml><?xml version="1.0" encoding="utf-8"?>
-<p:sld xmlns:a="http://schemas.openxmlformats.org/drawingml/2006/main" xmlns:r="http://schemas.openxmlformats.org/officeDocument/2006/relationships" xmlns:p="http://schemas.openxmlformats.org/presentationml/2006/main">
-  <p:cSld>
-    <p:spTree>
-      <p:nvGrpSpPr>
-        <p:cNvPr id="1" name=""/>
-        <p:cNvGrpSpPr/>
-        <p:nvPr/>
-      </p:nvGrpSpPr>
-      <p:grpSpPr>
-        <a:xfrm>
-          <a:off x="0" y="0"/>
-          <a:ext cx="0" cy="0"/>
-          <a:chOff x="0" y="0"/>
-          <a:chExt cx="0" cy="0"/>
-        </a:xfrm>
-      </p:grpSpPr>
-      <p:sp>
-        <p:nvSpPr>
-          <p:cNvPr id="2" name="Title 1">
-            <a:extLst>
-              <a:ext uri="{FF2B5EF4-FFF2-40B4-BE49-F238E27FC236}">
-                <a16:creationId xmlns:a16="http://schemas.microsoft.com/office/drawing/2014/main" id="{E3C4CA33-4434-BE4E-97E4-A0CCB701DDDD}"/>
-              </a:ext>
-            </a:extLst>
-          </p:cNvPr>
-          <p:cNvSpPr>
-            <a:spLocks noGrp="1"/>
-          </p:cNvSpPr>
-          <p:nvPr>
-            <p:ph type="title"/>
-          </p:nvPr>
-        </p:nvSpPr>
-        <p:spPr/>
-        <p:txBody>
-          <a:bodyPr/>
-          <a:lstStyle/>
-          <a:p>
-            <a:r>
-              <a:rPr lang="en-US" dirty="0" err="1"/>
-              <a:t>Subrelation</a:t>
-            </a:r>
-            <a:endParaRPr lang="en-US" dirty="0"/>
-          </a:p>
-        </p:txBody>
-      </p:sp>
-      <p:sp>
-        <p:nvSpPr>
-          <p:cNvPr id="3" name="Content Placeholder 2">
-            <a:extLst>
-              <a:ext uri="{FF2B5EF4-FFF2-40B4-BE49-F238E27FC236}">
-                <a16:creationId xmlns:a16="http://schemas.microsoft.com/office/drawing/2014/main" id="{B2CA3D67-F698-ED41-864E-77500B8BCA93}"/>
-              </a:ext>
-            </a:extLst>
-          </p:cNvPr>
-          <p:cNvSpPr>
-            <a:spLocks noGrp="1"/>
-          </p:cNvSpPr>
-          <p:nvPr>
-            <p:ph idx="1"/>
-          </p:nvPr>
-        </p:nvSpPr>
-        <p:spPr/>
-        <p:txBody>
-          <a:bodyPr/>
-          <a:lstStyle/>
-          <a:p>
-            <a:r>
-              <a:rPr lang="en-US" dirty="0" err="1"/>
-              <a:t>Subrelation</a:t>
-            </a:r>
-            <a:r>
-              <a:rPr lang="en-US" dirty="0"/>
-              <a:t> is a property between two relations</a:t>
-            </a:r>
-          </a:p>
-          <a:p>
-            <a:r>
-              <a:rPr lang="en-US" dirty="0"/>
-              <a:t>For example, &lt; is a </a:t>
-            </a:r>
-            <a:r>
-              <a:rPr lang="en-US" dirty="0" err="1"/>
-              <a:t>subrelation</a:t>
-            </a:r>
-            <a:r>
-              <a:rPr lang="en-US" dirty="0"/>
-              <a:t> of ≤, because x &lt; y → x ≤ y </a:t>
-            </a:r>
-          </a:p>
-          <a:p>
-            <a:pPr marL="0" indent="0">
-              <a:buNone/>
-            </a:pPr>
-            <a:r>
-              <a:rPr lang="en-US" sz="2000" dirty="0">
-                <a:latin typeface="Courier New" panose="02070309020205020404" pitchFamily="49" charset="0"/>
-                <a:cs typeface="Courier New" panose="02070309020205020404" pitchFamily="49" charset="0"/>
-              </a:rPr>
-              <a:t>def </a:t>
-            </a:r>
-            <a:r>
-              <a:rPr lang="en-US" sz="2000" dirty="0" err="1">
-                <a:latin typeface="Courier New" panose="02070309020205020404" pitchFamily="49" charset="0"/>
-                <a:cs typeface="Courier New" panose="02070309020205020404" pitchFamily="49" charset="0"/>
-              </a:rPr>
-              <a:t>subrelation</a:t>
-            </a:r>
-            <a:r>
-              <a:rPr lang="en-US" sz="2000" dirty="0">
-                <a:latin typeface="Courier New" panose="02070309020205020404" pitchFamily="49" charset="0"/>
-                <a:cs typeface="Courier New" panose="02070309020205020404" pitchFamily="49" charset="0"/>
-              </a:rPr>
-              <a:t> (q r : </a:t>
-            </a:r>
-            <a:r>
-              <a:rPr lang="el-GR" sz="2000" dirty="0">
-                <a:latin typeface="Courier New" panose="02070309020205020404" pitchFamily="49" charset="0"/>
-                <a:cs typeface="Courier New" panose="02070309020205020404" pitchFamily="49" charset="0"/>
-              </a:rPr>
-              <a:t>β → β → </a:t>
-            </a:r>
-            <a:r>
-              <a:rPr lang="en-US" sz="2000" dirty="0">
-                <a:latin typeface="Courier New" panose="02070309020205020404" pitchFamily="49" charset="0"/>
-                <a:cs typeface="Courier New" panose="02070309020205020404" pitchFamily="49" charset="0"/>
-              </a:rPr>
-              <a:t>Prop) := ∀ ⦃x y⦄, q x y → r x y</a:t>
-            </a:r>
-          </a:p>
-          <a:p>
-            <a:r>
-              <a:rPr lang="en-US" dirty="0"/>
-              <a:t>Is &lt; a </a:t>
-            </a:r>
-            <a:r>
-              <a:rPr lang="en-US" dirty="0" err="1"/>
-              <a:t>subrelation</a:t>
-            </a:r>
-            <a:r>
-              <a:rPr lang="en-US" dirty="0"/>
-              <a:t> of &lt;?</a:t>
-            </a:r>
-          </a:p>
-        </p:txBody>
-      </p:sp>
-      <p:sp>
-        <p:nvSpPr>
-          <p:cNvPr id="4" name="Slide Number Placeholder 3">
-            <a:extLst>
-              <a:ext uri="{FF2B5EF4-FFF2-40B4-BE49-F238E27FC236}">
-                <a16:creationId xmlns:a16="http://schemas.microsoft.com/office/drawing/2014/main" id="{B4CAEE64-C215-D741-8F93-FB0548281D88}"/>
-              </a:ext>
-            </a:extLst>
-          </p:cNvPr>
-          <p:cNvSpPr>
-            <a:spLocks noGrp="1"/>
-          </p:cNvSpPr>
-          <p:nvPr>
-            <p:ph type="sldNum" sz="quarter" idx="12"/>
-          </p:nvPr>
-        </p:nvSpPr>
-        <p:spPr/>
-        <p:txBody>
-          <a:bodyPr/>
-          <a:lstStyle/>
-          <a:p>
-            <a:fld id="{3352CBF5-17B8-4387-88A6-ABF9F8C64D5A}" type="slidenum">
-              <a:rPr lang="en-US" smtClean="0"/>
-              <a:t>8</a:t>
-            </a:fld>
-            <a:endParaRPr lang="en-US"/>
-          </a:p>
-        </p:txBody>
-      </p:sp>
-    </p:spTree>
-    <p:extLst>
-      <p:ext uri="{BB962C8B-B14F-4D97-AF65-F5344CB8AC3E}">
-        <p14:creationId xmlns:p14="http://schemas.microsoft.com/office/powerpoint/2010/main" val="1599300464"/>
-      </p:ext>
-    </p:extLst>
-  </p:cSld>
-  <p:clrMapOvr>
-    <a:masterClrMapping/>
-  </p:clrMapOvr>
-</p:sld>
-</file>
-
 <file path=ppt/slides/slide9.xml><?xml version="1.0" encoding="utf-8"?>
 <p:sld xmlns:a="http://schemas.openxmlformats.org/drawingml/2006/main" xmlns:r="http://schemas.openxmlformats.org/officeDocument/2006/relationships" xmlns:p="http://schemas.openxmlformats.org/presentationml/2006/main">
   <p:cSld>
@@ -7673,7 +7966,7 @@
           <p:cNvPr id="2" name="Title 1">
             <a:extLst>
               <a:ext uri="{FF2B5EF4-FFF2-40B4-BE49-F238E27FC236}">
-                <a16:creationId xmlns:a16="http://schemas.microsoft.com/office/drawing/2014/main" id="{1687F924-3CDE-4C4C-B303-90249158F795}"/>
+                <a16:creationId xmlns:a16="http://schemas.microsoft.com/office/drawing/2014/main" id="{E3C4CA33-4434-BE4E-97E4-A0CCB701DDDD}"/>
               </a:ext>
             </a:extLst>
           </p:cNvPr>
@@ -7690,9 +7983,10 @@
           <a:lstStyle/>
           <a:p>
             <a:r>
-              <a:rPr lang="en-US" dirty="0"/>
-              <a:t>Relations as sets of 2-tuples</a:t>
-            </a:r>
+              <a:rPr lang="en-US" dirty="0" err="1"/>
+              <a:t>Subrelation</a:t>
+            </a:r>
+            <a:endParaRPr lang="en-US" dirty="0"/>
           </a:p>
         </p:txBody>
       </p:sp>
@@ -7701,7 +7995,7 @@
           <p:cNvPr id="3" name="Content Placeholder 2">
             <a:extLst>
               <a:ext uri="{FF2B5EF4-FFF2-40B4-BE49-F238E27FC236}">
-                <a16:creationId xmlns:a16="http://schemas.microsoft.com/office/drawing/2014/main" id="{8FBA40C9-D27B-FC4B-94FC-F46839BC8DB0}"/>
+                <a16:creationId xmlns:a16="http://schemas.microsoft.com/office/drawing/2014/main" id="{B2CA3D67-F698-ED41-864E-77500B8BCA93}"/>
               </a:ext>
             </a:extLst>
           </p:cNvPr>
@@ -7718,60 +8012,115 @@
           <a:lstStyle/>
           <a:p>
             <a:r>
-              <a:rPr lang="en-US" dirty="0"/>
-              <a:t>Conceptually, we can also think of a relation as a set of 2-tuples</a:t>
-            </a:r>
-          </a:p>
-          <a:p>
-            <a:r>
-              <a:rPr lang="en-US" dirty="0"/>
-              <a:t>Why does this make sense?</a:t>
-            </a:r>
-          </a:p>
-          <a:p>
-            <a:r>
-              <a:rPr lang="en-US" dirty="0"/>
-              <a:t>What is a set?</a:t>
+              <a:rPr lang="en-US" dirty="0" err="1"/>
+              <a:t>Subrelation</a:t>
+            </a:r>
+            <a:r>
+              <a:rPr lang="en-US" dirty="0"/>
+              <a:t> is a property between two relations</a:t>
+            </a:r>
+          </a:p>
+          <a:p>
+            <a:r>
+              <a:rPr lang="en-US" dirty="0"/>
+              <a:t>For example, &lt; is a </a:t>
+            </a:r>
+            <a:r>
+              <a:rPr lang="en-US" dirty="0" err="1"/>
+              <a:t>subrelation</a:t>
+            </a:r>
+            <a:r>
+              <a:rPr lang="en-US" dirty="0"/>
+              <a:t> of ≤, because x &lt; y → x ≤ y </a:t>
+            </a:r>
+          </a:p>
+          <a:p>
+            <a:pPr marL="0" indent="0">
+              <a:buNone/>
+            </a:pPr>
+            <a:r>
+              <a:rPr lang="en-US" sz="2000" dirty="0">
+                <a:latin typeface="Courier New" panose="02070309020205020404" pitchFamily="49" charset="0"/>
+                <a:cs typeface="Courier New" panose="02070309020205020404" pitchFamily="49" charset="0"/>
+              </a:rPr>
+              <a:t>def </a:t>
+            </a:r>
+            <a:r>
+              <a:rPr lang="en-US" sz="2000" dirty="0" err="1">
+                <a:latin typeface="Courier New" panose="02070309020205020404" pitchFamily="49" charset="0"/>
+                <a:cs typeface="Courier New" panose="02070309020205020404" pitchFamily="49" charset="0"/>
+              </a:rPr>
+              <a:t>subrelation</a:t>
+            </a:r>
+            <a:r>
+              <a:rPr lang="en-US" sz="2000" dirty="0">
+                <a:latin typeface="Courier New" panose="02070309020205020404" pitchFamily="49" charset="0"/>
+                <a:cs typeface="Courier New" panose="02070309020205020404" pitchFamily="49" charset="0"/>
+              </a:rPr>
+              <a:t> (q r : </a:t>
+            </a:r>
+            <a:r>
+              <a:rPr lang="el-GR" sz="2000" dirty="0">
+                <a:latin typeface="Courier New" panose="02070309020205020404" pitchFamily="49" charset="0"/>
+                <a:cs typeface="Courier New" panose="02070309020205020404" pitchFamily="49" charset="0"/>
+              </a:rPr>
+              <a:t>β → β → </a:t>
+            </a:r>
+            <a:r>
+              <a:rPr lang="en-US" sz="2000" dirty="0">
+                <a:latin typeface="Courier New" panose="02070309020205020404" pitchFamily="49" charset="0"/>
+                <a:cs typeface="Courier New" panose="02070309020205020404" pitchFamily="49" charset="0"/>
+              </a:rPr>
+              <a:t>Prop) := ∀ ⦃x y⦄, q x y → r x y</a:t>
+            </a:r>
+          </a:p>
+          <a:p>
+            <a:r>
+              <a:rPr lang="en-US" dirty="0"/>
+              <a:t>Is &lt; a </a:t>
+            </a:r>
+            <a:r>
+              <a:rPr lang="en-US" dirty="0" err="1"/>
+              <a:t>subrelation</a:t>
+            </a:r>
+            <a:r>
+              <a:rPr lang="en-US" dirty="0"/>
+              <a:t> of &lt;?</a:t>
             </a:r>
           </a:p>
           <a:p>
             <a:pPr lvl="1"/>
             <a:r>
               <a:rPr lang="en-US" dirty="0"/>
-              <a:t>A set is a proposition about a value</a:t>
-            </a:r>
-          </a:p>
-          <a:p>
-            <a:pPr lvl="2"/>
-            <a:r>
-              <a:rPr lang="en-US" dirty="0"/>
-              <a:t>Conceptually, the proposition is about whether that value is in the set</a:t>
-            </a:r>
-          </a:p>
-          <a:p>
-            <a:r>
-              <a:rPr lang="en-US" dirty="0"/>
-              <a:t>What is a relation?</a:t>
-            </a:r>
-          </a:p>
-          <a:p>
-            <a:pPr lvl="1"/>
-            <a:r>
-              <a:rPr lang="en-US" dirty="0"/>
-              <a:t>A relation is a proposition about two values</a:t>
-            </a:r>
-          </a:p>
-          <a:p>
-            <a:pPr lvl="2"/>
-            <a:r>
-              <a:rPr lang="en-US" dirty="0"/>
-              <a:t>Conceptually, whether the relation holds for those two values</a:t>
-            </a:r>
-          </a:p>
-          <a:p>
-            <a:r>
-              <a:rPr lang="en-US" i="1" dirty="0"/>
-              <a:t>Note, however, that the syntax is different</a:t>
+              <a:t>Yes!</a:t>
+            </a:r>
+          </a:p>
+          <a:p>
+            <a:r>
+              <a:rPr lang="en-US" dirty="0"/>
+              <a:t>All relations are </a:t>
+            </a:r>
+            <a:r>
+              <a:rPr lang="en-US" dirty="0" err="1"/>
+              <a:t>subrelations</a:t>
+            </a:r>
+            <a:r>
+              <a:rPr lang="en-US" dirty="0"/>
+              <a:t> of themselves</a:t>
+            </a:r>
+          </a:p>
+          <a:p>
+            <a:r>
+              <a:rPr lang="en-US" dirty="0"/>
+              <a:t>All empty relations are </a:t>
+            </a:r>
+            <a:r>
+              <a:rPr lang="en-US" dirty="0" err="1"/>
+              <a:t>subrelations</a:t>
+            </a:r>
+            <a:r>
+              <a:rPr lang="en-US" dirty="0"/>
+              <a:t> of any relation</a:t>
             </a:r>
           </a:p>
         </p:txBody>
@@ -7781,7 +8130,7 @@
           <p:cNvPr id="4" name="Slide Number Placeholder 3">
             <a:extLst>
               <a:ext uri="{FF2B5EF4-FFF2-40B4-BE49-F238E27FC236}">
-                <a16:creationId xmlns:a16="http://schemas.microsoft.com/office/drawing/2014/main" id="{25EDC6CB-ECE4-364A-AB4C-82FA39BA13DE}"/>
+                <a16:creationId xmlns:a16="http://schemas.microsoft.com/office/drawing/2014/main" id="{B4CAEE64-C215-D741-8F93-FB0548281D88}"/>
               </a:ext>
             </a:extLst>
           </p:cNvPr>
@@ -7808,7 +8157,7 @@
     </p:spTree>
     <p:extLst>
       <p:ext uri="{BB962C8B-B14F-4D97-AF65-F5344CB8AC3E}">
-        <p14:creationId xmlns:p14="http://schemas.microsoft.com/office/powerpoint/2010/main" val="1170081373"/>
+        <p14:creationId xmlns:p14="http://schemas.microsoft.com/office/powerpoint/2010/main" val="1599300464"/>
       </p:ext>
     </p:extLst>
   </p:cSld>

</xml_diff>